<commit_message>
punkte für die präsentation hinsichtlich scoring
Signed-off-by: younGi <k.younghwan18@googlemail.com>
</commit_message>
<xml_diff>
--- a/Big Data - Driving Competition.pptx
+++ b/Big Data - Driving Competition.pptx
@@ -17,13 +17,14 @@
     <p:sldId id="263" r:id="rId11"/>
     <p:sldId id="264" r:id="rId12"/>
     <p:sldId id="265" r:id="rId13"/>
-    <p:sldId id="266" r:id="rId14"/>
-    <p:sldId id="267" r:id="rId15"/>
-    <p:sldId id="268" r:id="rId16"/>
-    <p:sldId id="269" r:id="rId17"/>
-    <p:sldId id="270" r:id="rId18"/>
-    <p:sldId id="271" r:id="rId19"/>
-    <p:sldId id="272" r:id="rId20"/>
+    <p:sldId id="273" r:id="rId14"/>
+    <p:sldId id="266" r:id="rId15"/>
+    <p:sldId id="267" r:id="rId16"/>
+    <p:sldId id="268" r:id="rId17"/>
+    <p:sldId id="269" r:id="rId18"/>
+    <p:sldId id="270" r:id="rId19"/>
+    <p:sldId id="271" r:id="rId20"/>
+    <p:sldId id="272" r:id="rId21"/>
   </p:sldIdLst>
   <p:sldSz cx="9144000" cy="6858000" type="screen4x3"/>
   <p:notesSz cx="7559675" cy="10691813"/>
@@ -122,6 +123,22 @@
       </a:defRPr>
     </a:lvl9pPr>
   </p:defaultTextStyle>
+  <p:extLst>
+    <p:ext uri="{EFAFB233-063F-42B5-8137-9DF3F51BA10A}">
+      <p15:sldGuideLst xmlns:p15="http://schemas.microsoft.com/office/powerpoint/2012/main">
+        <p15:guide id="1" orient="horz" pos="2160">
+          <p15:clr>
+            <a:srgbClr val="A4A3A4"/>
+          </p15:clr>
+        </p15:guide>
+        <p15:guide id="2" pos="2880">
+          <p15:clr>
+            <a:srgbClr val="A4A3A4"/>
+          </p15:clr>
+        </p15:guide>
+      </p15:sldGuideLst>
+    </p:ext>
+  </p:extLst>
 </p:presentation>
 </file>
 
@@ -6128,7 +6145,7 @@
               </a:lnSpc>
             </a:pPr>
             <a:r>
-              <a:rPr lang="en-US" sz="2600">
+              <a:rPr lang="en-US" sz="2600" dirty="0">
                 <a:solidFill>
                   <a:srgbClr val="FFFFFF"/>
                 </a:solidFill>
@@ -6136,7 +6153,7 @@
               </a:rPr>
               <a:t>Efficiency-Scoring</a:t>
             </a:r>
-            <a:endParaRPr/>
+            <a:endParaRPr dirty="0"/>
           </a:p>
         </p:txBody>
       </p:sp>
@@ -6438,14 +6455,51 @@
       </p:grpSpPr>
       <p:sp>
         <p:nvSpPr>
-          <p:cNvPr id="228" name="TextShape 1"/>
+          <p:cNvPr id="242" name="TextShape 1"/>
           <p:cNvSpPr txBox="1"/>
           <p:nvPr/>
         </p:nvSpPr>
         <p:spPr>
           <a:xfrm>
             <a:off x="358920" y="488880"/>
-            <a:ext cx="6641640" cy="837720"/>
+            <a:ext cx="6641640" cy="419400"/>
+          </a:xfrm>
+          <a:prstGeom prst="rect">
+            <a:avLst/>
+          </a:prstGeom>
+        </p:spPr>
+        <p:txBody>
+          <a:bodyPr lIns="0" tIns="0" rIns="0" bIns="0" anchor="ctr"/>
+          <a:lstStyle/>
+          <a:p>
+            <a:r>
+              <a:rPr lang="en-US" sz="2400" b="1" dirty="0" smtClean="0">
+                <a:solidFill>
+                  <a:srgbClr val="005AA9"/>
+                </a:solidFill>
+                <a:latin typeface="Arial"/>
+              </a:rPr>
+              <a:t>Efficiency-Scoring</a:t>
+            </a:r>
+            <a:endParaRPr lang="en-US" sz="2400" b="1" dirty="0">
+              <a:solidFill>
+                <a:srgbClr val="005AA9"/>
+              </a:solidFill>
+              <a:latin typeface="Arial"/>
+            </a:endParaRPr>
+          </a:p>
+        </p:txBody>
+      </p:sp>
+      <p:sp>
+        <p:nvSpPr>
+          <p:cNvPr id="243" name="TextShape 2"/>
+          <p:cNvSpPr txBox="1"/>
+          <p:nvPr/>
+        </p:nvSpPr>
+        <p:spPr>
+          <a:xfrm>
+            <a:off x="363240" y="1012680"/>
+            <a:ext cx="6944760" cy="327600"/>
           </a:xfrm>
           <a:prstGeom prst="rect">
             <a:avLst/>
@@ -6461,484 +6515,281 @@
               </a:lnSpc>
             </a:pPr>
             <a:r>
-              <a:rPr lang="de-DE" sz="2400" b="1">
-                <a:solidFill>
-                  <a:srgbClr val="005AA9"/>
-                </a:solidFill>
-                <a:latin typeface="Arial"/>
-              </a:rPr>
-              <a:t>Agenda</a:t>
-            </a:r>
-            <a:endParaRPr/>
-          </a:p>
-        </p:txBody>
-      </p:sp>
-      <p:sp>
-        <p:nvSpPr>
-          <p:cNvPr id="229" name="CustomShape 2"/>
-          <p:cNvSpPr/>
-          <p:nvPr/>
-        </p:nvSpPr>
-        <p:spPr>
-          <a:xfrm>
-            <a:off x="-4878000" y="915120"/>
-            <a:ext cx="6107400" cy="6107400"/>
-          </a:xfrm>
-          <a:prstGeom prst="blockArc">
-            <a:avLst>
-              <a:gd name="adj1" fmla="val 18900000"/>
-              <a:gd name="adj2" fmla="val 2700000"/>
-              <a:gd name="adj3" fmla="val 354"/>
-            </a:avLst>
-          </a:prstGeom>
-          <a:solidFill>
-            <a:srgbClr val="005AA9"/>
-          </a:solidFill>
-          <a:ln w="25560">
-            <a:solidFill>
-              <a:srgbClr val="005AA9"/>
-            </a:solidFill>
-            <a:round/>
-          </a:ln>
-        </p:spPr>
-      </p:sp>
-      <p:sp>
-        <p:nvSpPr>
-          <p:cNvPr id="230" name="CustomShape 3"/>
-          <p:cNvSpPr/>
-          <p:nvPr/>
-        </p:nvSpPr>
-        <p:spPr>
-          <a:xfrm>
-            <a:off x="615960" y="1939680"/>
-            <a:ext cx="6125400" cy="477360"/>
-          </a:xfrm>
-          <a:prstGeom prst="rect">
-            <a:avLst/>
-          </a:prstGeom>
-          <a:solidFill>
-            <a:schemeClr val="bg1">
-              <a:lumMod val="75000"/>
-            </a:schemeClr>
-          </a:solidFill>
-          <a:ln w="25560">
-            <a:solidFill>
-              <a:srgbClr val="FFFFFF"/>
-            </a:solidFill>
-            <a:round/>
-          </a:ln>
-        </p:spPr>
-        <p:txBody>
-          <a:bodyPr lIns="379080" tIns="65880" rIns="65880" bIns="65880" anchor="ctr"/>
+              <a:rPr lang="de-DE" dirty="0" smtClean="0">
+                <a:solidFill>
+                  <a:srgbClr val="C00000"/>
+                </a:solidFill>
+                <a:latin typeface="Arial"/>
+              </a:rPr>
+              <a:t>Rankingsystem und -berechnung</a:t>
+            </a:r>
+            <a:endParaRPr dirty="0"/>
+          </a:p>
+        </p:txBody>
+      </p:sp>
+      <p:sp>
+        <p:nvSpPr>
+          <p:cNvPr id="6" name="TextShape 1"/>
+          <p:cNvSpPr txBox="1"/>
+          <p:nvPr/>
+        </p:nvSpPr>
+        <p:spPr>
+          <a:xfrm>
+            <a:off x="358920" y="1620000"/>
+            <a:ext cx="7164000" cy="4479480"/>
+          </a:xfrm>
+          <a:prstGeom prst="rect">
+            <a:avLst/>
+          </a:prstGeom>
+        </p:spPr>
+        <p:txBody>
+          <a:bodyPr lIns="0" rIns="0"/>
           <a:lstStyle/>
           <a:p>
             <a:pPr>
               <a:lnSpc>
-                <a:spcPct val="90000"/>
+                <a:spcPct val="100000"/>
               </a:lnSpc>
             </a:pPr>
             <a:r>
-              <a:rPr lang="en-US" sz="2600">
-                <a:solidFill>
-                  <a:srgbClr val="FFFFFF"/>
-                </a:solidFill>
-                <a:latin typeface="Arial"/>
-              </a:rPr>
-              <a:t>Die Idee</a:t>
-            </a:r>
-            <a:endParaRPr/>
-          </a:p>
-        </p:txBody>
-      </p:sp>
-      <p:sp>
-        <p:nvSpPr>
-          <p:cNvPr id="231" name="CustomShape 4"/>
-          <p:cNvSpPr/>
-          <p:nvPr/>
-        </p:nvSpPr>
-        <p:spPr>
-          <a:xfrm>
-            <a:off x="317520" y="1879920"/>
-            <a:ext cx="596520" cy="596520"/>
-          </a:xfrm>
-          <a:prstGeom prst="ellipse">
-            <a:avLst/>
-          </a:prstGeom>
-          <a:solidFill>
-            <a:srgbClr val="FFFFFF"/>
-          </a:solidFill>
-          <a:ln w="25560">
-            <a:solidFill>
-              <a:srgbClr val="005AA9"/>
-            </a:solidFill>
-            <a:round/>
-          </a:ln>
-        </p:spPr>
-      </p:sp>
-      <p:sp>
-        <p:nvSpPr>
-          <p:cNvPr id="232" name="CustomShape 5"/>
-          <p:cNvSpPr/>
-          <p:nvPr/>
-        </p:nvSpPr>
-        <p:spPr>
-          <a:xfrm>
-            <a:off x="1008720" y="2656080"/>
-            <a:ext cx="5732280" cy="477360"/>
-          </a:xfrm>
-          <a:prstGeom prst="rect">
-            <a:avLst/>
-          </a:prstGeom>
-          <a:solidFill>
-            <a:schemeClr val="bg1">
-              <a:lumMod val="75000"/>
-            </a:schemeClr>
-          </a:solidFill>
-          <a:ln w="25560">
-            <a:solidFill>
-              <a:srgbClr val="FFFFFF"/>
-            </a:solidFill>
-            <a:round/>
-          </a:ln>
-        </p:spPr>
-        <p:txBody>
-          <a:bodyPr lIns="379080" tIns="65880" rIns="65880" bIns="65880" anchor="ctr"/>
-          <a:lstStyle/>
+              <a:rPr lang="de-DE" dirty="0" smtClean="0"/>
+              <a:t>Score berücksichtigt: </a:t>
+            </a:r>
+          </a:p>
           <a:p>
             <a:pPr>
               <a:lnSpc>
-                <a:spcPct val="90000"/>
+                <a:spcPct val="100000"/>
               </a:lnSpc>
             </a:pPr>
             <a:r>
-              <a:rPr lang="en-US" sz="2600">
-                <a:solidFill>
-                  <a:srgbClr val="FFFFFF"/>
-                </a:solidFill>
-                <a:latin typeface="Arial"/>
-              </a:rPr>
-              <a:t>Realisierung</a:t>
-            </a:r>
-            <a:endParaRPr/>
-          </a:p>
-        </p:txBody>
-      </p:sp>
-      <p:sp>
-        <p:nvSpPr>
-          <p:cNvPr id="233" name="CustomShape 6"/>
-          <p:cNvSpPr/>
-          <p:nvPr/>
-        </p:nvSpPr>
-        <p:spPr>
-          <a:xfrm>
-            <a:off x="710280" y="2596320"/>
-            <a:ext cx="596520" cy="596520"/>
-          </a:xfrm>
-          <a:prstGeom prst="ellipse">
-            <a:avLst/>
-          </a:prstGeom>
-          <a:solidFill>
-            <a:srgbClr val="FFFFFF"/>
-          </a:solidFill>
-          <a:ln w="25560">
-            <a:solidFill>
-              <a:srgbClr val="005AA9"/>
-            </a:solidFill>
-            <a:round/>
-          </a:ln>
-        </p:spPr>
-      </p:sp>
-      <p:sp>
-        <p:nvSpPr>
-          <p:cNvPr id="234" name="CustomShape 7"/>
-          <p:cNvSpPr/>
-          <p:nvPr/>
-        </p:nvSpPr>
-        <p:spPr>
-          <a:xfrm>
-            <a:off x="1188360" y="3372480"/>
-            <a:ext cx="5552640" cy="477360"/>
-          </a:xfrm>
-          <a:prstGeom prst="rect">
-            <a:avLst/>
-          </a:prstGeom>
-          <a:solidFill>
-            <a:schemeClr val="bg1">
-              <a:lumMod val="75000"/>
-            </a:schemeClr>
-          </a:solidFill>
-          <a:ln w="25560">
-            <a:solidFill>
-              <a:srgbClr val="FFFFFF"/>
-            </a:solidFill>
-            <a:round/>
-          </a:ln>
-        </p:spPr>
-        <p:txBody>
-          <a:bodyPr lIns="379080" tIns="65880" rIns="65880" bIns="65880" anchor="ctr"/>
-          <a:lstStyle/>
+              <a:rPr lang="de-DE" dirty="0" smtClean="0"/>
+              <a:t>Geschwindigkeit: </a:t>
+            </a:r>
+            <a:r>
+              <a:rPr lang="de-DE" dirty="0" err="1" smtClean="0"/>
+              <a:t>kmh</a:t>
+            </a:r>
+            <a:endParaRPr lang="de-DE" dirty="0" smtClean="0"/>
+          </a:p>
           <a:p>
             <a:pPr>
               <a:lnSpc>
-                <a:spcPct val="90000"/>
+                <a:spcPct val="100000"/>
               </a:lnSpc>
             </a:pPr>
             <a:r>
-              <a:rPr lang="en-US" sz="2600">
-                <a:solidFill>
-                  <a:srgbClr val="FFFFFF"/>
-                </a:solidFill>
-                <a:latin typeface="Arial"/>
-              </a:rPr>
-              <a:t>Efficiency-Scoring</a:t>
-            </a:r>
-            <a:endParaRPr/>
-          </a:p>
-        </p:txBody>
-      </p:sp>
-      <p:sp>
-        <p:nvSpPr>
-          <p:cNvPr id="235" name="CustomShape 8"/>
-          <p:cNvSpPr/>
-          <p:nvPr/>
-        </p:nvSpPr>
-        <p:spPr>
-          <a:xfrm>
-            <a:off x="889920" y="3312720"/>
-            <a:ext cx="596520" cy="596520"/>
-          </a:xfrm>
-          <a:prstGeom prst="ellipse">
-            <a:avLst/>
-          </a:prstGeom>
-          <a:solidFill>
-            <a:srgbClr val="FFFFFF"/>
-          </a:solidFill>
-          <a:ln w="25560">
-            <a:solidFill>
-              <a:srgbClr val="005AA9"/>
-            </a:solidFill>
-            <a:round/>
-          </a:ln>
-        </p:spPr>
-      </p:sp>
-      <p:sp>
-        <p:nvSpPr>
-          <p:cNvPr id="236" name="CustomShape 9"/>
-          <p:cNvSpPr/>
-          <p:nvPr/>
-        </p:nvSpPr>
-        <p:spPr>
-          <a:xfrm>
-            <a:off x="1188360" y="4088160"/>
-            <a:ext cx="5552640" cy="477360"/>
-          </a:xfrm>
-          <a:prstGeom prst="rect">
-            <a:avLst/>
-          </a:prstGeom>
-          <a:solidFill>
-            <a:srgbClr val="005AA9"/>
-          </a:solidFill>
-          <a:ln w="25560">
-            <a:solidFill>
-              <a:srgbClr val="FFFFFF"/>
-            </a:solidFill>
-            <a:round/>
-          </a:ln>
-        </p:spPr>
-        <p:txBody>
-          <a:bodyPr lIns="379080" tIns="65880" rIns="65880" bIns="65880" anchor="ctr"/>
-          <a:lstStyle/>
+              <a:rPr lang="de-DE" dirty="0" err="1" smtClean="0"/>
+              <a:t>Umderhungen</a:t>
+            </a:r>
+            <a:r>
+              <a:rPr lang="de-DE" dirty="0" smtClean="0"/>
+              <a:t> pro </a:t>
+            </a:r>
+            <a:r>
+              <a:rPr lang="de-DE" dirty="0" err="1" smtClean="0"/>
+              <a:t>minute</a:t>
+            </a:r>
+            <a:r>
+              <a:rPr lang="de-DE" dirty="0" smtClean="0"/>
+              <a:t>: RPM</a:t>
+            </a:r>
+          </a:p>
           <a:p>
             <a:pPr>
               <a:lnSpc>
-                <a:spcPct val="90000"/>
+                <a:spcPct val="100000"/>
               </a:lnSpc>
             </a:pPr>
             <a:r>
-              <a:rPr lang="en-US" sz="2600">
-                <a:solidFill>
-                  <a:srgbClr val="FFFFFF"/>
-                </a:solidFill>
-                <a:latin typeface="Arial"/>
-              </a:rPr>
-              <a:t>Live Demo</a:t>
-            </a:r>
-            <a:endParaRPr/>
-          </a:p>
-        </p:txBody>
-      </p:sp>
-      <p:sp>
-        <p:nvSpPr>
-          <p:cNvPr id="237" name="CustomShape 10"/>
-          <p:cNvSpPr/>
-          <p:nvPr/>
-        </p:nvSpPr>
-        <p:spPr>
-          <a:xfrm>
-            <a:off x="889920" y="4028400"/>
-            <a:ext cx="596520" cy="596520"/>
-          </a:xfrm>
-          <a:prstGeom prst="ellipse">
-            <a:avLst/>
-          </a:prstGeom>
-          <a:solidFill>
-            <a:srgbClr val="FFFFFF"/>
-          </a:solidFill>
-          <a:ln w="25560">
-            <a:solidFill>
-              <a:srgbClr val="005AA9"/>
-            </a:solidFill>
-            <a:round/>
-          </a:ln>
-        </p:spPr>
-      </p:sp>
-      <p:sp>
-        <p:nvSpPr>
-          <p:cNvPr id="238" name="CustomShape 11"/>
-          <p:cNvSpPr/>
-          <p:nvPr/>
-        </p:nvSpPr>
-        <p:spPr>
-          <a:xfrm>
-            <a:off x="1008720" y="4804560"/>
-            <a:ext cx="5732280" cy="477360"/>
-          </a:xfrm>
-          <a:prstGeom prst="rect">
-            <a:avLst/>
-          </a:prstGeom>
-          <a:solidFill>
-            <a:schemeClr val="bg1">
-              <a:lumMod val="75000"/>
-            </a:schemeClr>
-          </a:solidFill>
-          <a:ln w="25560">
-            <a:solidFill>
-              <a:srgbClr val="FFFFFF"/>
-            </a:solidFill>
-            <a:round/>
-          </a:ln>
-        </p:spPr>
-        <p:txBody>
-          <a:bodyPr lIns="379080" tIns="65880" rIns="65880" bIns="65880" anchor="ctr"/>
-          <a:lstStyle/>
+              <a:rPr lang="de-DE" dirty="0" smtClean="0"/>
+              <a:t>Pedal D: %</a:t>
+            </a:r>
+          </a:p>
           <a:p>
             <a:pPr>
               <a:lnSpc>
-                <a:spcPct val="90000"/>
+                <a:spcPct val="100000"/>
               </a:lnSpc>
             </a:pPr>
             <a:r>
-              <a:rPr lang="en-US" sz="2600">
-                <a:solidFill>
-                  <a:srgbClr val="FFFFFF"/>
-                </a:solidFill>
-                <a:latin typeface="Arial"/>
-              </a:rPr>
-              <a:t>Ausblick</a:t>
-            </a:r>
-            <a:endParaRPr/>
-          </a:p>
-        </p:txBody>
-      </p:sp>
-      <p:sp>
-        <p:nvSpPr>
-          <p:cNvPr id="239" name="CustomShape 12"/>
-          <p:cNvSpPr/>
-          <p:nvPr/>
-        </p:nvSpPr>
-        <p:spPr>
-          <a:xfrm>
-            <a:off x="710280" y="4744800"/>
-            <a:ext cx="596520" cy="596520"/>
-          </a:xfrm>
-          <a:prstGeom prst="ellipse">
-            <a:avLst/>
-          </a:prstGeom>
-          <a:solidFill>
-            <a:srgbClr val="FFFFFF"/>
-          </a:solidFill>
-          <a:ln w="25560">
-            <a:solidFill>
-              <a:srgbClr val="005AA9"/>
-            </a:solidFill>
-            <a:round/>
-          </a:ln>
-        </p:spPr>
-      </p:sp>
-      <p:sp>
-        <p:nvSpPr>
-          <p:cNvPr id="240" name="CustomShape 13"/>
-          <p:cNvSpPr/>
-          <p:nvPr/>
-        </p:nvSpPr>
-        <p:spPr>
-          <a:xfrm>
-            <a:off x="615960" y="5520960"/>
-            <a:ext cx="6125400" cy="477360"/>
-          </a:xfrm>
-          <a:prstGeom prst="rect">
-            <a:avLst/>
-          </a:prstGeom>
-          <a:solidFill>
-            <a:schemeClr val="bg1">
-              <a:lumMod val="75000"/>
-            </a:schemeClr>
-          </a:solidFill>
-          <a:ln w="25560">
-            <a:solidFill>
-              <a:srgbClr val="FFFFFF"/>
-            </a:solidFill>
-            <a:round/>
-          </a:ln>
-        </p:spPr>
-        <p:txBody>
-          <a:bodyPr lIns="379080" tIns="65880" rIns="65880" bIns="65880" anchor="ctr"/>
-          <a:lstStyle/>
+              <a:rPr lang="de-DE" dirty="0"/>
+              <a:t>Pedal E</a:t>
+            </a:r>
+            <a:r>
+              <a:rPr lang="de-DE" dirty="0" smtClean="0"/>
+              <a:t>: %</a:t>
+            </a:r>
+          </a:p>
           <a:p>
             <a:pPr>
               <a:lnSpc>
-                <a:spcPct val="90000"/>
+                <a:spcPct val="100000"/>
               </a:lnSpc>
             </a:pPr>
             <a:r>
-              <a:rPr lang="en-US" sz="2600">
-                <a:solidFill>
-                  <a:srgbClr val="FFFFFF"/>
-                </a:solidFill>
-                <a:latin typeface="Arial"/>
-              </a:rPr>
-              <a:t>Diskussion</a:t>
-            </a:r>
-            <a:endParaRPr/>
-          </a:p>
-        </p:txBody>
-      </p:sp>
-      <p:sp>
-        <p:nvSpPr>
-          <p:cNvPr id="241" name="CustomShape 14"/>
-          <p:cNvSpPr/>
-          <p:nvPr/>
-        </p:nvSpPr>
-        <p:spPr>
-          <a:xfrm>
-            <a:off x="317520" y="5461200"/>
-            <a:ext cx="596520" cy="596520"/>
-          </a:xfrm>
-          <a:prstGeom prst="ellipse">
-            <a:avLst/>
-          </a:prstGeom>
-          <a:solidFill>
-            <a:srgbClr val="FFFFFF"/>
-          </a:solidFill>
-          <a:ln w="25560">
-            <a:solidFill>
-              <a:srgbClr val="005AA9"/>
-            </a:solidFill>
-            <a:round/>
-          </a:ln>
-        </p:spPr>
+              <a:rPr lang="de-DE" dirty="0" smtClean="0"/>
+              <a:t>Drosselöffnung: %</a:t>
+            </a:r>
+          </a:p>
+          <a:p>
+            <a:pPr>
+              <a:lnSpc>
+                <a:spcPct val="100000"/>
+              </a:lnSpc>
+            </a:pPr>
+            <a:endParaRPr lang="de-DE" dirty="0" smtClean="0"/>
+          </a:p>
+          <a:p>
+            <a:pPr>
+              <a:lnSpc>
+                <a:spcPct val="100000"/>
+              </a:lnSpc>
+            </a:pPr>
+            <a:r>
+              <a:rPr lang="de-DE" dirty="0" err="1" smtClean="0"/>
+              <a:t>Scores</a:t>
+            </a:r>
+            <a:r>
+              <a:rPr lang="de-DE" dirty="0" smtClean="0"/>
+              <a:t> für jeden Trip berechnen</a:t>
+            </a:r>
+          </a:p>
+          <a:p>
+            <a:pPr>
+              <a:lnSpc>
+                <a:spcPct val="100000"/>
+              </a:lnSpc>
+            </a:pPr>
+            <a:r>
+              <a:rPr lang="de-DE" dirty="0" smtClean="0"/>
+              <a:t>-&gt; durchschnitt bilden für den Monat / Jahr</a:t>
+            </a:r>
+          </a:p>
+          <a:p>
+            <a:pPr>
+              <a:lnSpc>
+                <a:spcPct val="100000"/>
+              </a:lnSpc>
+            </a:pPr>
+            <a:endParaRPr dirty="0"/>
+          </a:p>
+          <a:p>
+            <a:pPr>
+              <a:lnSpc>
+                <a:spcPct val="100000"/>
+              </a:lnSpc>
+            </a:pPr>
+            <a:r>
+              <a:rPr lang="de-DE" dirty="0" smtClean="0"/>
+              <a:t>Rankingsystem:</a:t>
+            </a:r>
+          </a:p>
+          <a:p>
+            <a:pPr>
+              <a:lnSpc>
+                <a:spcPct val="100000"/>
+              </a:lnSpc>
+            </a:pPr>
+            <a:r>
+              <a:rPr lang="de-DE" dirty="0"/>
+              <a:t>	</a:t>
+            </a:r>
+            <a:r>
+              <a:rPr lang="de-DE" dirty="0" smtClean="0"/>
+              <a:t>jeder Trip beginnt mit einem 100% score</a:t>
+            </a:r>
+          </a:p>
+          <a:p>
+            <a:pPr>
+              <a:lnSpc>
+                <a:spcPct val="100000"/>
+              </a:lnSpc>
+            </a:pPr>
+            <a:r>
+              <a:rPr lang="de-DE" dirty="0" smtClean="0"/>
+              <a:t>		Für jede Verletzung der Score berücksichtigten Daten werden </a:t>
+            </a:r>
+            <a:r>
+              <a:rPr lang="de-DE" dirty="0" err="1" smtClean="0"/>
+              <a:t>malus</a:t>
+            </a:r>
+            <a:r>
+              <a:rPr lang="de-DE" dirty="0" smtClean="0"/>
+              <a:t> punkte erfasst</a:t>
+            </a:r>
+          </a:p>
+          <a:p>
+            <a:pPr>
+              <a:lnSpc>
+                <a:spcPct val="100000"/>
+              </a:lnSpc>
+            </a:pPr>
+            <a:r>
+              <a:rPr lang="de-DE" dirty="0" smtClean="0"/>
+              <a:t>	Die </a:t>
+            </a:r>
+            <a:r>
+              <a:rPr lang="de-DE" dirty="0" err="1" smtClean="0"/>
+              <a:t>malus</a:t>
+            </a:r>
+            <a:r>
+              <a:rPr lang="de-DE" dirty="0" smtClean="0"/>
+              <a:t> punkte werden % zur Datenerhebung berechnet (summe der </a:t>
+            </a:r>
+            <a:r>
+              <a:rPr lang="de-DE" dirty="0" err="1" smtClean="0"/>
+              <a:t>Maluspunkte</a:t>
+            </a:r>
+            <a:r>
+              <a:rPr lang="de-DE" dirty="0" smtClean="0"/>
+              <a:t> / </a:t>
+            </a:r>
+            <a:r>
+              <a:rPr lang="de-DE" dirty="0" err="1" smtClean="0"/>
+              <a:t>anzahl</a:t>
+            </a:r>
+            <a:r>
+              <a:rPr lang="de-DE" dirty="0" smtClean="0"/>
+              <a:t> der </a:t>
+            </a:r>
+            <a:r>
+              <a:rPr lang="de-DE" dirty="0" err="1" smtClean="0"/>
+              <a:t>Auspräung</a:t>
+            </a:r>
+            <a:r>
+              <a:rPr lang="de-DE" dirty="0" smtClean="0"/>
+              <a:t> in den </a:t>
+            </a:r>
+            <a:r>
+              <a:rPr lang="de-DE" dirty="0" err="1" smtClean="0"/>
+              <a:t>daten</a:t>
+            </a:r>
+            <a:r>
+              <a:rPr lang="de-DE" dirty="0" smtClean="0"/>
+              <a:t>)</a:t>
+            </a:r>
+          </a:p>
+          <a:p>
+            <a:pPr>
+              <a:lnSpc>
+                <a:spcPct val="100000"/>
+              </a:lnSpc>
+            </a:pPr>
+            <a:r>
+              <a:rPr lang="de-DE" dirty="0" smtClean="0"/>
+              <a:t>Anschließend werden der %-Malus vom initial score abgezogen</a:t>
+            </a:r>
+            <a:endParaRPr dirty="0"/>
+          </a:p>
+        </p:txBody>
       </p:sp>
     </p:spTree>
+    <p:extLst>
+      <p:ext uri="{BB962C8B-B14F-4D97-AF65-F5344CB8AC3E}">
+        <p14:creationId xmlns:p14="http://schemas.microsoft.com/office/powerpoint/2010/main" val="2360109864"/>
+      </p:ext>
+    </p:extLst>
   </p:cSld>
   <p:clrMapOvr>
     <a:masterClrMapping/>
@@ -6992,14 +6843,14 @@
       </p:grpSpPr>
       <p:sp>
         <p:nvSpPr>
-          <p:cNvPr id="242" name="TextShape 1"/>
+          <p:cNvPr id="228" name="TextShape 1"/>
           <p:cNvSpPr txBox="1"/>
           <p:nvPr/>
         </p:nvSpPr>
         <p:spPr>
           <a:xfrm>
             <a:off x="358920" y="488880"/>
-            <a:ext cx="6641640" cy="419400"/>
+            <a:ext cx="6641640" cy="837720"/>
           </a:xfrm>
           <a:prstGeom prst="rect">
             <a:avLst/>
@@ -7021,99 +6872,477 @@
                 </a:solidFill>
                 <a:latin typeface="Arial"/>
               </a:rPr>
-              <a:t>Live Demo</a:t>
-            </a:r>
-            <a:endParaRPr/>
-          </a:p>
-        </p:txBody>
-      </p:sp>
-      <p:sp>
-        <p:nvSpPr>
-          <p:cNvPr id="243" name="TextShape 2"/>
-          <p:cNvSpPr txBox="1"/>
-          <p:nvPr/>
-        </p:nvSpPr>
-        <p:spPr>
-          <a:xfrm>
-            <a:off x="363240" y="1012680"/>
-            <a:ext cx="6944760" cy="327600"/>
-          </a:xfrm>
-          <a:prstGeom prst="rect">
-            <a:avLst/>
-          </a:prstGeom>
-        </p:spPr>
-        <p:txBody>
-          <a:bodyPr lIns="0" tIns="0" rIns="0" bIns="0" anchor="ctr"/>
+              <a:t>Agenda</a:t>
+            </a:r>
+            <a:endParaRPr/>
+          </a:p>
+        </p:txBody>
+      </p:sp>
+      <p:sp>
+        <p:nvSpPr>
+          <p:cNvPr id="229" name="CustomShape 2"/>
+          <p:cNvSpPr/>
+          <p:nvPr/>
+        </p:nvSpPr>
+        <p:spPr>
+          <a:xfrm>
+            <a:off x="-4878000" y="915120"/>
+            <a:ext cx="6107400" cy="6107400"/>
+          </a:xfrm>
+          <a:prstGeom prst="blockArc">
+            <a:avLst>
+              <a:gd name="adj1" fmla="val 18900000"/>
+              <a:gd name="adj2" fmla="val 2700000"/>
+              <a:gd name="adj3" fmla="val 354"/>
+            </a:avLst>
+          </a:prstGeom>
+          <a:solidFill>
+            <a:srgbClr val="005AA9"/>
+          </a:solidFill>
+          <a:ln w="25560">
+            <a:solidFill>
+              <a:srgbClr val="005AA9"/>
+            </a:solidFill>
+            <a:round/>
+          </a:ln>
+        </p:spPr>
+      </p:sp>
+      <p:sp>
+        <p:nvSpPr>
+          <p:cNvPr id="230" name="CustomShape 3"/>
+          <p:cNvSpPr/>
+          <p:nvPr/>
+        </p:nvSpPr>
+        <p:spPr>
+          <a:xfrm>
+            <a:off x="615960" y="1939680"/>
+            <a:ext cx="6125400" cy="477360"/>
+          </a:xfrm>
+          <a:prstGeom prst="rect">
+            <a:avLst/>
+          </a:prstGeom>
+          <a:solidFill>
+            <a:schemeClr val="bg1">
+              <a:lumMod val="75000"/>
+            </a:schemeClr>
+          </a:solidFill>
+          <a:ln w="25560">
+            <a:solidFill>
+              <a:srgbClr val="FFFFFF"/>
+            </a:solidFill>
+            <a:round/>
+          </a:ln>
+        </p:spPr>
+        <p:txBody>
+          <a:bodyPr lIns="379080" tIns="65880" rIns="65880" bIns="65880" anchor="ctr"/>
           <a:lstStyle/>
           <a:p>
             <a:pPr>
               <a:lnSpc>
-                <a:spcPct val="100000"/>
+                <a:spcPct val="90000"/>
               </a:lnSpc>
             </a:pPr>
             <a:r>
-              <a:rPr lang="de-DE">
-                <a:solidFill>
-                  <a:srgbClr val="C00000"/>
-                </a:solidFill>
-                <a:latin typeface="Arial"/>
-              </a:rPr>
-              <a:t>Eine kleine Vorführung unseres MVP</a:t>
-            </a:r>
-            <a:endParaRPr/>
-          </a:p>
-        </p:txBody>
-      </p:sp>
-      <p:pic>
-        <p:nvPicPr>
-          <p:cNvPr id="244" name="Picture 2"/>
-          <p:cNvPicPr/>
-          <p:nvPr/>
-        </p:nvPicPr>
-        <p:blipFill>
-          <a:blip r:embed="rId2"/>
-          <a:stretch>
-            <a:fillRect/>
-          </a:stretch>
-        </p:blipFill>
-        <p:spPr>
-          <a:xfrm>
-            <a:off x="1001520" y="1883160"/>
-            <a:ext cx="4002120" cy="3201480"/>
-          </a:xfrm>
-          <a:prstGeom prst="rect">
-            <a:avLst/>
-          </a:prstGeom>
-          <a:ln>
-            <a:noFill/>
-          </a:ln>
-        </p:spPr>
-      </p:pic>
-      <p:pic>
-        <p:nvPicPr>
-          <p:cNvPr id="245" name="Picture 4"/>
-          <p:cNvPicPr/>
-          <p:nvPr/>
-        </p:nvPicPr>
-        <p:blipFill>
-          <a:blip r:embed="rId3"/>
-          <a:stretch>
-            <a:fillRect/>
-          </a:stretch>
-        </p:blipFill>
-        <p:spPr>
-          <a:xfrm>
-            <a:off x="5497920" y="4422240"/>
-            <a:ext cx="1810080" cy="1621800"/>
-          </a:xfrm>
-          <a:prstGeom prst="rect">
-            <a:avLst/>
-          </a:prstGeom>
-          <a:ln>
-            <a:noFill/>
-          </a:ln>
-        </p:spPr>
-      </p:pic>
+              <a:rPr lang="en-US" sz="2600">
+                <a:solidFill>
+                  <a:srgbClr val="FFFFFF"/>
+                </a:solidFill>
+                <a:latin typeface="Arial"/>
+              </a:rPr>
+              <a:t>Die Idee</a:t>
+            </a:r>
+            <a:endParaRPr/>
+          </a:p>
+        </p:txBody>
+      </p:sp>
+      <p:sp>
+        <p:nvSpPr>
+          <p:cNvPr id="231" name="CustomShape 4"/>
+          <p:cNvSpPr/>
+          <p:nvPr/>
+        </p:nvSpPr>
+        <p:spPr>
+          <a:xfrm>
+            <a:off x="317520" y="1879920"/>
+            <a:ext cx="596520" cy="596520"/>
+          </a:xfrm>
+          <a:prstGeom prst="ellipse">
+            <a:avLst/>
+          </a:prstGeom>
+          <a:solidFill>
+            <a:srgbClr val="FFFFFF"/>
+          </a:solidFill>
+          <a:ln w="25560">
+            <a:solidFill>
+              <a:srgbClr val="005AA9"/>
+            </a:solidFill>
+            <a:round/>
+          </a:ln>
+        </p:spPr>
+      </p:sp>
+      <p:sp>
+        <p:nvSpPr>
+          <p:cNvPr id="232" name="CustomShape 5"/>
+          <p:cNvSpPr/>
+          <p:nvPr/>
+        </p:nvSpPr>
+        <p:spPr>
+          <a:xfrm>
+            <a:off x="1008720" y="2656080"/>
+            <a:ext cx="5732280" cy="477360"/>
+          </a:xfrm>
+          <a:prstGeom prst="rect">
+            <a:avLst/>
+          </a:prstGeom>
+          <a:solidFill>
+            <a:schemeClr val="bg1">
+              <a:lumMod val="75000"/>
+            </a:schemeClr>
+          </a:solidFill>
+          <a:ln w="25560">
+            <a:solidFill>
+              <a:srgbClr val="FFFFFF"/>
+            </a:solidFill>
+            <a:round/>
+          </a:ln>
+        </p:spPr>
+        <p:txBody>
+          <a:bodyPr lIns="379080" tIns="65880" rIns="65880" bIns="65880" anchor="ctr"/>
+          <a:lstStyle/>
+          <a:p>
+            <a:pPr>
+              <a:lnSpc>
+                <a:spcPct val="90000"/>
+              </a:lnSpc>
+            </a:pPr>
+            <a:r>
+              <a:rPr lang="en-US" sz="2600">
+                <a:solidFill>
+                  <a:srgbClr val="FFFFFF"/>
+                </a:solidFill>
+                <a:latin typeface="Arial"/>
+              </a:rPr>
+              <a:t>Realisierung</a:t>
+            </a:r>
+            <a:endParaRPr/>
+          </a:p>
+        </p:txBody>
+      </p:sp>
+      <p:sp>
+        <p:nvSpPr>
+          <p:cNvPr id="233" name="CustomShape 6"/>
+          <p:cNvSpPr/>
+          <p:nvPr/>
+        </p:nvSpPr>
+        <p:spPr>
+          <a:xfrm>
+            <a:off x="710280" y="2596320"/>
+            <a:ext cx="596520" cy="596520"/>
+          </a:xfrm>
+          <a:prstGeom prst="ellipse">
+            <a:avLst/>
+          </a:prstGeom>
+          <a:solidFill>
+            <a:srgbClr val="FFFFFF"/>
+          </a:solidFill>
+          <a:ln w="25560">
+            <a:solidFill>
+              <a:srgbClr val="005AA9"/>
+            </a:solidFill>
+            <a:round/>
+          </a:ln>
+        </p:spPr>
+      </p:sp>
+      <p:sp>
+        <p:nvSpPr>
+          <p:cNvPr id="234" name="CustomShape 7"/>
+          <p:cNvSpPr/>
+          <p:nvPr/>
+        </p:nvSpPr>
+        <p:spPr>
+          <a:xfrm>
+            <a:off x="1188360" y="3372480"/>
+            <a:ext cx="5552640" cy="477360"/>
+          </a:xfrm>
+          <a:prstGeom prst="rect">
+            <a:avLst/>
+          </a:prstGeom>
+          <a:solidFill>
+            <a:schemeClr val="bg1">
+              <a:lumMod val="75000"/>
+            </a:schemeClr>
+          </a:solidFill>
+          <a:ln w="25560">
+            <a:solidFill>
+              <a:srgbClr val="FFFFFF"/>
+            </a:solidFill>
+            <a:round/>
+          </a:ln>
+        </p:spPr>
+        <p:txBody>
+          <a:bodyPr lIns="379080" tIns="65880" rIns="65880" bIns="65880" anchor="ctr"/>
+          <a:lstStyle/>
+          <a:p>
+            <a:pPr>
+              <a:lnSpc>
+                <a:spcPct val="90000"/>
+              </a:lnSpc>
+            </a:pPr>
+            <a:r>
+              <a:rPr lang="en-US" sz="2600">
+                <a:solidFill>
+                  <a:srgbClr val="FFFFFF"/>
+                </a:solidFill>
+                <a:latin typeface="Arial"/>
+              </a:rPr>
+              <a:t>Efficiency-Scoring</a:t>
+            </a:r>
+            <a:endParaRPr/>
+          </a:p>
+        </p:txBody>
+      </p:sp>
+      <p:sp>
+        <p:nvSpPr>
+          <p:cNvPr id="235" name="CustomShape 8"/>
+          <p:cNvSpPr/>
+          <p:nvPr/>
+        </p:nvSpPr>
+        <p:spPr>
+          <a:xfrm>
+            <a:off x="889920" y="3312720"/>
+            <a:ext cx="596520" cy="596520"/>
+          </a:xfrm>
+          <a:prstGeom prst="ellipse">
+            <a:avLst/>
+          </a:prstGeom>
+          <a:solidFill>
+            <a:srgbClr val="FFFFFF"/>
+          </a:solidFill>
+          <a:ln w="25560">
+            <a:solidFill>
+              <a:srgbClr val="005AA9"/>
+            </a:solidFill>
+            <a:round/>
+          </a:ln>
+        </p:spPr>
+      </p:sp>
+      <p:sp>
+        <p:nvSpPr>
+          <p:cNvPr id="236" name="CustomShape 9"/>
+          <p:cNvSpPr/>
+          <p:nvPr/>
+        </p:nvSpPr>
+        <p:spPr>
+          <a:xfrm>
+            <a:off x="1188360" y="4088160"/>
+            <a:ext cx="5552640" cy="477360"/>
+          </a:xfrm>
+          <a:prstGeom prst="rect">
+            <a:avLst/>
+          </a:prstGeom>
+          <a:solidFill>
+            <a:srgbClr val="005AA9"/>
+          </a:solidFill>
+          <a:ln w="25560">
+            <a:solidFill>
+              <a:srgbClr val="FFFFFF"/>
+            </a:solidFill>
+            <a:round/>
+          </a:ln>
+        </p:spPr>
+        <p:txBody>
+          <a:bodyPr lIns="379080" tIns="65880" rIns="65880" bIns="65880" anchor="ctr"/>
+          <a:lstStyle/>
+          <a:p>
+            <a:pPr>
+              <a:lnSpc>
+                <a:spcPct val="90000"/>
+              </a:lnSpc>
+            </a:pPr>
+            <a:r>
+              <a:rPr lang="en-US" sz="2600">
+                <a:solidFill>
+                  <a:srgbClr val="FFFFFF"/>
+                </a:solidFill>
+                <a:latin typeface="Arial"/>
+              </a:rPr>
+              <a:t>Live Demo</a:t>
+            </a:r>
+            <a:endParaRPr/>
+          </a:p>
+        </p:txBody>
+      </p:sp>
+      <p:sp>
+        <p:nvSpPr>
+          <p:cNvPr id="237" name="CustomShape 10"/>
+          <p:cNvSpPr/>
+          <p:nvPr/>
+        </p:nvSpPr>
+        <p:spPr>
+          <a:xfrm>
+            <a:off x="889920" y="4028400"/>
+            <a:ext cx="596520" cy="596520"/>
+          </a:xfrm>
+          <a:prstGeom prst="ellipse">
+            <a:avLst/>
+          </a:prstGeom>
+          <a:solidFill>
+            <a:srgbClr val="FFFFFF"/>
+          </a:solidFill>
+          <a:ln w="25560">
+            <a:solidFill>
+              <a:srgbClr val="005AA9"/>
+            </a:solidFill>
+            <a:round/>
+          </a:ln>
+        </p:spPr>
+      </p:sp>
+      <p:sp>
+        <p:nvSpPr>
+          <p:cNvPr id="238" name="CustomShape 11"/>
+          <p:cNvSpPr/>
+          <p:nvPr/>
+        </p:nvSpPr>
+        <p:spPr>
+          <a:xfrm>
+            <a:off x="1008720" y="4804560"/>
+            <a:ext cx="5732280" cy="477360"/>
+          </a:xfrm>
+          <a:prstGeom prst="rect">
+            <a:avLst/>
+          </a:prstGeom>
+          <a:solidFill>
+            <a:schemeClr val="bg1">
+              <a:lumMod val="75000"/>
+            </a:schemeClr>
+          </a:solidFill>
+          <a:ln w="25560">
+            <a:solidFill>
+              <a:srgbClr val="FFFFFF"/>
+            </a:solidFill>
+            <a:round/>
+          </a:ln>
+        </p:spPr>
+        <p:txBody>
+          <a:bodyPr lIns="379080" tIns="65880" rIns="65880" bIns="65880" anchor="ctr"/>
+          <a:lstStyle/>
+          <a:p>
+            <a:pPr>
+              <a:lnSpc>
+                <a:spcPct val="90000"/>
+              </a:lnSpc>
+            </a:pPr>
+            <a:r>
+              <a:rPr lang="en-US" sz="2600">
+                <a:solidFill>
+                  <a:srgbClr val="FFFFFF"/>
+                </a:solidFill>
+                <a:latin typeface="Arial"/>
+              </a:rPr>
+              <a:t>Ausblick</a:t>
+            </a:r>
+            <a:endParaRPr/>
+          </a:p>
+        </p:txBody>
+      </p:sp>
+      <p:sp>
+        <p:nvSpPr>
+          <p:cNvPr id="239" name="CustomShape 12"/>
+          <p:cNvSpPr/>
+          <p:nvPr/>
+        </p:nvSpPr>
+        <p:spPr>
+          <a:xfrm>
+            <a:off x="710280" y="4744800"/>
+            <a:ext cx="596520" cy="596520"/>
+          </a:xfrm>
+          <a:prstGeom prst="ellipse">
+            <a:avLst/>
+          </a:prstGeom>
+          <a:solidFill>
+            <a:srgbClr val="FFFFFF"/>
+          </a:solidFill>
+          <a:ln w="25560">
+            <a:solidFill>
+              <a:srgbClr val="005AA9"/>
+            </a:solidFill>
+            <a:round/>
+          </a:ln>
+        </p:spPr>
+      </p:sp>
+      <p:sp>
+        <p:nvSpPr>
+          <p:cNvPr id="240" name="CustomShape 13"/>
+          <p:cNvSpPr/>
+          <p:nvPr/>
+        </p:nvSpPr>
+        <p:spPr>
+          <a:xfrm>
+            <a:off x="615960" y="5520960"/>
+            <a:ext cx="6125400" cy="477360"/>
+          </a:xfrm>
+          <a:prstGeom prst="rect">
+            <a:avLst/>
+          </a:prstGeom>
+          <a:solidFill>
+            <a:schemeClr val="bg1">
+              <a:lumMod val="75000"/>
+            </a:schemeClr>
+          </a:solidFill>
+          <a:ln w="25560">
+            <a:solidFill>
+              <a:srgbClr val="FFFFFF"/>
+            </a:solidFill>
+            <a:round/>
+          </a:ln>
+        </p:spPr>
+        <p:txBody>
+          <a:bodyPr lIns="379080" tIns="65880" rIns="65880" bIns="65880" anchor="ctr"/>
+          <a:lstStyle/>
+          <a:p>
+            <a:pPr>
+              <a:lnSpc>
+                <a:spcPct val="90000"/>
+              </a:lnSpc>
+            </a:pPr>
+            <a:r>
+              <a:rPr lang="en-US" sz="2600">
+                <a:solidFill>
+                  <a:srgbClr val="FFFFFF"/>
+                </a:solidFill>
+                <a:latin typeface="Arial"/>
+              </a:rPr>
+              <a:t>Diskussion</a:t>
+            </a:r>
+            <a:endParaRPr/>
+          </a:p>
+        </p:txBody>
+      </p:sp>
+      <p:sp>
+        <p:nvSpPr>
+          <p:cNvPr id="241" name="CustomShape 14"/>
+          <p:cNvSpPr/>
+          <p:nvPr/>
+        </p:nvSpPr>
+        <p:spPr>
+          <a:xfrm>
+            <a:off x="317520" y="5461200"/>
+            <a:ext cx="596520" cy="596520"/>
+          </a:xfrm>
+          <a:prstGeom prst="ellipse">
+            <a:avLst/>
+          </a:prstGeom>
+          <a:solidFill>
+            <a:srgbClr val="FFFFFF"/>
+          </a:solidFill>
+          <a:ln w="25560">
+            <a:solidFill>
+              <a:srgbClr val="005AA9"/>
+            </a:solidFill>
+            <a:round/>
+          </a:ln>
+        </p:spPr>
+      </p:sp>
     </p:spTree>
   </p:cSld>
   <p:clrMapOvr>
@@ -7168,14 +7397,14 @@
       </p:grpSpPr>
       <p:sp>
         <p:nvSpPr>
-          <p:cNvPr id="246" name="TextShape 1"/>
+          <p:cNvPr id="242" name="TextShape 1"/>
           <p:cNvSpPr txBox="1"/>
           <p:nvPr/>
         </p:nvSpPr>
         <p:spPr>
           <a:xfrm>
             <a:off x="358920" y="488880"/>
-            <a:ext cx="6641640" cy="837720"/>
+            <a:ext cx="6641640" cy="419400"/>
           </a:xfrm>
           <a:prstGeom prst="rect">
             <a:avLst/>
@@ -7197,477 +7426,101 @@
                 </a:solidFill>
                 <a:latin typeface="Arial"/>
               </a:rPr>
-              <a:t>Agenda</a:t>
-            </a:r>
-            <a:endParaRPr/>
-          </a:p>
-        </p:txBody>
-      </p:sp>
-      <p:sp>
-        <p:nvSpPr>
-          <p:cNvPr id="247" name="CustomShape 2"/>
-          <p:cNvSpPr/>
-          <p:nvPr/>
-        </p:nvSpPr>
-        <p:spPr>
-          <a:xfrm>
-            <a:off x="-4878000" y="915120"/>
-            <a:ext cx="6107400" cy="6107400"/>
-          </a:xfrm>
-          <a:prstGeom prst="blockArc">
-            <a:avLst>
-              <a:gd name="adj1" fmla="val 18900000"/>
-              <a:gd name="adj2" fmla="val 2700000"/>
-              <a:gd name="adj3" fmla="val 354"/>
-            </a:avLst>
-          </a:prstGeom>
-          <a:solidFill>
-            <a:srgbClr val="005AA9"/>
-          </a:solidFill>
-          <a:ln w="25560">
-            <a:solidFill>
-              <a:srgbClr val="005AA9"/>
-            </a:solidFill>
-            <a:round/>
-          </a:ln>
-        </p:spPr>
-      </p:sp>
-      <p:sp>
-        <p:nvSpPr>
-          <p:cNvPr id="248" name="CustomShape 3"/>
-          <p:cNvSpPr/>
-          <p:nvPr/>
-        </p:nvSpPr>
-        <p:spPr>
-          <a:xfrm>
-            <a:off x="615960" y="1939680"/>
-            <a:ext cx="6125400" cy="477360"/>
-          </a:xfrm>
-          <a:prstGeom prst="rect">
-            <a:avLst/>
-          </a:prstGeom>
-          <a:solidFill>
-            <a:schemeClr val="bg1">
-              <a:lumMod val="75000"/>
-            </a:schemeClr>
-          </a:solidFill>
-          <a:ln w="25560">
-            <a:solidFill>
-              <a:srgbClr val="FFFFFF"/>
-            </a:solidFill>
-            <a:round/>
-          </a:ln>
-        </p:spPr>
-        <p:txBody>
-          <a:bodyPr lIns="379080" tIns="65880" rIns="65880" bIns="65880" anchor="ctr"/>
+              <a:t>Live Demo</a:t>
+            </a:r>
+            <a:endParaRPr/>
+          </a:p>
+        </p:txBody>
+      </p:sp>
+      <p:sp>
+        <p:nvSpPr>
+          <p:cNvPr id="243" name="TextShape 2"/>
+          <p:cNvSpPr txBox="1"/>
+          <p:nvPr/>
+        </p:nvSpPr>
+        <p:spPr>
+          <a:xfrm>
+            <a:off x="363240" y="1012680"/>
+            <a:ext cx="6944760" cy="327600"/>
+          </a:xfrm>
+          <a:prstGeom prst="rect">
+            <a:avLst/>
+          </a:prstGeom>
+        </p:spPr>
+        <p:txBody>
+          <a:bodyPr lIns="0" tIns="0" rIns="0" bIns="0" anchor="ctr"/>
           <a:lstStyle/>
           <a:p>
             <a:pPr>
               <a:lnSpc>
-                <a:spcPct val="90000"/>
+                <a:spcPct val="100000"/>
               </a:lnSpc>
             </a:pPr>
             <a:r>
-              <a:rPr lang="en-US" sz="2600">
-                <a:solidFill>
-                  <a:srgbClr val="FFFFFF"/>
-                </a:solidFill>
-                <a:latin typeface="Arial"/>
-              </a:rPr>
-              <a:t>Die Idee</a:t>
-            </a:r>
-            <a:endParaRPr/>
-          </a:p>
-        </p:txBody>
-      </p:sp>
-      <p:sp>
-        <p:nvSpPr>
-          <p:cNvPr id="249" name="CustomShape 4"/>
-          <p:cNvSpPr/>
-          <p:nvPr/>
-        </p:nvSpPr>
-        <p:spPr>
-          <a:xfrm>
-            <a:off x="317520" y="1879920"/>
-            <a:ext cx="596520" cy="596520"/>
-          </a:xfrm>
-          <a:prstGeom prst="ellipse">
-            <a:avLst/>
-          </a:prstGeom>
-          <a:solidFill>
-            <a:srgbClr val="FFFFFF"/>
-          </a:solidFill>
-          <a:ln w="25560">
-            <a:solidFill>
-              <a:srgbClr val="005AA9"/>
-            </a:solidFill>
-            <a:round/>
-          </a:ln>
-        </p:spPr>
-      </p:sp>
-      <p:sp>
-        <p:nvSpPr>
-          <p:cNvPr id="250" name="CustomShape 5"/>
-          <p:cNvSpPr/>
-          <p:nvPr/>
-        </p:nvSpPr>
-        <p:spPr>
-          <a:xfrm>
-            <a:off x="1008720" y="2656080"/>
-            <a:ext cx="5732280" cy="477360"/>
-          </a:xfrm>
-          <a:prstGeom prst="rect">
-            <a:avLst/>
-          </a:prstGeom>
-          <a:solidFill>
-            <a:schemeClr val="bg1">
-              <a:lumMod val="75000"/>
-            </a:schemeClr>
-          </a:solidFill>
-          <a:ln w="25560">
-            <a:solidFill>
-              <a:srgbClr val="FFFFFF"/>
-            </a:solidFill>
-            <a:round/>
-          </a:ln>
-        </p:spPr>
-        <p:txBody>
-          <a:bodyPr lIns="379080" tIns="65880" rIns="65880" bIns="65880" anchor="ctr"/>
-          <a:lstStyle/>
-          <a:p>
-            <a:pPr>
-              <a:lnSpc>
-                <a:spcPct val="90000"/>
-              </a:lnSpc>
-            </a:pPr>
-            <a:r>
-              <a:rPr lang="en-US" sz="2600">
-                <a:solidFill>
-                  <a:srgbClr val="FFFFFF"/>
-                </a:solidFill>
-                <a:latin typeface="Arial"/>
-              </a:rPr>
-              <a:t>Realisierung</a:t>
-            </a:r>
-            <a:endParaRPr/>
-          </a:p>
-        </p:txBody>
-      </p:sp>
-      <p:sp>
-        <p:nvSpPr>
-          <p:cNvPr id="251" name="CustomShape 6"/>
-          <p:cNvSpPr/>
-          <p:nvPr/>
-        </p:nvSpPr>
-        <p:spPr>
-          <a:xfrm>
-            <a:off x="710280" y="2596320"/>
-            <a:ext cx="596520" cy="596520"/>
-          </a:xfrm>
-          <a:prstGeom prst="ellipse">
-            <a:avLst/>
-          </a:prstGeom>
-          <a:solidFill>
-            <a:srgbClr val="FFFFFF"/>
-          </a:solidFill>
-          <a:ln w="25560">
-            <a:solidFill>
-              <a:srgbClr val="005AA9"/>
-            </a:solidFill>
-            <a:round/>
-          </a:ln>
-        </p:spPr>
-      </p:sp>
-      <p:sp>
-        <p:nvSpPr>
-          <p:cNvPr id="252" name="CustomShape 7"/>
-          <p:cNvSpPr/>
-          <p:nvPr/>
-        </p:nvSpPr>
-        <p:spPr>
-          <a:xfrm>
-            <a:off x="1188360" y="3372480"/>
-            <a:ext cx="5552640" cy="477360"/>
-          </a:xfrm>
-          <a:prstGeom prst="rect">
-            <a:avLst/>
-          </a:prstGeom>
-          <a:solidFill>
-            <a:schemeClr val="bg1">
-              <a:lumMod val="75000"/>
-            </a:schemeClr>
-          </a:solidFill>
-          <a:ln w="25560">
-            <a:solidFill>
-              <a:srgbClr val="FFFFFF"/>
-            </a:solidFill>
-            <a:round/>
-          </a:ln>
-        </p:spPr>
-        <p:txBody>
-          <a:bodyPr lIns="379080" tIns="65880" rIns="65880" bIns="65880" anchor="ctr"/>
-          <a:lstStyle/>
-          <a:p>
-            <a:pPr>
-              <a:lnSpc>
-                <a:spcPct val="90000"/>
-              </a:lnSpc>
-            </a:pPr>
-            <a:r>
-              <a:rPr lang="en-US" sz="2600">
-                <a:solidFill>
-                  <a:srgbClr val="FFFFFF"/>
-                </a:solidFill>
-                <a:latin typeface="Arial"/>
-              </a:rPr>
-              <a:t>Efficiency-Scoring</a:t>
-            </a:r>
-            <a:endParaRPr/>
-          </a:p>
-        </p:txBody>
-      </p:sp>
-      <p:sp>
-        <p:nvSpPr>
-          <p:cNvPr id="253" name="CustomShape 8"/>
-          <p:cNvSpPr/>
-          <p:nvPr/>
-        </p:nvSpPr>
-        <p:spPr>
-          <a:xfrm>
-            <a:off x="889920" y="3312720"/>
-            <a:ext cx="596520" cy="596520"/>
-          </a:xfrm>
-          <a:prstGeom prst="ellipse">
-            <a:avLst/>
-          </a:prstGeom>
-          <a:solidFill>
-            <a:srgbClr val="FFFFFF"/>
-          </a:solidFill>
-          <a:ln w="25560">
-            <a:solidFill>
-              <a:srgbClr val="005AA9"/>
-            </a:solidFill>
-            <a:round/>
-          </a:ln>
-        </p:spPr>
-      </p:sp>
-      <p:sp>
-        <p:nvSpPr>
-          <p:cNvPr id="254" name="CustomShape 9"/>
-          <p:cNvSpPr/>
-          <p:nvPr/>
-        </p:nvSpPr>
-        <p:spPr>
-          <a:xfrm>
-            <a:off x="1188360" y="4088160"/>
-            <a:ext cx="5552640" cy="477360"/>
-          </a:xfrm>
-          <a:prstGeom prst="rect">
-            <a:avLst/>
-          </a:prstGeom>
-          <a:solidFill>
-            <a:schemeClr val="bg1">
-              <a:lumMod val="75000"/>
-            </a:schemeClr>
-          </a:solidFill>
-          <a:ln w="25560">
-            <a:solidFill>
-              <a:srgbClr val="FFFFFF"/>
-            </a:solidFill>
-            <a:round/>
-          </a:ln>
-        </p:spPr>
-        <p:txBody>
-          <a:bodyPr lIns="379080" tIns="65880" rIns="65880" bIns="65880" anchor="ctr"/>
-          <a:lstStyle/>
-          <a:p>
-            <a:pPr>
-              <a:lnSpc>
-                <a:spcPct val="90000"/>
-              </a:lnSpc>
-            </a:pPr>
-            <a:r>
-              <a:rPr lang="en-US" sz="2600">
-                <a:solidFill>
-                  <a:srgbClr val="FFFFFF"/>
-                </a:solidFill>
-                <a:latin typeface="Arial"/>
-              </a:rPr>
-              <a:t>Live Demo</a:t>
-            </a:r>
-            <a:endParaRPr/>
-          </a:p>
-        </p:txBody>
-      </p:sp>
-      <p:sp>
-        <p:nvSpPr>
-          <p:cNvPr id="255" name="CustomShape 10"/>
-          <p:cNvSpPr/>
-          <p:nvPr/>
-        </p:nvSpPr>
-        <p:spPr>
-          <a:xfrm>
-            <a:off x="889920" y="4028400"/>
-            <a:ext cx="596520" cy="596520"/>
-          </a:xfrm>
-          <a:prstGeom prst="ellipse">
-            <a:avLst/>
-          </a:prstGeom>
-          <a:solidFill>
-            <a:srgbClr val="FFFFFF"/>
-          </a:solidFill>
-          <a:ln w="25560">
-            <a:solidFill>
-              <a:srgbClr val="005AA9"/>
-            </a:solidFill>
-            <a:round/>
-          </a:ln>
-        </p:spPr>
-      </p:sp>
-      <p:sp>
-        <p:nvSpPr>
-          <p:cNvPr id="256" name="CustomShape 11"/>
-          <p:cNvSpPr/>
-          <p:nvPr/>
-        </p:nvSpPr>
-        <p:spPr>
-          <a:xfrm>
-            <a:off x="1008720" y="4804560"/>
-            <a:ext cx="5732280" cy="477360"/>
-          </a:xfrm>
-          <a:prstGeom prst="rect">
-            <a:avLst/>
-          </a:prstGeom>
-          <a:solidFill>
-            <a:srgbClr val="005AA9"/>
-          </a:solidFill>
-          <a:ln w="25560">
-            <a:solidFill>
-              <a:srgbClr val="FFFFFF"/>
-            </a:solidFill>
-            <a:round/>
-          </a:ln>
-        </p:spPr>
-        <p:txBody>
-          <a:bodyPr lIns="379080" tIns="65880" rIns="65880" bIns="65880" anchor="ctr"/>
-          <a:lstStyle/>
-          <a:p>
-            <a:pPr>
-              <a:lnSpc>
-                <a:spcPct val="90000"/>
-              </a:lnSpc>
-            </a:pPr>
-            <a:r>
-              <a:rPr lang="en-US" sz="2600">
-                <a:solidFill>
-                  <a:srgbClr val="FFFFFF"/>
-                </a:solidFill>
-                <a:latin typeface="Arial"/>
-              </a:rPr>
-              <a:t>Ausblick</a:t>
-            </a:r>
-            <a:endParaRPr/>
-          </a:p>
-        </p:txBody>
-      </p:sp>
-      <p:sp>
-        <p:nvSpPr>
-          <p:cNvPr id="257" name="CustomShape 12"/>
-          <p:cNvSpPr/>
-          <p:nvPr/>
-        </p:nvSpPr>
-        <p:spPr>
-          <a:xfrm>
-            <a:off x="710280" y="4744800"/>
-            <a:ext cx="596520" cy="596520"/>
-          </a:xfrm>
-          <a:prstGeom prst="ellipse">
-            <a:avLst/>
-          </a:prstGeom>
-          <a:solidFill>
-            <a:srgbClr val="FFFFFF"/>
-          </a:solidFill>
-          <a:ln w="25560">
-            <a:solidFill>
-              <a:srgbClr val="005AA9"/>
-            </a:solidFill>
-            <a:round/>
-          </a:ln>
-        </p:spPr>
-      </p:sp>
-      <p:sp>
-        <p:nvSpPr>
-          <p:cNvPr id="258" name="CustomShape 13"/>
-          <p:cNvSpPr/>
-          <p:nvPr/>
-        </p:nvSpPr>
-        <p:spPr>
-          <a:xfrm>
-            <a:off x="615960" y="5520960"/>
-            <a:ext cx="6125400" cy="477360"/>
-          </a:xfrm>
-          <a:prstGeom prst="rect">
-            <a:avLst/>
-          </a:prstGeom>
-          <a:solidFill>
-            <a:schemeClr val="bg1">
-              <a:lumMod val="75000"/>
-            </a:schemeClr>
-          </a:solidFill>
-          <a:ln w="25560">
-            <a:solidFill>
-              <a:srgbClr val="FFFFFF"/>
-            </a:solidFill>
-            <a:round/>
-          </a:ln>
-        </p:spPr>
-        <p:txBody>
-          <a:bodyPr lIns="379080" tIns="65880" rIns="65880" bIns="65880" anchor="ctr"/>
-          <a:lstStyle/>
-          <a:p>
-            <a:pPr>
-              <a:lnSpc>
-                <a:spcPct val="90000"/>
-              </a:lnSpc>
-            </a:pPr>
-            <a:r>
-              <a:rPr lang="en-US" sz="2600">
-                <a:solidFill>
-                  <a:srgbClr val="FFFFFF"/>
-                </a:solidFill>
-                <a:latin typeface="Arial"/>
-              </a:rPr>
-              <a:t>Diskussion</a:t>
-            </a:r>
-            <a:endParaRPr/>
-          </a:p>
-        </p:txBody>
-      </p:sp>
-      <p:sp>
-        <p:nvSpPr>
-          <p:cNvPr id="259" name="CustomShape 14"/>
-          <p:cNvSpPr/>
-          <p:nvPr/>
-        </p:nvSpPr>
-        <p:spPr>
-          <a:xfrm>
-            <a:off x="317520" y="5461200"/>
-            <a:ext cx="596520" cy="596520"/>
-          </a:xfrm>
-          <a:prstGeom prst="ellipse">
-            <a:avLst/>
-          </a:prstGeom>
-          <a:solidFill>
-            <a:srgbClr val="FFFFFF"/>
-          </a:solidFill>
-          <a:ln w="25560">
-            <a:solidFill>
-              <a:srgbClr val="005AA9"/>
-            </a:solidFill>
-            <a:round/>
-          </a:ln>
-        </p:spPr>
-      </p:sp>
+              <a:rPr lang="de-DE">
+                <a:solidFill>
+                  <a:srgbClr val="C00000"/>
+                </a:solidFill>
+                <a:latin typeface="Arial"/>
+              </a:rPr>
+              <a:t>Eine kleine Vorführung unseres MVP</a:t>
+            </a:r>
+            <a:endParaRPr/>
+          </a:p>
+        </p:txBody>
+      </p:sp>
+      <p:pic>
+        <p:nvPicPr>
+          <p:cNvPr id="244" name="Picture 2">
+            <a:hlinkClick r:id="rId2"/>
+          </p:cNvPr>
+          <p:cNvPicPr/>
+          <p:nvPr/>
+        </p:nvPicPr>
+        <p:blipFill>
+          <a:blip r:embed="rId3"/>
+          <a:stretch>
+            <a:fillRect/>
+          </a:stretch>
+        </p:blipFill>
+        <p:spPr>
+          <a:xfrm>
+            <a:off x="1001520" y="1883160"/>
+            <a:ext cx="4002120" cy="3201480"/>
+          </a:xfrm>
+          <a:prstGeom prst="rect">
+            <a:avLst/>
+          </a:prstGeom>
+          <a:ln>
+            <a:noFill/>
+          </a:ln>
+        </p:spPr>
+      </p:pic>
+      <p:pic>
+        <p:nvPicPr>
+          <p:cNvPr id="245" name="Picture 4"/>
+          <p:cNvPicPr/>
+          <p:nvPr/>
+        </p:nvPicPr>
+        <p:blipFill>
+          <a:blip r:embed="rId4"/>
+          <a:stretch>
+            <a:fillRect/>
+          </a:stretch>
+        </p:blipFill>
+        <p:spPr>
+          <a:xfrm>
+            <a:off x="5497920" y="4422240"/>
+            <a:ext cx="1810080" cy="1621800"/>
+          </a:xfrm>
+          <a:prstGeom prst="rect">
+            <a:avLst/>
+          </a:prstGeom>
+          <a:ln>
+            <a:noFill/>
+          </a:ln>
+        </p:spPr>
+      </p:pic>
     </p:spTree>
   </p:cSld>
   <p:clrMapOvr>
@@ -7722,292 +7575,506 @@
       </p:grpSpPr>
       <p:sp>
         <p:nvSpPr>
-          <p:cNvPr id="260" name="TextShape 1"/>
+          <p:cNvPr id="246" name="TextShape 1"/>
           <p:cNvSpPr txBox="1"/>
           <p:nvPr/>
         </p:nvSpPr>
         <p:spPr>
           <a:xfrm>
-            <a:off x="360000" y="1620000"/>
-            <a:ext cx="7164000" cy="4479480"/>
-          </a:xfrm>
-          <a:prstGeom prst="rect">
-            <a:avLst/>
-          </a:prstGeom>
-        </p:spPr>
-        <p:txBody>
-          <a:bodyPr lIns="0" rIns="0"/>
-          <a:lstStyle/>
-          <a:p>
-            <a:pPr>
-              <a:lnSpc>
-                <a:spcPct val="130000"/>
-              </a:lnSpc>
-            </a:pPr>
-            <a:r>
-              <a:rPr lang="de-DE" sz="2000" dirty="0">
-                <a:solidFill>
-                  <a:srgbClr val="000000"/>
-                </a:solidFill>
-                <a:latin typeface="Arial"/>
-              </a:rPr>
-              <a:t>Datenerhebung </a:t>
-            </a:r>
-            <a:r>
-              <a:rPr lang="de-DE" sz="2000" dirty="0" smtClean="0">
-                <a:solidFill>
-                  <a:srgbClr val="000000"/>
-                </a:solidFill>
-                <a:latin typeface="Arial"/>
-              </a:rPr>
-              <a:t>erweitern</a:t>
-            </a:r>
-          </a:p>
-          <a:p>
-            <a:pPr marL="342900" indent="-342900">
-              <a:lnSpc>
-                <a:spcPct val="130000"/>
-              </a:lnSpc>
-              <a:buFont typeface="Wingdings" panose="05000000000000000000" pitchFamily="2" charset="2"/>
-              <a:buChar char="§"/>
-            </a:pPr>
-            <a:r>
-              <a:rPr lang="de-DE" sz="2000" dirty="0" smtClean="0">
-                <a:solidFill>
-                  <a:srgbClr val="000000"/>
-                </a:solidFill>
-                <a:latin typeface="Arial"/>
-              </a:rPr>
-              <a:t>Mehr Autos mit Bluetooth Dongle ausrüsten</a:t>
-            </a:r>
-          </a:p>
-          <a:p>
-            <a:pPr marL="342900" indent="-342900">
-              <a:lnSpc>
-                <a:spcPct val="130000"/>
-              </a:lnSpc>
-              <a:buFont typeface="Wingdings" panose="05000000000000000000" pitchFamily="2" charset="2"/>
-              <a:buChar char="§"/>
-            </a:pPr>
-            <a:r>
-              <a:rPr lang="de-DE" sz="2000" dirty="0" smtClean="0">
-                <a:solidFill>
-                  <a:srgbClr val="000000"/>
-                </a:solidFill>
-                <a:latin typeface="Arial"/>
-              </a:rPr>
-              <a:t>Die Dongle erhalten eine ID zur Fahrererkennung</a:t>
-            </a:r>
-            <a:endParaRPr sz="2000" dirty="0" smtClean="0"/>
-          </a:p>
-          <a:p>
-            <a:pPr>
-              <a:lnSpc>
-                <a:spcPct val="130000"/>
-              </a:lnSpc>
-            </a:pPr>
-            <a:endParaRPr lang="de-DE" sz="2000" dirty="0" smtClean="0"/>
-          </a:p>
-          <a:p>
-            <a:pPr>
-              <a:lnSpc>
-                <a:spcPct val="130000"/>
-              </a:lnSpc>
-            </a:pPr>
-            <a:r>
-              <a:rPr lang="de-DE" sz="2000" dirty="0" smtClean="0"/>
-              <a:t>Verbesserung / Erweiterung der Scoring Methoden</a:t>
-            </a:r>
-          </a:p>
-          <a:p>
-            <a:pPr marL="342900" indent="-342900">
-              <a:lnSpc>
-                <a:spcPct val="130000"/>
-              </a:lnSpc>
-              <a:buFont typeface="Wingdings" panose="05000000000000000000" pitchFamily="2" charset="2"/>
-              <a:buChar char="§"/>
-            </a:pPr>
-            <a:r>
-              <a:rPr lang="de-DE" sz="2000" dirty="0" smtClean="0"/>
-              <a:t>Verbesserung / Erstellung weiterer Heuristiken</a:t>
-            </a:r>
-          </a:p>
-          <a:p>
-            <a:pPr marL="342900" indent="-342900">
-              <a:lnSpc>
-                <a:spcPct val="130000"/>
-              </a:lnSpc>
-              <a:buFont typeface="Wingdings" panose="05000000000000000000" pitchFamily="2" charset="2"/>
-              <a:buChar char="§"/>
-            </a:pPr>
-            <a:r>
-              <a:rPr lang="de-DE" sz="2000" dirty="0" smtClean="0"/>
-              <a:t>Hinzunahme weiterer Attribute</a:t>
-            </a:r>
-            <a:endParaRPr sz="2000" dirty="0" smtClean="0"/>
-          </a:p>
+            <a:off x="358920" y="488880"/>
+            <a:ext cx="6641640" cy="837720"/>
+          </a:xfrm>
+          <a:prstGeom prst="rect">
+            <a:avLst/>
+          </a:prstGeom>
+        </p:spPr>
+        <p:txBody>
+          <a:bodyPr lIns="0" tIns="0" rIns="0" bIns="0" anchor="ctr"/>
+          <a:lstStyle/>
           <a:p>
             <a:pPr>
               <a:lnSpc>
                 <a:spcPct val="100000"/>
               </a:lnSpc>
             </a:pPr>
-            <a:endParaRPr sz="2000" dirty="0"/>
-          </a:p>
-        </p:txBody>
-      </p:sp>
-      <p:sp>
-        <p:nvSpPr>
-          <p:cNvPr id="261" name="TextShape 2"/>
-          <p:cNvSpPr txBox="1"/>
-          <p:nvPr/>
-        </p:nvSpPr>
-        <p:spPr>
-          <a:xfrm>
-            <a:off x="358920" y="488880"/>
-            <a:ext cx="6641640" cy="419400"/>
-          </a:xfrm>
-          <a:prstGeom prst="rect">
-            <a:avLst/>
-          </a:prstGeom>
-        </p:spPr>
-        <p:txBody>
-          <a:bodyPr lIns="0" tIns="0" rIns="0" bIns="0" anchor="ctr"/>
+            <a:r>
+              <a:rPr lang="de-DE" sz="2400" b="1">
+                <a:solidFill>
+                  <a:srgbClr val="005AA9"/>
+                </a:solidFill>
+                <a:latin typeface="Arial"/>
+              </a:rPr>
+              <a:t>Agenda</a:t>
+            </a:r>
+            <a:endParaRPr/>
+          </a:p>
+        </p:txBody>
+      </p:sp>
+      <p:sp>
+        <p:nvSpPr>
+          <p:cNvPr id="247" name="CustomShape 2"/>
+          <p:cNvSpPr/>
+          <p:nvPr/>
+        </p:nvSpPr>
+        <p:spPr>
+          <a:xfrm>
+            <a:off x="-4878000" y="915120"/>
+            <a:ext cx="6107400" cy="6107400"/>
+          </a:xfrm>
+          <a:prstGeom prst="blockArc">
+            <a:avLst>
+              <a:gd name="adj1" fmla="val 18900000"/>
+              <a:gd name="adj2" fmla="val 2700000"/>
+              <a:gd name="adj3" fmla="val 354"/>
+            </a:avLst>
+          </a:prstGeom>
+          <a:solidFill>
+            <a:srgbClr val="005AA9"/>
+          </a:solidFill>
+          <a:ln w="25560">
+            <a:solidFill>
+              <a:srgbClr val="005AA9"/>
+            </a:solidFill>
+            <a:round/>
+          </a:ln>
+        </p:spPr>
+      </p:sp>
+      <p:sp>
+        <p:nvSpPr>
+          <p:cNvPr id="248" name="CustomShape 3"/>
+          <p:cNvSpPr/>
+          <p:nvPr/>
+        </p:nvSpPr>
+        <p:spPr>
+          <a:xfrm>
+            <a:off x="615960" y="1939680"/>
+            <a:ext cx="6125400" cy="477360"/>
+          </a:xfrm>
+          <a:prstGeom prst="rect">
+            <a:avLst/>
+          </a:prstGeom>
+          <a:solidFill>
+            <a:schemeClr val="bg1">
+              <a:lumMod val="75000"/>
+            </a:schemeClr>
+          </a:solidFill>
+          <a:ln w="25560">
+            <a:solidFill>
+              <a:srgbClr val="FFFFFF"/>
+            </a:solidFill>
+            <a:round/>
+          </a:ln>
+        </p:spPr>
+        <p:txBody>
+          <a:bodyPr lIns="379080" tIns="65880" rIns="65880" bIns="65880" anchor="ctr"/>
           <a:lstStyle/>
           <a:p>
             <a:pPr>
               <a:lnSpc>
-                <a:spcPct val="100000"/>
+                <a:spcPct val="90000"/>
               </a:lnSpc>
             </a:pPr>
             <a:r>
-              <a:rPr lang="de-DE" sz="2400" b="1" dirty="0" smtClean="0">
-                <a:solidFill>
-                  <a:srgbClr val="005AA9"/>
-                </a:solidFill>
-                <a:latin typeface="Arial"/>
-              </a:rPr>
-              <a:t>Ausblick</a:t>
-            </a:r>
-            <a:endParaRPr dirty="0"/>
-          </a:p>
-        </p:txBody>
-      </p:sp>
-      <p:sp>
-        <p:nvSpPr>
-          <p:cNvPr id="262" name="TextShape 3"/>
-          <p:cNvSpPr txBox="1"/>
-          <p:nvPr/>
-        </p:nvSpPr>
-        <p:spPr>
-          <a:xfrm>
-            <a:off x="363240" y="1012680"/>
-            <a:ext cx="6944760" cy="327600"/>
-          </a:xfrm>
-          <a:prstGeom prst="rect">
-            <a:avLst/>
-          </a:prstGeom>
-        </p:spPr>
-        <p:txBody>
-          <a:bodyPr lIns="0" tIns="0" rIns="0" bIns="0" anchor="ctr"/>
+              <a:rPr lang="en-US" sz="2600">
+                <a:solidFill>
+                  <a:srgbClr val="FFFFFF"/>
+                </a:solidFill>
+                <a:latin typeface="Arial"/>
+              </a:rPr>
+              <a:t>Die Idee</a:t>
+            </a:r>
+            <a:endParaRPr/>
+          </a:p>
+        </p:txBody>
+      </p:sp>
+      <p:sp>
+        <p:nvSpPr>
+          <p:cNvPr id="249" name="CustomShape 4"/>
+          <p:cNvSpPr/>
+          <p:nvPr/>
+        </p:nvSpPr>
+        <p:spPr>
+          <a:xfrm>
+            <a:off x="317520" y="1879920"/>
+            <a:ext cx="596520" cy="596520"/>
+          </a:xfrm>
+          <a:prstGeom prst="ellipse">
+            <a:avLst/>
+          </a:prstGeom>
+          <a:solidFill>
+            <a:srgbClr val="FFFFFF"/>
+          </a:solidFill>
+          <a:ln w="25560">
+            <a:solidFill>
+              <a:srgbClr val="005AA9"/>
+            </a:solidFill>
+            <a:round/>
+          </a:ln>
+        </p:spPr>
+      </p:sp>
+      <p:sp>
+        <p:nvSpPr>
+          <p:cNvPr id="250" name="CustomShape 5"/>
+          <p:cNvSpPr/>
+          <p:nvPr/>
+        </p:nvSpPr>
+        <p:spPr>
+          <a:xfrm>
+            <a:off x="1008720" y="2656080"/>
+            <a:ext cx="5732280" cy="477360"/>
+          </a:xfrm>
+          <a:prstGeom prst="rect">
+            <a:avLst/>
+          </a:prstGeom>
+          <a:solidFill>
+            <a:schemeClr val="bg1">
+              <a:lumMod val="75000"/>
+            </a:schemeClr>
+          </a:solidFill>
+          <a:ln w="25560">
+            <a:solidFill>
+              <a:srgbClr val="FFFFFF"/>
+            </a:solidFill>
+            <a:round/>
+          </a:ln>
+        </p:spPr>
+        <p:txBody>
+          <a:bodyPr lIns="379080" tIns="65880" rIns="65880" bIns="65880" anchor="ctr"/>
           <a:lstStyle/>
           <a:p>
             <a:pPr>
               <a:lnSpc>
-                <a:spcPct val="100000"/>
+                <a:spcPct val="90000"/>
               </a:lnSpc>
             </a:pPr>
             <a:r>
-              <a:rPr lang="de-DE" dirty="0" smtClean="0">
-                <a:solidFill>
-                  <a:srgbClr val="C00000"/>
-                </a:solidFill>
-                <a:latin typeface="Arial"/>
-              </a:rPr>
-              <a:t>Mögliche Verbesserungen </a:t>
-            </a:r>
-            <a:r>
-              <a:rPr lang="de-DE" dirty="0">
-                <a:solidFill>
-                  <a:srgbClr val="C00000"/>
-                </a:solidFill>
-                <a:latin typeface="Arial"/>
-              </a:rPr>
-              <a:t>und </a:t>
-            </a:r>
-            <a:r>
-              <a:rPr lang="de-DE" dirty="0" smtClean="0">
-                <a:solidFill>
-                  <a:srgbClr val="C00000"/>
-                </a:solidFill>
-                <a:latin typeface="Arial"/>
-              </a:rPr>
-              <a:t>Erweiterungen</a:t>
-            </a:r>
-            <a:endParaRPr dirty="0"/>
-          </a:p>
-        </p:txBody>
-      </p:sp>
-      <p:pic>
-        <p:nvPicPr>
-          <p:cNvPr id="2" name="Grafik 1"/>
-          <p:cNvPicPr>
-            <a:picLocks noChangeAspect="1"/>
-          </p:cNvPicPr>
-          <p:nvPr/>
-        </p:nvPicPr>
-        <p:blipFill>
-          <a:blip r:embed="rId2" cstate="print">
-            <a:extLst>
-              <a:ext uri="{28A0092B-C50C-407E-A947-70E740481C1C}">
-                <a14:useLocalDpi xmlns:a14="http://schemas.microsoft.com/office/drawing/2010/main" val="0"/>
-              </a:ext>
-            </a:extLst>
-          </a:blip>
-          <a:stretch>
-            <a:fillRect/>
-          </a:stretch>
-        </p:blipFill>
-        <p:spPr>
-          <a:xfrm>
-            <a:off x="6876256" y="1620000"/>
-            <a:ext cx="1705372" cy="1705372"/>
-          </a:xfrm>
-          <a:prstGeom prst="rect">
-            <a:avLst/>
-          </a:prstGeom>
-        </p:spPr>
-      </p:pic>
-      <p:pic>
-        <p:nvPicPr>
-          <p:cNvPr id="3" name="Grafik 2"/>
-          <p:cNvPicPr>
-            <a:picLocks noChangeAspect="1"/>
-          </p:cNvPicPr>
-          <p:nvPr/>
-        </p:nvPicPr>
-        <p:blipFill>
-          <a:blip r:embed="rId3" cstate="print">
-            <a:extLst>
-              <a:ext uri="{28A0092B-C50C-407E-A947-70E740481C1C}">
-                <a14:useLocalDpi xmlns:a14="http://schemas.microsoft.com/office/drawing/2010/main" val="0"/>
-              </a:ext>
-            </a:extLst>
-          </a:blip>
-          <a:stretch>
-            <a:fillRect/>
-          </a:stretch>
-        </p:blipFill>
-        <p:spPr>
-          <a:xfrm>
-            <a:off x="5292080" y="4293096"/>
-            <a:ext cx="2505869" cy="1879402"/>
-          </a:xfrm>
-          <a:prstGeom prst="rect">
-            <a:avLst/>
-          </a:prstGeom>
-        </p:spPr>
-      </p:pic>
+              <a:rPr lang="en-US" sz="2600">
+                <a:solidFill>
+                  <a:srgbClr val="FFFFFF"/>
+                </a:solidFill>
+                <a:latin typeface="Arial"/>
+              </a:rPr>
+              <a:t>Realisierung</a:t>
+            </a:r>
+            <a:endParaRPr/>
+          </a:p>
+        </p:txBody>
+      </p:sp>
+      <p:sp>
+        <p:nvSpPr>
+          <p:cNvPr id="251" name="CustomShape 6"/>
+          <p:cNvSpPr/>
+          <p:nvPr/>
+        </p:nvSpPr>
+        <p:spPr>
+          <a:xfrm>
+            <a:off x="710280" y="2596320"/>
+            <a:ext cx="596520" cy="596520"/>
+          </a:xfrm>
+          <a:prstGeom prst="ellipse">
+            <a:avLst/>
+          </a:prstGeom>
+          <a:solidFill>
+            <a:srgbClr val="FFFFFF"/>
+          </a:solidFill>
+          <a:ln w="25560">
+            <a:solidFill>
+              <a:srgbClr val="005AA9"/>
+            </a:solidFill>
+            <a:round/>
+          </a:ln>
+        </p:spPr>
+      </p:sp>
+      <p:sp>
+        <p:nvSpPr>
+          <p:cNvPr id="252" name="CustomShape 7"/>
+          <p:cNvSpPr/>
+          <p:nvPr/>
+        </p:nvSpPr>
+        <p:spPr>
+          <a:xfrm>
+            <a:off x="1188360" y="3372480"/>
+            <a:ext cx="5552640" cy="477360"/>
+          </a:xfrm>
+          <a:prstGeom prst="rect">
+            <a:avLst/>
+          </a:prstGeom>
+          <a:solidFill>
+            <a:schemeClr val="bg1">
+              <a:lumMod val="75000"/>
+            </a:schemeClr>
+          </a:solidFill>
+          <a:ln w="25560">
+            <a:solidFill>
+              <a:srgbClr val="FFFFFF"/>
+            </a:solidFill>
+            <a:round/>
+          </a:ln>
+        </p:spPr>
+        <p:txBody>
+          <a:bodyPr lIns="379080" tIns="65880" rIns="65880" bIns="65880" anchor="ctr"/>
+          <a:lstStyle/>
+          <a:p>
+            <a:pPr>
+              <a:lnSpc>
+                <a:spcPct val="90000"/>
+              </a:lnSpc>
+            </a:pPr>
+            <a:r>
+              <a:rPr lang="en-US" sz="2600">
+                <a:solidFill>
+                  <a:srgbClr val="FFFFFF"/>
+                </a:solidFill>
+                <a:latin typeface="Arial"/>
+              </a:rPr>
+              <a:t>Efficiency-Scoring</a:t>
+            </a:r>
+            <a:endParaRPr/>
+          </a:p>
+        </p:txBody>
+      </p:sp>
+      <p:sp>
+        <p:nvSpPr>
+          <p:cNvPr id="253" name="CustomShape 8"/>
+          <p:cNvSpPr/>
+          <p:nvPr/>
+        </p:nvSpPr>
+        <p:spPr>
+          <a:xfrm>
+            <a:off x="889920" y="3312720"/>
+            <a:ext cx="596520" cy="596520"/>
+          </a:xfrm>
+          <a:prstGeom prst="ellipse">
+            <a:avLst/>
+          </a:prstGeom>
+          <a:solidFill>
+            <a:srgbClr val="FFFFFF"/>
+          </a:solidFill>
+          <a:ln w="25560">
+            <a:solidFill>
+              <a:srgbClr val="005AA9"/>
+            </a:solidFill>
+            <a:round/>
+          </a:ln>
+        </p:spPr>
+      </p:sp>
+      <p:sp>
+        <p:nvSpPr>
+          <p:cNvPr id="254" name="CustomShape 9"/>
+          <p:cNvSpPr/>
+          <p:nvPr/>
+        </p:nvSpPr>
+        <p:spPr>
+          <a:xfrm>
+            <a:off x="1188360" y="4088160"/>
+            <a:ext cx="5552640" cy="477360"/>
+          </a:xfrm>
+          <a:prstGeom prst="rect">
+            <a:avLst/>
+          </a:prstGeom>
+          <a:solidFill>
+            <a:schemeClr val="bg1">
+              <a:lumMod val="75000"/>
+            </a:schemeClr>
+          </a:solidFill>
+          <a:ln w="25560">
+            <a:solidFill>
+              <a:srgbClr val="FFFFFF"/>
+            </a:solidFill>
+            <a:round/>
+          </a:ln>
+        </p:spPr>
+        <p:txBody>
+          <a:bodyPr lIns="379080" tIns="65880" rIns="65880" bIns="65880" anchor="ctr"/>
+          <a:lstStyle/>
+          <a:p>
+            <a:pPr>
+              <a:lnSpc>
+                <a:spcPct val="90000"/>
+              </a:lnSpc>
+            </a:pPr>
+            <a:r>
+              <a:rPr lang="en-US" sz="2600">
+                <a:solidFill>
+                  <a:srgbClr val="FFFFFF"/>
+                </a:solidFill>
+                <a:latin typeface="Arial"/>
+              </a:rPr>
+              <a:t>Live Demo</a:t>
+            </a:r>
+            <a:endParaRPr/>
+          </a:p>
+        </p:txBody>
+      </p:sp>
+      <p:sp>
+        <p:nvSpPr>
+          <p:cNvPr id="255" name="CustomShape 10"/>
+          <p:cNvSpPr/>
+          <p:nvPr/>
+        </p:nvSpPr>
+        <p:spPr>
+          <a:xfrm>
+            <a:off x="889920" y="4028400"/>
+            <a:ext cx="596520" cy="596520"/>
+          </a:xfrm>
+          <a:prstGeom prst="ellipse">
+            <a:avLst/>
+          </a:prstGeom>
+          <a:solidFill>
+            <a:srgbClr val="FFFFFF"/>
+          </a:solidFill>
+          <a:ln w="25560">
+            <a:solidFill>
+              <a:srgbClr val="005AA9"/>
+            </a:solidFill>
+            <a:round/>
+          </a:ln>
+        </p:spPr>
+      </p:sp>
+      <p:sp>
+        <p:nvSpPr>
+          <p:cNvPr id="256" name="CustomShape 11"/>
+          <p:cNvSpPr/>
+          <p:nvPr/>
+        </p:nvSpPr>
+        <p:spPr>
+          <a:xfrm>
+            <a:off x="1008720" y="4804560"/>
+            <a:ext cx="5732280" cy="477360"/>
+          </a:xfrm>
+          <a:prstGeom prst="rect">
+            <a:avLst/>
+          </a:prstGeom>
+          <a:solidFill>
+            <a:srgbClr val="005AA9"/>
+          </a:solidFill>
+          <a:ln w="25560">
+            <a:solidFill>
+              <a:srgbClr val="FFFFFF"/>
+            </a:solidFill>
+            <a:round/>
+          </a:ln>
+        </p:spPr>
+        <p:txBody>
+          <a:bodyPr lIns="379080" tIns="65880" rIns="65880" bIns="65880" anchor="ctr"/>
+          <a:lstStyle/>
+          <a:p>
+            <a:pPr>
+              <a:lnSpc>
+                <a:spcPct val="90000"/>
+              </a:lnSpc>
+            </a:pPr>
+            <a:r>
+              <a:rPr lang="en-US" sz="2600">
+                <a:solidFill>
+                  <a:srgbClr val="FFFFFF"/>
+                </a:solidFill>
+                <a:latin typeface="Arial"/>
+              </a:rPr>
+              <a:t>Ausblick</a:t>
+            </a:r>
+            <a:endParaRPr/>
+          </a:p>
+        </p:txBody>
+      </p:sp>
+      <p:sp>
+        <p:nvSpPr>
+          <p:cNvPr id="257" name="CustomShape 12"/>
+          <p:cNvSpPr/>
+          <p:nvPr/>
+        </p:nvSpPr>
+        <p:spPr>
+          <a:xfrm>
+            <a:off x="710280" y="4744800"/>
+            <a:ext cx="596520" cy="596520"/>
+          </a:xfrm>
+          <a:prstGeom prst="ellipse">
+            <a:avLst/>
+          </a:prstGeom>
+          <a:solidFill>
+            <a:srgbClr val="FFFFFF"/>
+          </a:solidFill>
+          <a:ln w="25560">
+            <a:solidFill>
+              <a:srgbClr val="005AA9"/>
+            </a:solidFill>
+            <a:round/>
+          </a:ln>
+        </p:spPr>
+      </p:sp>
+      <p:sp>
+        <p:nvSpPr>
+          <p:cNvPr id="258" name="CustomShape 13"/>
+          <p:cNvSpPr/>
+          <p:nvPr/>
+        </p:nvSpPr>
+        <p:spPr>
+          <a:xfrm>
+            <a:off x="615960" y="5520960"/>
+            <a:ext cx="6125400" cy="477360"/>
+          </a:xfrm>
+          <a:prstGeom prst="rect">
+            <a:avLst/>
+          </a:prstGeom>
+          <a:solidFill>
+            <a:schemeClr val="bg1">
+              <a:lumMod val="75000"/>
+            </a:schemeClr>
+          </a:solidFill>
+          <a:ln w="25560">
+            <a:solidFill>
+              <a:srgbClr val="FFFFFF"/>
+            </a:solidFill>
+            <a:round/>
+          </a:ln>
+        </p:spPr>
+        <p:txBody>
+          <a:bodyPr lIns="379080" tIns="65880" rIns="65880" bIns="65880" anchor="ctr"/>
+          <a:lstStyle/>
+          <a:p>
+            <a:pPr>
+              <a:lnSpc>
+                <a:spcPct val="90000"/>
+              </a:lnSpc>
+            </a:pPr>
+            <a:r>
+              <a:rPr lang="en-US" sz="2600">
+                <a:solidFill>
+                  <a:srgbClr val="FFFFFF"/>
+                </a:solidFill>
+                <a:latin typeface="Arial"/>
+              </a:rPr>
+              <a:t>Diskussion</a:t>
+            </a:r>
+            <a:endParaRPr/>
+          </a:p>
+        </p:txBody>
+      </p:sp>
+      <p:sp>
+        <p:nvSpPr>
+          <p:cNvPr id="259" name="CustomShape 14"/>
+          <p:cNvSpPr/>
+          <p:nvPr/>
+        </p:nvSpPr>
+        <p:spPr>
+          <a:xfrm>
+            <a:off x="317520" y="5461200"/>
+            <a:ext cx="596520" cy="596520"/>
+          </a:xfrm>
+          <a:prstGeom prst="ellipse">
+            <a:avLst/>
+          </a:prstGeom>
+          <a:solidFill>
+            <a:srgbClr val="FFFFFF"/>
+          </a:solidFill>
+          <a:ln w="25560">
+            <a:solidFill>
+              <a:srgbClr val="005AA9"/>
+            </a:solidFill>
+            <a:round/>
+          </a:ln>
+        </p:spPr>
+      </p:sp>
     </p:spTree>
   </p:cSld>
   <p:clrMapOvr>
@@ -8062,506 +8129,292 @@
       </p:grpSpPr>
       <p:sp>
         <p:nvSpPr>
-          <p:cNvPr id="263" name="TextShape 1"/>
+          <p:cNvPr id="260" name="TextShape 1"/>
           <p:cNvSpPr txBox="1"/>
           <p:nvPr/>
         </p:nvSpPr>
         <p:spPr>
           <a:xfrm>
-            <a:off x="358920" y="488880"/>
-            <a:ext cx="6641640" cy="837720"/>
-          </a:xfrm>
-          <a:prstGeom prst="rect">
-            <a:avLst/>
-          </a:prstGeom>
-        </p:spPr>
-        <p:txBody>
-          <a:bodyPr lIns="0" tIns="0" rIns="0" bIns="0" anchor="ctr"/>
-          <a:lstStyle/>
+            <a:off x="360000" y="1620000"/>
+            <a:ext cx="7164000" cy="4479480"/>
+          </a:xfrm>
+          <a:prstGeom prst="rect">
+            <a:avLst/>
+          </a:prstGeom>
+        </p:spPr>
+        <p:txBody>
+          <a:bodyPr lIns="0" rIns="0"/>
+          <a:lstStyle/>
+          <a:p>
+            <a:pPr>
+              <a:lnSpc>
+                <a:spcPct val="130000"/>
+              </a:lnSpc>
+            </a:pPr>
+            <a:r>
+              <a:rPr lang="de-DE" sz="2000" dirty="0">
+                <a:solidFill>
+                  <a:srgbClr val="000000"/>
+                </a:solidFill>
+                <a:latin typeface="Arial"/>
+              </a:rPr>
+              <a:t>Datenerhebung </a:t>
+            </a:r>
+            <a:r>
+              <a:rPr lang="de-DE" sz="2000" dirty="0" smtClean="0">
+                <a:solidFill>
+                  <a:srgbClr val="000000"/>
+                </a:solidFill>
+                <a:latin typeface="Arial"/>
+              </a:rPr>
+              <a:t>erweitern</a:t>
+            </a:r>
+          </a:p>
+          <a:p>
+            <a:pPr marL="342900" indent="-342900">
+              <a:lnSpc>
+                <a:spcPct val="130000"/>
+              </a:lnSpc>
+              <a:buFont typeface="Wingdings" panose="05000000000000000000" pitchFamily="2" charset="2"/>
+              <a:buChar char="§"/>
+            </a:pPr>
+            <a:r>
+              <a:rPr lang="de-DE" sz="2000" dirty="0" smtClean="0">
+                <a:solidFill>
+                  <a:srgbClr val="000000"/>
+                </a:solidFill>
+                <a:latin typeface="Arial"/>
+              </a:rPr>
+              <a:t>Mehr Autos mit Bluetooth Dongle ausrüsten</a:t>
+            </a:r>
+          </a:p>
+          <a:p>
+            <a:pPr marL="342900" indent="-342900">
+              <a:lnSpc>
+                <a:spcPct val="130000"/>
+              </a:lnSpc>
+              <a:buFont typeface="Wingdings" panose="05000000000000000000" pitchFamily="2" charset="2"/>
+              <a:buChar char="§"/>
+            </a:pPr>
+            <a:r>
+              <a:rPr lang="de-DE" sz="2000" dirty="0" smtClean="0">
+                <a:solidFill>
+                  <a:srgbClr val="000000"/>
+                </a:solidFill>
+                <a:latin typeface="Arial"/>
+              </a:rPr>
+              <a:t>Die Dongle erhalten eine ID zur Fahrererkennung</a:t>
+            </a:r>
+            <a:endParaRPr sz="2000" dirty="0" smtClean="0"/>
+          </a:p>
+          <a:p>
+            <a:pPr>
+              <a:lnSpc>
+                <a:spcPct val="130000"/>
+              </a:lnSpc>
+            </a:pPr>
+            <a:endParaRPr lang="de-DE" sz="2000" dirty="0" smtClean="0"/>
+          </a:p>
+          <a:p>
+            <a:pPr>
+              <a:lnSpc>
+                <a:spcPct val="130000"/>
+              </a:lnSpc>
+            </a:pPr>
+            <a:r>
+              <a:rPr lang="de-DE" sz="2000" dirty="0" smtClean="0"/>
+              <a:t>Verbesserung / Erweiterung der Scoring Methoden</a:t>
+            </a:r>
+          </a:p>
+          <a:p>
+            <a:pPr marL="342900" indent="-342900">
+              <a:lnSpc>
+                <a:spcPct val="130000"/>
+              </a:lnSpc>
+              <a:buFont typeface="Wingdings" panose="05000000000000000000" pitchFamily="2" charset="2"/>
+              <a:buChar char="§"/>
+            </a:pPr>
+            <a:r>
+              <a:rPr lang="de-DE" sz="2000" dirty="0" smtClean="0"/>
+              <a:t>Verbesserung / Erstellung weiterer Heuristiken</a:t>
+            </a:r>
+          </a:p>
+          <a:p>
+            <a:pPr marL="342900" indent="-342900">
+              <a:lnSpc>
+                <a:spcPct val="130000"/>
+              </a:lnSpc>
+              <a:buFont typeface="Wingdings" panose="05000000000000000000" pitchFamily="2" charset="2"/>
+              <a:buChar char="§"/>
+            </a:pPr>
+            <a:r>
+              <a:rPr lang="de-DE" sz="2000" dirty="0" smtClean="0"/>
+              <a:t>Hinzunahme weiterer Attribute</a:t>
+            </a:r>
+            <a:endParaRPr sz="2000" dirty="0" smtClean="0"/>
+          </a:p>
           <a:p>
             <a:pPr>
               <a:lnSpc>
                 <a:spcPct val="100000"/>
               </a:lnSpc>
             </a:pPr>
-            <a:r>
-              <a:rPr lang="de-DE" sz="2400" b="1">
-                <a:solidFill>
-                  <a:srgbClr val="005AA9"/>
-                </a:solidFill>
-                <a:latin typeface="Arial"/>
-              </a:rPr>
-              <a:t>Agenda</a:t>
-            </a:r>
-            <a:endParaRPr/>
-          </a:p>
-        </p:txBody>
-      </p:sp>
-      <p:sp>
-        <p:nvSpPr>
-          <p:cNvPr id="264" name="CustomShape 2"/>
-          <p:cNvSpPr/>
-          <p:nvPr/>
-        </p:nvSpPr>
-        <p:spPr>
-          <a:xfrm>
-            <a:off x="-4878000" y="915120"/>
-            <a:ext cx="6107400" cy="6107400"/>
-          </a:xfrm>
-          <a:prstGeom prst="blockArc">
-            <a:avLst>
-              <a:gd name="adj1" fmla="val 18900000"/>
-              <a:gd name="adj2" fmla="val 2700000"/>
-              <a:gd name="adj3" fmla="val 354"/>
-            </a:avLst>
-          </a:prstGeom>
-          <a:solidFill>
-            <a:srgbClr val="005AA9"/>
-          </a:solidFill>
-          <a:ln w="25560">
-            <a:solidFill>
-              <a:srgbClr val="005AA9"/>
-            </a:solidFill>
-            <a:round/>
-          </a:ln>
-        </p:spPr>
-      </p:sp>
-      <p:sp>
-        <p:nvSpPr>
-          <p:cNvPr id="265" name="CustomShape 3"/>
-          <p:cNvSpPr/>
-          <p:nvPr/>
-        </p:nvSpPr>
-        <p:spPr>
-          <a:xfrm>
-            <a:off x="615960" y="1939680"/>
-            <a:ext cx="6125400" cy="477360"/>
-          </a:xfrm>
-          <a:prstGeom prst="rect">
-            <a:avLst/>
-          </a:prstGeom>
-          <a:solidFill>
-            <a:schemeClr val="bg1">
-              <a:lumMod val="75000"/>
-            </a:schemeClr>
-          </a:solidFill>
-          <a:ln w="25560">
-            <a:solidFill>
-              <a:srgbClr val="FFFFFF"/>
-            </a:solidFill>
-            <a:round/>
-          </a:ln>
-        </p:spPr>
-        <p:txBody>
-          <a:bodyPr lIns="379080" tIns="65880" rIns="65880" bIns="65880" anchor="ctr"/>
+            <a:endParaRPr sz="2000" dirty="0"/>
+          </a:p>
+        </p:txBody>
+      </p:sp>
+      <p:sp>
+        <p:nvSpPr>
+          <p:cNvPr id="261" name="TextShape 2"/>
+          <p:cNvSpPr txBox="1"/>
+          <p:nvPr/>
+        </p:nvSpPr>
+        <p:spPr>
+          <a:xfrm>
+            <a:off x="358920" y="488880"/>
+            <a:ext cx="6641640" cy="419400"/>
+          </a:xfrm>
+          <a:prstGeom prst="rect">
+            <a:avLst/>
+          </a:prstGeom>
+        </p:spPr>
+        <p:txBody>
+          <a:bodyPr lIns="0" tIns="0" rIns="0" bIns="0" anchor="ctr"/>
           <a:lstStyle/>
           <a:p>
             <a:pPr>
               <a:lnSpc>
-                <a:spcPct val="90000"/>
+                <a:spcPct val="100000"/>
               </a:lnSpc>
             </a:pPr>
             <a:r>
-              <a:rPr lang="en-US" sz="2600">
-                <a:solidFill>
-                  <a:srgbClr val="FFFFFF"/>
-                </a:solidFill>
-                <a:latin typeface="Arial"/>
-              </a:rPr>
-              <a:t>Die Idee</a:t>
-            </a:r>
-            <a:endParaRPr/>
-          </a:p>
-        </p:txBody>
-      </p:sp>
-      <p:sp>
-        <p:nvSpPr>
-          <p:cNvPr id="266" name="CustomShape 4"/>
-          <p:cNvSpPr/>
-          <p:nvPr/>
-        </p:nvSpPr>
-        <p:spPr>
-          <a:xfrm>
-            <a:off x="317520" y="1879920"/>
-            <a:ext cx="596520" cy="596520"/>
-          </a:xfrm>
-          <a:prstGeom prst="ellipse">
-            <a:avLst/>
-          </a:prstGeom>
-          <a:solidFill>
-            <a:srgbClr val="FFFFFF"/>
-          </a:solidFill>
-          <a:ln w="25560">
-            <a:solidFill>
-              <a:srgbClr val="005AA9"/>
-            </a:solidFill>
-            <a:round/>
-          </a:ln>
-        </p:spPr>
-      </p:sp>
-      <p:sp>
-        <p:nvSpPr>
-          <p:cNvPr id="267" name="CustomShape 5"/>
-          <p:cNvSpPr/>
-          <p:nvPr/>
-        </p:nvSpPr>
-        <p:spPr>
-          <a:xfrm>
-            <a:off x="1008720" y="2656080"/>
-            <a:ext cx="5732280" cy="477360"/>
-          </a:xfrm>
-          <a:prstGeom prst="rect">
-            <a:avLst/>
-          </a:prstGeom>
-          <a:solidFill>
-            <a:schemeClr val="bg1">
-              <a:lumMod val="75000"/>
-            </a:schemeClr>
-          </a:solidFill>
-          <a:ln w="25560">
-            <a:solidFill>
-              <a:srgbClr val="FFFFFF"/>
-            </a:solidFill>
-            <a:round/>
-          </a:ln>
-        </p:spPr>
-        <p:txBody>
-          <a:bodyPr lIns="379080" tIns="65880" rIns="65880" bIns="65880" anchor="ctr"/>
+              <a:rPr lang="de-DE" sz="2400" b="1" dirty="0" smtClean="0">
+                <a:solidFill>
+                  <a:srgbClr val="005AA9"/>
+                </a:solidFill>
+                <a:latin typeface="Arial"/>
+              </a:rPr>
+              <a:t>Ausblick</a:t>
+            </a:r>
+            <a:endParaRPr dirty="0"/>
+          </a:p>
+        </p:txBody>
+      </p:sp>
+      <p:sp>
+        <p:nvSpPr>
+          <p:cNvPr id="262" name="TextShape 3"/>
+          <p:cNvSpPr txBox="1"/>
+          <p:nvPr/>
+        </p:nvSpPr>
+        <p:spPr>
+          <a:xfrm>
+            <a:off x="363240" y="1012680"/>
+            <a:ext cx="6944760" cy="327600"/>
+          </a:xfrm>
+          <a:prstGeom prst="rect">
+            <a:avLst/>
+          </a:prstGeom>
+        </p:spPr>
+        <p:txBody>
+          <a:bodyPr lIns="0" tIns="0" rIns="0" bIns="0" anchor="ctr"/>
           <a:lstStyle/>
           <a:p>
             <a:pPr>
               <a:lnSpc>
-                <a:spcPct val="90000"/>
+                <a:spcPct val="100000"/>
               </a:lnSpc>
             </a:pPr>
             <a:r>
-              <a:rPr lang="en-US" sz="2600">
-                <a:solidFill>
-                  <a:srgbClr val="FFFFFF"/>
-                </a:solidFill>
-                <a:latin typeface="Arial"/>
-              </a:rPr>
-              <a:t>Realisierung</a:t>
-            </a:r>
-            <a:endParaRPr/>
-          </a:p>
-        </p:txBody>
-      </p:sp>
-      <p:sp>
-        <p:nvSpPr>
-          <p:cNvPr id="268" name="CustomShape 6"/>
-          <p:cNvSpPr/>
-          <p:nvPr/>
-        </p:nvSpPr>
-        <p:spPr>
-          <a:xfrm>
-            <a:off x="710280" y="2596320"/>
-            <a:ext cx="596520" cy="596520"/>
-          </a:xfrm>
-          <a:prstGeom prst="ellipse">
-            <a:avLst/>
-          </a:prstGeom>
-          <a:solidFill>
-            <a:srgbClr val="FFFFFF"/>
-          </a:solidFill>
-          <a:ln w="25560">
-            <a:solidFill>
-              <a:srgbClr val="005AA9"/>
-            </a:solidFill>
-            <a:round/>
-          </a:ln>
-        </p:spPr>
-      </p:sp>
-      <p:sp>
-        <p:nvSpPr>
-          <p:cNvPr id="269" name="CustomShape 7"/>
-          <p:cNvSpPr/>
-          <p:nvPr/>
-        </p:nvSpPr>
-        <p:spPr>
-          <a:xfrm>
-            <a:off x="1188360" y="3372480"/>
-            <a:ext cx="5552640" cy="477360"/>
-          </a:xfrm>
-          <a:prstGeom prst="rect">
-            <a:avLst/>
-          </a:prstGeom>
-          <a:solidFill>
-            <a:schemeClr val="bg1">
-              <a:lumMod val="75000"/>
-            </a:schemeClr>
-          </a:solidFill>
-          <a:ln w="25560">
-            <a:solidFill>
-              <a:srgbClr val="FFFFFF"/>
-            </a:solidFill>
-            <a:round/>
-          </a:ln>
-        </p:spPr>
-        <p:txBody>
-          <a:bodyPr lIns="379080" tIns="65880" rIns="65880" bIns="65880" anchor="ctr"/>
-          <a:lstStyle/>
-          <a:p>
-            <a:pPr>
-              <a:lnSpc>
-                <a:spcPct val="90000"/>
-              </a:lnSpc>
-            </a:pPr>
-            <a:r>
-              <a:rPr lang="en-US" sz="2600">
-                <a:solidFill>
-                  <a:srgbClr val="FFFFFF"/>
-                </a:solidFill>
-                <a:latin typeface="Arial"/>
-              </a:rPr>
-              <a:t>Efficiency-Scoring</a:t>
-            </a:r>
-            <a:endParaRPr/>
-          </a:p>
-        </p:txBody>
-      </p:sp>
-      <p:sp>
-        <p:nvSpPr>
-          <p:cNvPr id="270" name="CustomShape 8"/>
-          <p:cNvSpPr/>
-          <p:nvPr/>
-        </p:nvSpPr>
-        <p:spPr>
-          <a:xfrm>
-            <a:off x="889920" y="3312720"/>
-            <a:ext cx="596520" cy="596520"/>
-          </a:xfrm>
-          <a:prstGeom prst="ellipse">
-            <a:avLst/>
-          </a:prstGeom>
-          <a:solidFill>
-            <a:srgbClr val="FFFFFF"/>
-          </a:solidFill>
-          <a:ln w="25560">
-            <a:solidFill>
-              <a:srgbClr val="005AA9"/>
-            </a:solidFill>
-            <a:round/>
-          </a:ln>
-        </p:spPr>
-      </p:sp>
-      <p:sp>
-        <p:nvSpPr>
-          <p:cNvPr id="271" name="CustomShape 9"/>
-          <p:cNvSpPr/>
-          <p:nvPr/>
-        </p:nvSpPr>
-        <p:spPr>
-          <a:xfrm>
-            <a:off x="1188360" y="4088160"/>
-            <a:ext cx="5552640" cy="477360"/>
-          </a:xfrm>
-          <a:prstGeom prst="rect">
-            <a:avLst/>
-          </a:prstGeom>
-          <a:solidFill>
-            <a:schemeClr val="bg1">
-              <a:lumMod val="75000"/>
-            </a:schemeClr>
-          </a:solidFill>
-          <a:ln w="25560">
-            <a:solidFill>
-              <a:srgbClr val="FFFFFF"/>
-            </a:solidFill>
-            <a:round/>
-          </a:ln>
-        </p:spPr>
-        <p:txBody>
-          <a:bodyPr lIns="379080" tIns="65880" rIns="65880" bIns="65880" anchor="ctr"/>
-          <a:lstStyle/>
-          <a:p>
-            <a:pPr>
-              <a:lnSpc>
-                <a:spcPct val="90000"/>
-              </a:lnSpc>
-            </a:pPr>
-            <a:r>
-              <a:rPr lang="en-US" sz="2600">
-                <a:solidFill>
-                  <a:srgbClr val="FFFFFF"/>
-                </a:solidFill>
-                <a:latin typeface="Arial"/>
-              </a:rPr>
-              <a:t>Live Demo</a:t>
-            </a:r>
-            <a:endParaRPr/>
-          </a:p>
-        </p:txBody>
-      </p:sp>
-      <p:sp>
-        <p:nvSpPr>
-          <p:cNvPr id="272" name="CustomShape 10"/>
-          <p:cNvSpPr/>
-          <p:nvPr/>
-        </p:nvSpPr>
-        <p:spPr>
-          <a:xfrm>
-            <a:off x="889920" y="4028400"/>
-            <a:ext cx="596520" cy="596520"/>
-          </a:xfrm>
-          <a:prstGeom prst="ellipse">
-            <a:avLst/>
-          </a:prstGeom>
-          <a:solidFill>
-            <a:srgbClr val="FFFFFF"/>
-          </a:solidFill>
-          <a:ln w="25560">
-            <a:solidFill>
-              <a:srgbClr val="005AA9"/>
-            </a:solidFill>
-            <a:round/>
-          </a:ln>
-        </p:spPr>
-      </p:sp>
-      <p:sp>
-        <p:nvSpPr>
-          <p:cNvPr id="273" name="CustomShape 11"/>
-          <p:cNvSpPr/>
-          <p:nvPr/>
-        </p:nvSpPr>
-        <p:spPr>
-          <a:xfrm>
-            <a:off x="1008720" y="4804560"/>
-            <a:ext cx="5732280" cy="477360"/>
-          </a:xfrm>
-          <a:prstGeom prst="rect">
-            <a:avLst/>
-          </a:prstGeom>
-          <a:solidFill>
-            <a:schemeClr val="bg1">
-              <a:lumMod val="75000"/>
-            </a:schemeClr>
-          </a:solidFill>
-          <a:ln w="25560">
-            <a:solidFill>
-              <a:srgbClr val="FFFFFF"/>
-            </a:solidFill>
-            <a:round/>
-          </a:ln>
-        </p:spPr>
-        <p:txBody>
-          <a:bodyPr lIns="379080" tIns="65880" rIns="65880" bIns="65880" anchor="ctr"/>
-          <a:lstStyle/>
-          <a:p>
-            <a:pPr>
-              <a:lnSpc>
-                <a:spcPct val="90000"/>
-              </a:lnSpc>
-            </a:pPr>
-            <a:r>
-              <a:rPr lang="en-US" sz="2600">
-                <a:solidFill>
-                  <a:srgbClr val="FFFFFF"/>
-                </a:solidFill>
-                <a:latin typeface="Arial"/>
-              </a:rPr>
-              <a:t>Ausblick</a:t>
-            </a:r>
-            <a:endParaRPr/>
-          </a:p>
-        </p:txBody>
-      </p:sp>
-      <p:sp>
-        <p:nvSpPr>
-          <p:cNvPr id="274" name="CustomShape 12"/>
-          <p:cNvSpPr/>
-          <p:nvPr/>
-        </p:nvSpPr>
-        <p:spPr>
-          <a:xfrm>
-            <a:off x="710280" y="4744800"/>
-            <a:ext cx="596520" cy="596520"/>
-          </a:xfrm>
-          <a:prstGeom prst="ellipse">
-            <a:avLst/>
-          </a:prstGeom>
-          <a:solidFill>
-            <a:srgbClr val="FFFFFF"/>
-          </a:solidFill>
-          <a:ln w="25560">
-            <a:solidFill>
-              <a:srgbClr val="005AA9"/>
-            </a:solidFill>
-            <a:round/>
-          </a:ln>
-        </p:spPr>
-      </p:sp>
-      <p:sp>
-        <p:nvSpPr>
-          <p:cNvPr id="275" name="CustomShape 13"/>
-          <p:cNvSpPr/>
-          <p:nvPr/>
-        </p:nvSpPr>
-        <p:spPr>
-          <a:xfrm>
-            <a:off x="615960" y="5520960"/>
-            <a:ext cx="6125400" cy="477360"/>
-          </a:xfrm>
-          <a:prstGeom prst="rect">
-            <a:avLst/>
-          </a:prstGeom>
-          <a:solidFill>
-            <a:srgbClr val="005AA9"/>
-          </a:solidFill>
-          <a:ln w="25560">
-            <a:solidFill>
-              <a:srgbClr val="FFFFFF"/>
-            </a:solidFill>
-            <a:round/>
-          </a:ln>
-        </p:spPr>
-        <p:txBody>
-          <a:bodyPr lIns="379080" tIns="65880" rIns="65880" bIns="65880" anchor="ctr"/>
-          <a:lstStyle/>
-          <a:p>
-            <a:pPr>
-              <a:lnSpc>
-                <a:spcPct val="90000"/>
-              </a:lnSpc>
-            </a:pPr>
-            <a:r>
-              <a:rPr lang="en-US" sz="2600">
-                <a:solidFill>
-                  <a:srgbClr val="FFFFFF"/>
-                </a:solidFill>
-                <a:latin typeface="Arial"/>
-              </a:rPr>
-              <a:t>Diskussion</a:t>
-            </a:r>
-            <a:endParaRPr/>
-          </a:p>
-        </p:txBody>
-      </p:sp>
-      <p:sp>
-        <p:nvSpPr>
-          <p:cNvPr id="276" name="CustomShape 14"/>
-          <p:cNvSpPr/>
-          <p:nvPr/>
-        </p:nvSpPr>
-        <p:spPr>
-          <a:xfrm>
-            <a:off x="317520" y="5461200"/>
-            <a:ext cx="596520" cy="596520"/>
-          </a:xfrm>
-          <a:prstGeom prst="ellipse">
-            <a:avLst/>
-          </a:prstGeom>
-          <a:solidFill>
-            <a:srgbClr val="FFFFFF"/>
-          </a:solidFill>
-          <a:ln w="25560">
-            <a:solidFill>
-              <a:srgbClr val="005AA9"/>
-            </a:solidFill>
-            <a:round/>
-          </a:ln>
-        </p:spPr>
-      </p:sp>
+              <a:rPr lang="de-DE" dirty="0" smtClean="0">
+                <a:solidFill>
+                  <a:srgbClr val="C00000"/>
+                </a:solidFill>
+                <a:latin typeface="Arial"/>
+              </a:rPr>
+              <a:t>Mögliche Verbesserungen </a:t>
+            </a:r>
+            <a:r>
+              <a:rPr lang="de-DE" dirty="0">
+                <a:solidFill>
+                  <a:srgbClr val="C00000"/>
+                </a:solidFill>
+                <a:latin typeface="Arial"/>
+              </a:rPr>
+              <a:t>und </a:t>
+            </a:r>
+            <a:r>
+              <a:rPr lang="de-DE" dirty="0" smtClean="0">
+                <a:solidFill>
+                  <a:srgbClr val="C00000"/>
+                </a:solidFill>
+                <a:latin typeface="Arial"/>
+              </a:rPr>
+              <a:t>Erweiterungen</a:t>
+            </a:r>
+            <a:endParaRPr dirty="0"/>
+          </a:p>
+        </p:txBody>
+      </p:sp>
+      <p:pic>
+        <p:nvPicPr>
+          <p:cNvPr id="2" name="Grafik 1"/>
+          <p:cNvPicPr>
+            <a:picLocks noChangeAspect="1"/>
+          </p:cNvPicPr>
+          <p:nvPr/>
+        </p:nvPicPr>
+        <p:blipFill>
+          <a:blip r:embed="rId2" cstate="print">
+            <a:extLst>
+              <a:ext uri="{28A0092B-C50C-407E-A947-70E740481C1C}">
+                <a14:useLocalDpi xmlns:a14="http://schemas.microsoft.com/office/drawing/2010/main" val="0"/>
+              </a:ext>
+            </a:extLst>
+          </a:blip>
+          <a:stretch>
+            <a:fillRect/>
+          </a:stretch>
+        </p:blipFill>
+        <p:spPr>
+          <a:xfrm>
+            <a:off x="6876256" y="1620000"/>
+            <a:ext cx="1705372" cy="1705372"/>
+          </a:xfrm>
+          <a:prstGeom prst="rect">
+            <a:avLst/>
+          </a:prstGeom>
+        </p:spPr>
+      </p:pic>
+      <p:pic>
+        <p:nvPicPr>
+          <p:cNvPr id="3" name="Grafik 2"/>
+          <p:cNvPicPr>
+            <a:picLocks noChangeAspect="1"/>
+          </p:cNvPicPr>
+          <p:nvPr/>
+        </p:nvPicPr>
+        <p:blipFill>
+          <a:blip r:embed="rId3" cstate="print">
+            <a:extLst>
+              <a:ext uri="{28A0092B-C50C-407E-A947-70E740481C1C}">
+                <a14:useLocalDpi xmlns:a14="http://schemas.microsoft.com/office/drawing/2010/main" val="0"/>
+              </a:ext>
+            </a:extLst>
+          </a:blip>
+          <a:stretch>
+            <a:fillRect/>
+          </a:stretch>
+        </p:blipFill>
+        <p:spPr>
+          <a:xfrm>
+            <a:off x="5292080" y="4293096"/>
+            <a:ext cx="2505869" cy="1879402"/>
+          </a:xfrm>
+          <a:prstGeom prst="rect">
+            <a:avLst/>
+          </a:prstGeom>
+        </p:spPr>
+      </p:pic>
     </p:spTree>
   </p:cSld>
   <p:clrMapOvr>
@@ -8616,14 +8469,14 @@
       </p:grpSpPr>
       <p:sp>
         <p:nvSpPr>
-          <p:cNvPr id="277" name="TextShape 1"/>
+          <p:cNvPr id="263" name="TextShape 1"/>
           <p:cNvSpPr txBox="1"/>
           <p:nvPr/>
         </p:nvSpPr>
         <p:spPr>
           <a:xfrm>
             <a:off x="358920" y="488880"/>
-            <a:ext cx="6641640" cy="419400"/>
+            <a:ext cx="6641640" cy="837720"/>
           </a:xfrm>
           <a:prstGeom prst="rect">
             <a:avLst/>
@@ -8645,141 +8498,476 @@
                 </a:solidFill>
                 <a:latin typeface="Arial"/>
               </a:rPr>
-              <a:t>Diskussion</a:t>
-            </a:r>
-            <a:endParaRPr/>
-          </a:p>
-        </p:txBody>
-      </p:sp>
-      <p:sp>
-        <p:nvSpPr>
-          <p:cNvPr id="278" name="TextShape 2"/>
-          <p:cNvSpPr txBox="1"/>
-          <p:nvPr/>
-        </p:nvSpPr>
-        <p:spPr>
-          <a:xfrm>
-            <a:off x="363240" y="1012680"/>
-            <a:ext cx="7952760" cy="327600"/>
-          </a:xfrm>
-          <a:prstGeom prst="rect">
-            <a:avLst/>
-          </a:prstGeom>
-        </p:spPr>
-        <p:txBody>
-          <a:bodyPr lIns="0" tIns="0" rIns="0" bIns="0" anchor="ctr"/>
+              <a:t>Agenda</a:t>
+            </a:r>
+            <a:endParaRPr/>
+          </a:p>
+        </p:txBody>
+      </p:sp>
+      <p:sp>
+        <p:nvSpPr>
+          <p:cNvPr id="264" name="CustomShape 2"/>
+          <p:cNvSpPr/>
+          <p:nvPr/>
+        </p:nvSpPr>
+        <p:spPr>
+          <a:xfrm>
+            <a:off x="-4878000" y="915120"/>
+            <a:ext cx="6107400" cy="6107400"/>
+          </a:xfrm>
+          <a:prstGeom prst="blockArc">
+            <a:avLst>
+              <a:gd name="adj1" fmla="val 18900000"/>
+              <a:gd name="adj2" fmla="val 2700000"/>
+              <a:gd name="adj3" fmla="val 354"/>
+            </a:avLst>
+          </a:prstGeom>
+          <a:solidFill>
+            <a:srgbClr val="005AA9"/>
+          </a:solidFill>
+          <a:ln w="25560">
+            <a:solidFill>
+              <a:srgbClr val="005AA9"/>
+            </a:solidFill>
+            <a:round/>
+          </a:ln>
+        </p:spPr>
+      </p:sp>
+      <p:sp>
+        <p:nvSpPr>
+          <p:cNvPr id="265" name="CustomShape 3"/>
+          <p:cNvSpPr/>
+          <p:nvPr/>
+        </p:nvSpPr>
+        <p:spPr>
+          <a:xfrm>
+            <a:off x="615960" y="1939680"/>
+            <a:ext cx="6125400" cy="477360"/>
+          </a:xfrm>
+          <a:prstGeom prst="rect">
+            <a:avLst/>
+          </a:prstGeom>
+          <a:solidFill>
+            <a:schemeClr val="bg1">
+              <a:lumMod val="75000"/>
+            </a:schemeClr>
+          </a:solidFill>
+          <a:ln w="25560">
+            <a:solidFill>
+              <a:srgbClr val="FFFFFF"/>
+            </a:solidFill>
+            <a:round/>
+          </a:ln>
+        </p:spPr>
+        <p:txBody>
+          <a:bodyPr lIns="379080" tIns="65880" rIns="65880" bIns="65880" anchor="ctr"/>
           <a:lstStyle/>
           <a:p>
             <a:pPr>
               <a:lnSpc>
-                <a:spcPct val="100000"/>
+                <a:spcPct val="90000"/>
               </a:lnSpc>
             </a:pPr>
             <a:r>
-              <a:rPr lang="de-DE">
-                <a:solidFill>
-                  <a:srgbClr val="C00000"/>
-                </a:solidFill>
-                <a:latin typeface="Arial"/>
-              </a:rPr>
-              <a:t>Wir bedanken uns für die Aufmerksamkeit und </a:t>
-            </a:r>
-            <a:endParaRPr/>
-          </a:p>
+              <a:rPr lang="en-US" sz="2600">
+                <a:solidFill>
+                  <a:srgbClr val="FFFFFF"/>
+                </a:solidFill>
+                <a:latin typeface="Arial"/>
+              </a:rPr>
+              <a:t>Die Idee</a:t>
+            </a:r>
+            <a:endParaRPr/>
+          </a:p>
+        </p:txBody>
+      </p:sp>
+      <p:sp>
+        <p:nvSpPr>
+          <p:cNvPr id="266" name="CustomShape 4"/>
+          <p:cNvSpPr/>
+          <p:nvPr/>
+        </p:nvSpPr>
+        <p:spPr>
+          <a:xfrm>
+            <a:off x="317520" y="1879920"/>
+            <a:ext cx="596520" cy="596520"/>
+          </a:xfrm>
+          <a:prstGeom prst="ellipse">
+            <a:avLst/>
+          </a:prstGeom>
+          <a:solidFill>
+            <a:srgbClr val="FFFFFF"/>
+          </a:solidFill>
+          <a:ln w="25560">
+            <a:solidFill>
+              <a:srgbClr val="005AA9"/>
+            </a:solidFill>
+            <a:round/>
+          </a:ln>
+        </p:spPr>
+      </p:sp>
+      <p:sp>
+        <p:nvSpPr>
+          <p:cNvPr id="267" name="CustomShape 5"/>
+          <p:cNvSpPr/>
+          <p:nvPr/>
+        </p:nvSpPr>
+        <p:spPr>
+          <a:xfrm>
+            <a:off x="1008720" y="2656080"/>
+            <a:ext cx="5732280" cy="477360"/>
+          </a:xfrm>
+          <a:prstGeom prst="rect">
+            <a:avLst/>
+          </a:prstGeom>
+          <a:solidFill>
+            <a:schemeClr val="bg1">
+              <a:lumMod val="75000"/>
+            </a:schemeClr>
+          </a:solidFill>
+          <a:ln w="25560">
+            <a:solidFill>
+              <a:srgbClr val="FFFFFF"/>
+            </a:solidFill>
+            <a:round/>
+          </a:ln>
+        </p:spPr>
+        <p:txBody>
+          <a:bodyPr lIns="379080" tIns="65880" rIns="65880" bIns="65880" anchor="ctr"/>
+          <a:lstStyle/>
           <a:p>
             <a:pPr>
               <a:lnSpc>
-                <a:spcPct val="100000"/>
+                <a:spcPct val="90000"/>
               </a:lnSpc>
             </a:pPr>
             <a:r>
-              <a:rPr lang="de-DE">
-                <a:solidFill>
-                  <a:srgbClr val="C00000"/>
-                </a:solidFill>
-                <a:latin typeface="Arial"/>
-              </a:rPr>
-              <a:t>hoffen auf eine rege Diskussion</a:t>
-            </a:r>
-            <a:endParaRPr/>
-          </a:p>
-        </p:txBody>
-      </p:sp>
-      <p:pic>
-        <p:nvPicPr>
-          <p:cNvPr id="279" name="Picture 2"/>
-          <p:cNvPicPr/>
-          <p:nvPr/>
-        </p:nvPicPr>
-        <p:blipFill>
-          <a:blip r:embed="rId2"/>
-          <a:stretch>
-            <a:fillRect/>
-          </a:stretch>
-        </p:blipFill>
-        <p:spPr>
-          <a:xfrm>
-            <a:off x="228240" y="1845000"/>
-            <a:ext cx="5401080" cy="3870360"/>
-          </a:xfrm>
-          <a:prstGeom prst="rect">
-            <a:avLst/>
-          </a:prstGeom>
-          <a:ln>
-            <a:noFill/>
-          </a:ln>
-        </p:spPr>
-      </p:pic>
-      <p:sp>
-        <p:nvSpPr>
-          <p:cNvPr id="280" name="CustomShape 3"/>
+              <a:rPr lang="en-US" sz="2600">
+                <a:solidFill>
+                  <a:srgbClr val="FFFFFF"/>
+                </a:solidFill>
+                <a:latin typeface="Arial"/>
+              </a:rPr>
+              <a:t>Realisierung</a:t>
+            </a:r>
+            <a:endParaRPr/>
+          </a:p>
+        </p:txBody>
+      </p:sp>
+      <p:sp>
+        <p:nvSpPr>
+          <p:cNvPr id="268" name="CustomShape 6"/>
           <p:cNvSpPr/>
           <p:nvPr/>
         </p:nvSpPr>
         <p:spPr>
           <a:xfrm>
-            <a:off x="5954400" y="1989000"/>
-            <a:ext cx="2944800" cy="639000"/>
-          </a:xfrm>
-          <a:prstGeom prst="rect">
-            <a:avLst/>
-          </a:prstGeom>
-          <a:noFill/>
-          <a:ln>
-            <a:noFill/>
-          </a:ln>
-        </p:spPr>
-        <p:txBody>
-          <a:bodyPr wrap="none" lIns="90000" tIns="45000" rIns="90000" bIns="45000"/>
+            <a:off x="710280" y="2596320"/>
+            <a:ext cx="596520" cy="596520"/>
+          </a:xfrm>
+          <a:prstGeom prst="ellipse">
+            <a:avLst/>
+          </a:prstGeom>
+          <a:solidFill>
+            <a:srgbClr val="FFFFFF"/>
+          </a:solidFill>
+          <a:ln w="25560">
+            <a:solidFill>
+              <a:srgbClr val="005AA9"/>
+            </a:solidFill>
+            <a:round/>
+          </a:ln>
+        </p:spPr>
+      </p:sp>
+      <p:sp>
+        <p:nvSpPr>
+          <p:cNvPr id="269" name="CustomShape 7"/>
+          <p:cNvSpPr/>
+          <p:nvPr/>
+        </p:nvSpPr>
+        <p:spPr>
+          <a:xfrm>
+            <a:off x="1188360" y="3372480"/>
+            <a:ext cx="5552640" cy="477360"/>
+          </a:xfrm>
+          <a:prstGeom prst="rect">
+            <a:avLst/>
+          </a:prstGeom>
+          <a:solidFill>
+            <a:schemeClr val="bg1">
+              <a:lumMod val="75000"/>
+            </a:schemeClr>
+          </a:solidFill>
+          <a:ln w="25560">
+            <a:solidFill>
+              <a:srgbClr val="FFFFFF"/>
+            </a:solidFill>
+            <a:round/>
+          </a:ln>
+        </p:spPr>
+        <p:txBody>
+          <a:bodyPr lIns="379080" tIns="65880" rIns="65880" bIns="65880" anchor="ctr"/>
           <a:lstStyle/>
           <a:p>
             <a:pPr>
               <a:lnSpc>
-                <a:spcPct val="100000"/>
+                <a:spcPct val="90000"/>
               </a:lnSpc>
-              <a:buFont typeface="Wingdings" charset="2"/>
-              <a:buChar char=""/>
-            </a:pPr>
-            <a:r>
-              <a:rPr lang="en-US" b="1">
-                <a:solidFill>
-                  <a:srgbClr val="000000"/>
-                </a:solidFill>
-                <a:latin typeface="Arial"/>
-              </a:rPr>
-              <a:t>10 Minuten Diskussion</a:t>
-            </a:r>
-            <a:endParaRPr/>
-          </a:p>
+            </a:pPr>
+            <a:r>
+              <a:rPr lang="en-US" sz="2600">
+                <a:solidFill>
+                  <a:srgbClr val="FFFFFF"/>
+                </a:solidFill>
+                <a:latin typeface="Arial"/>
+              </a:rPr>
+              <a:t>Efficiency-Scoring</a:t>
+            </a:r>
+            <a:endParaRPr/>
+          </a:p>
+        </p:txBody>
+      </p:sp>
+      <p:sp>
+        <p:nvSpPr>
+          <p:cNvPr id="270" name="CustomShape 8"/>
+          <p:cNvSpPr/>
+          <p:nvPr/>
+        </p:nvSpPr>
+        <p:spPr>
+          <a:xfrm>
+            <a:off x="889920" y="3312720"/>
+            <a:ext cx="596520" cy="596520"/>
+          </a:xfrm>
+          <a:prstGeom prst="ellipse">
+            <a:avLst/>
+          </a:prstGeom>
+          <a:solidFill>
+            <a:srgbClr val="FFFFFF"/>
+          </a:solidFill>
+          <a:ln w="25560">
+            <a:solidFill>
+              <a:srgbClr val="005AA9"/>
+            </a:solidFill>
+            <a:round/>
+          </a:ln>
+        </p:spPr>
+      </p:sp>
+      <p:sp>
+        <p:nvSpPr>
+          <p:cNvPr id="271" name="CustomShape 9"/>
+          <p:cNvSpPr/>
+          <p:nvPr/>
+        </p:nvSpPr>
+        <p:spPr>
+          <a:xfrm>
+            <a:off x="1188360" y="4088160"/>
+            <a:ext cx="5552640" cy="477360"/>
+          </a:xfrm>
+          <a:prstGeom prst="rect">
+            <a:avLst/>
+          </a:prstGeom>
+          <a:solidFill>
+            <a:schemeClr val="bg1">
+              <a:lumMod val="75000"/>
+            </a:schemeClr>
+          </a:solidFill>
+          <a:ln w="25560">
+            <a:solidFill>
+              <a:srgbClr val="FFFFFF"/>
+            </a:solidFill>
+            <a:round/>
+          </a:ln>
+        </p:spPr>
+        <p:txBody>
+          <a:bodyPr lIns="379080" tIns="65880" rIns="65880" bIns="65880" anchor="ctr"/>
+          <a:lstStyle/>
           <a:p>
             <a:pPr>
               <a:lnSpc>
-                <a:spcPct val="100000"/>
+                <a:spcPct val="90000"/>
               </a:lnSpc>
             </a:pPr>
-            <a:endParaRPr/>
-          </a:p>
-        </p:txBody>
+            <a:r>
+              <a:rPr lang="en-US" sz="2600">
+                <a:solidFill>
+                  <a:srgbClr val="FFFFFF"/>
+                </a:solidFill>
+                <a:latin typeface="Arial"/>
+              </a:rPr>
+              <a:t>Live Demo</a:t>
+            </a:r>
+            <a:endParaRPr/>
+          </a:p>
+        </p:txBody>
+      </p:sp>
+      <p:sp>
+        <p:nvSpPr>
+          <p:cNvPr id="272" name="CustomShape 10"/>
+          <p:cNvSpPr/>
+          <p:nvPr/>
+        </p:nvSpPr>
+        <p:spPr>
+          <a:xfrm>
+            <a:off x="889920" y="4028400"/>
+            <a:ext cx="596520" cy="596520"/>
+          </a:xfrm>
+          <a:prstGeom prst="ellipse">
+            <a:avLst/>
+          </a:prstGeom>
+          <a:solidFill>
+            <a:srgbClr val="FFFFFF"/>
+          </a:solidFill>
+          <a:ln w="25560">
+            <a:solidFill>
+              <a:srgbClr val="005AA9"/>
+            </a:solidFill>
+            <a:round/>
+          </a:ln>
+        </p:spPr>
+      </p:sp>
+      <p:sp>
+        <p:nvSpPr>
+          <p:cNvPr id="273" name="CustomShape 11"/>
+          <p:cNvSpPr/>
+          <p:nvPr/>
+        </p:nvSpPr>
+        <p:spPr>
+          <a:xfrm>
+            <a:off x="1008720" y="4804560"/>
+            <a:ext cx="5732280" cy="477360"/>
+          </a:xfrm>
+          <a:prstGeom prst="rect">
+            <a:avLst/>
+          </a:prstGeom>
+          <a:solidFill>
+            <a:schemeClr val="bg1">
+              <a:lumMod val="75000"/>
+            </a:schemeClr>
+          </a:solidFill>
+          <a:ln w="25560">
+            <a:solidFill>
+              <a:srgbClr val="FFFFFF"/>
+            </a:solidFill>
+            <a:round/>
+          </a:ln>
+        </p:spPr>
+        <p:txBody>
+          <a:bodyPr lIns="379080" tIns="65880" rIns="65880" bIns="65880" anchor="ctr"/>
+          <a:lstStyle/>
+          <a:p>
+            <a:pPr>
+              <a:lnSpc>
+                <a:spcPct val="90000"/>
+              </a:lnSpc>
+            </a:pPr>
+            <a:r>
+              <a:rPr lang="en-US" sz="2600">
+                <a:solidFill>
+                  <a:srgbClr val="FFFFFF"/>
+                </a:solidFill>
+                <a:latin typeface="Arial"/>
+              </a:rPr>
+              <a:t>Ausblick</a:t>
+            </a:r>
+            <a:endParaRPr/>
+          </a:p>
+        </p:txBody>
+      </p:sp>
+      <p:sp>
+        <p:nvSpPr>
+          <p:cNvPr id="274" name="CustomShape 12"/>
+          <p:cNvSpPr/>
+          <p:nvPr/>
+        </p:nvSpPr>
+        <p:spPr>
+          <a:xfrm>
+            <a:off x="710280" y="4744800"/>
+            <a:ext cx="596520" cy="596520"/>
+          </a:xfrm>
+          <a:prstGeom prst="ellipse">
+            <a:avLst/>
+          </a:prstGeom>
+          <a:solidFill>
+            <a:srgbClr val="FFFFFF"/>
+          </a:solidFill>
+          <a:ln w="25560">
+            <a:solidFill>
+              <a:srgbClr val="005AA9"/>
+            </a:solidFill>
+            <a:round/>
+          </a:ln>
+        </p:spPr>
+      </p:sp>
+      <p:sp>
+        <p:nvSpPr>
+          <p:cNvPr id="275" name="CustomShape 13"/>
+          <p:cNvSpPr/>
+          <p:nvPr/>
+        </p:nvSpPr>
+        <p:spPr>
+          <a:xfrm>
+            <a:off x="615960" y="5520960"/>
+            <a:ext cx="6125400" cy="477360"/>
+          </a:xfrm>
+          <a:prstGeom prst="rect">
+            <a:avLst/>
+          </a:prstGeom>
+          <a:solidFill>
+            <a:srgbClr val="005AA9"/>
+          </a:solidFill>
+          <a:ln w="25560">
+            <a:solidFill>
+              <a:srgbClr val="FFFFFF"/>
+            </a:solidFill>
+            <a:round/>
+          </a:ln>
+        </p:spPr>
+        <p:txBody>
+          <a:bodyPr lIns="379080" tIns="65880" rIns="65880" bIns="65880" anchor="ctr"/>
+          <a:lstStyle/>
+          <a:p>
+            <a:pPr>
+              <a:lnSpc>
+                <a:spcPct val="90000"/>
+              </a:lnSpc>
+            </a:pPr>
+            <a:r>
+              <a:rPr lang="en-US" sz="2600">
+                <a:solidFill>
+                  <a:srgbClr val="FFFFFF"/>
+                </a:solidFill>
+                <a:latin typeface="Arial"/>
+              </a:rPr>
+              <a:t>Diskussion</a:t>
+            </a:r>
+            <a:endParaRPr/>
+          </a:p>
+        </p:txBody>
+      </p:sp>
+      <p:sp>
+        <p:nvSpPr>
+          <p:cNvPr id="276" name="CustomShape 14"/>
+          <p:cNvSpPr/>
+          <p:nvPr/>
+        </p:nvSpPr>
+        <p:spPr>
+          <a:xfrm>
+            <a:off x="317520" y="5461200"/>
+            <a:ext cx="596520" cy="596520"/>
+          </a:xfrm>
+          <a:prstGeom prst="ellipse">
+            <a:avLst/>
+          </a:prstGeom>
+          <a:solidFill>
+            <a:srgbClr val="FFFFFF"/>
+          </a:solidFill>
+          <a:ln w="25560">
+            <a:solidFill>
+              <a:srgbClr val="005AA9"/>
+            </a:solidFill>
+            <a:round/>
+          </a:ln>
+        </p:spPr>
       </p:sp>
     </p:spTree>
   </p:cSld>
@@ -8817,6 +9005,174 @@
 </file>
 
 <file path=ppt/slides/slide17.xml><?xml version="1.0" encoding="utf-8"?>
+<p:sld xmlns:a="http://schemas.openxmlformats.org/drawingml/2006/main" xmlns:r="http://schemas.openxmlformats.org/officeDocument/2006/relationships" xmlns:p="http://schemas.openxmlformats.org/presentationml/2006/main">
+  <p:cSld>
+    <p:spTree>
+      <p:nvGrpSpPr>
+        <p:cNvPr id="1" name=""/>
+        <p:cNvGrpSpPr/>
+        <p:nvPr/>
+      </p:nvGrpSpPr>
+      <p:grpSpPr>
+        <a:xfrm>
+          <a:off x="0" y="0"/>
+          <a:ext cx="0" cy="0"/>
+          <a:chOff x="0" y="0"/>
+          <a:chExt cx="0" cy="0"/>
+        </a:xfrm>
+      </p:grpSpPr>
+      <p:sp>
+        <p:nvSpPr>
+          <p:cNvPr id="277" name="TextShape 1"/>
+          <p:cNvSpPr txBox="1"/>
+          <p:nvPr/>
+        </p:nvSpPr>
+        <p:spPr>
+          <a:xfrm>
+            <a:off x="358920" y="488880"/>
+            <a:ext cx="6641640" cy="419400"/>
+          </a:xfrm>
+          <a:prstGeom prst="rect">
+            <a:avLst/>
+          </a:prstGeom>
+        </p:spPr>
+        <p:txBody>
+          <a:bodyPr lIns="0" tIns="0" rIns="0" bIns="0" anchor="ctr"/>
+          <a:lstStyle/>
+          <a:p>
+            <a:pPr>
+              <a:lnSpc>
+                <a:spcPct val="100000"/>
+              </a:lnSpc>
+            </a:pPr>
+            <a:r>
+              <a:rPr lang="de-DE" sz="2400" b="1">
+                <a:solidFill>
+                  <a:srgbClr val="005AA9"/>
+                </a:solidFill>
+                <a:latin typeface="Arial"/>
+              </a:rPr>
+              <a:t>Diskussion</a:t>
+            </a:r>
+            <a:endParaRPr/>
+          </a:p>
+        </p:txBody>
+      </p:sp>
+      <p:sp>
+        <p:nvSpPr>
+          <p:cNvPr id="278" name="TextShape 2"/>
+          <p:cNvSpPr txBox="1"/>
+          <p:nvPr/>
+        </p:nvSpPr>
+        <p:spPr>
+          <a:xfrm>
+            <a:off x="363240" y="1012680"/>
+            <a:ext cx="7952760" cy="327600"/>
+          </a:xfrm>
+          <a:prstGeom prst="rect">
+            <a:avLst/>
+          </a:prstGeom>
+        </p:spPr>
+        <p:txBody>
+          <a:bodyPr lIns="0" tIns="0" rIns="0" bIns="0" anchor="ctr"/>
+          <a:lstStyle/>
+          <a:p>
+            <a:pPr>
+              <a:lnSpc>
+                <a:spcPct val="100000"/>
+              </a:lnSpc>
+            </a:pPr>
+            <a:r>
+              <a:rPr lang="de-DE">
+                <a:solidFill>
+                  <a:srgbClr val="C00000"/>
+                </a:solidFill>
+                <a:latin typeface="Arial"/>
+              </a:rPr>
+              <a:t>Wir bedanken uns für die Aufmerksamkeit und </a:t>
+            </a:r>
+            <a:endParaRPr/>
+          </a:p>
+          <a:p>
+            <a:pPr>
+              <a:lnSpc>
+                <a:spcPct val="100000"/>
+              </a:lnSpc>
+            </a:pPr>
+            <a:r>
+              <a:rPr lang="de-DE">
+                <a:solidFill>
+                  <a:srgbClr val="C00000"/>
+                </a:solidFill>
+                <a:latin typeface="Arial"/>
+              </a:rPr>
+              <a:t>hoffen auf eine rege Diskussion</a:t>
+            </a:r>
+            <a:endParaRPr/>
+          </a:p>
+        </p:txBody>
+      </p:sp>
+      <p:pic>
+        <p:nvPicPr>
+          <p:cNvPr id="279" name="Picture 2"/>
+          <p:cNvPicPr/>
+          <p:nvPr/>
+        </p:nvPicPr>
+        <p:blipFill>
+          <a:blip r:embed="rId2"/>
+          <a:stretch>
+            <a:fillRect/>
+          </a:stretch>
+        </p:blipFill>
+        <p:spPr>
+          <a:xfrm>
+            <a:off x="1475656" y="1845000"/>
+            <a:ext cx="6215968" cy="3870360"/>
+          </a:xfrm>
+          <a:prstGeom prst="rect">
+            <a:avLst/>
+          </a:prstGeom>
+          <a:ln>
+            <a:noFill/>
+          </a:ln>
+        </p:spPr>
+      </p:pic>
+    </p:spTree>
+  </p:cSld>
+  <p:clrMapOvr>
+    <a:masterClrMapping/>
+  </p:clrMapOvr>
+  <p:timing>
+    <p:tnLst>
+      <p:par>
+        <p:cTn id="1" dur="indefinite" restart="never" nodeType="tmRoot">
+          <p:childTnLst>
+            <p:seq>
+              <p:cTn id="2" nodeType="mainSeq"/>
+              <p:prevCondLst>
+                <p:cond evt="onPrev" delay="0">
+                  <p:tgtEl>
+                    <p:sldTgt/>
+                  </p:tgtEl>
+                </p:cond>
+              </p:prevCondLst>
+              <p:nextCondLst>
+                <p:cond evt="onNext" delay="0">
+                  <p:tgtEl>
+                    <p:sldTgt/>
+                  </p:tgtEl>
+                </p:cond>
+              </p:nextCondLst>
+            </p:seq>
+          </p:childTnLst>
+        </p:cTn>
+      </p:par>
+    </p:tnLst>
+  </p:timing>
+</p:sld>
+</file>
+
+<file path=ppt/slides/slide18.xml><?xml version="1.0" encoding="utf-8"?>
 <p:sld xmlns:a="http://schemas.openxmlformats.org/drawingml/2006/main" xmlns:r="http://schemas.openxmlformats.org/officeDocument/2006/relationships" xmlns:p="http://schemas.openxmlformats.org/presentationml/2006/main">
   <p:cSld>
     <p:spTree>
@@ -10571,16 +10927,7 @@
                 </a:solidFill>
                 <a:latin typeface="Arial"/>
               </a:rPr>
-              <a:t>Unternehmen können dur</a:t>
-            </a:r>
-            <a:r>
-              <a:rPr lang="de-DE" dirty="0" smtClean="0">
-                <a:solidFill>
-                  <a:srgbClr val="000000"/>
-                </a:solidFill>
-                <a:latin typeface="Arial"/>
-              </a:rPr>
-              <a:t>ch die effiziente und sichere Fahrweise der Mitarbeiter Geld sparen (Abnutzungskosten, Reparaturkosten, Kraftstoff, etc.)</a:t>
+              <a:t>Unternehmen können durch die effiziente und sichere Fahrweise der Mitarbeiter Geld sparen (Abnutzungskosten, Reparaturkosten, Kraftstoff, etc.)</a:t>
             </a:r>
           </a:p>
           <a:p>
@@ -11426,7 +11773,7 @@
           <a:lstStyle/>
           <a:p>
             <a:pPr marL="342900" indent="-342900">
-              <a:buSzPct val="45000"/>
+              <a:buSzPct val="100000"/>
               <a:buFont typeface="Wingdings" panose="05000000000000000000" pitchFamily="2" charset="2"/>
               <a:buChar char="§"/>
             </a:pPr>
@@ -11508,7 +11855,7 @@
           </a:p>
           <a:p>
             <a:pPr marL="342900" indent="-342900">
-              <a:buSzPct val="45000"/>
+              <a:buSzPct val="100000"/>
               <a:buFont typeface="Wingdings" panose="05000000000000000000" pitchFamily="2" charset="2"/>
               <a:buChar char="§"/>
             </a:pPr>
@@ -11742,7 +12089,7 @@
           <a:lstStyle/>
           <a:p>
             <a:pPr marL="342900" indent="-342900">
-              <a:buSzPct val="45000"/>
+              <a:buSzPct val="100000"/>
               <a:buFont typeface="Wingdings" panose="05000000000000000000" pitchFamily="2" charset="2"/>
               <a:buChar char="§"/>
             </a:pPr>
@@ -11838,7 +12185,7 @@
           </a:p>
           <a:p>
             <a:pPr marL="342900" indent="-342900">
-              <a:buSzPct val="45000"/>
+              <a:buSzPct val="100000"/>
               <a:buFont typeface="Wingdings" panose="05000000000000000000" pitchFamily="2" charset="2"/>
               <a:buChar char="§"/>
             </a:pPr>
@@ -11849,7 +12196,16 @@
                 </a:solidFill>
                 <a:latin typeface="Arial"/>
               </a:rPr>
-              <a:t>Data Management (Cache</a:t>
+              <a:t>Data </a:t>
+            </a:r>
+            <a:r>
+              <a:rPr lang="de-DE" sz="2000" dirty="0">
+                <a:solidFill>
+                  <a:srgbClr val="000000"/>
+                </a:solidFill>
+                <a:latin typeface="Arial"/>
+              </a:rPr>
+              <a:t>Management (Cache</a:t>
             </a:r>
             <a:r>
               <a:rPr lang="de-DE" sz="2000" dirty="0" smtClean="0">
@@ -11944,7 +12300,7 @@
           </a:p>
           <a:p>
             <a:pPr marL="342900" indent="-342900">
-              <a:buSzPct val="45000"/>
+              <a:buSzPct val="100000"/>
               <a:buFont typeface="Wingdings" panose="05000000000000000000" pitchFamily="2" charset="2"/>
               <a:buChar char="§"/>
             </a:pPr>
@@ -12215,7 +12571,7 @@
           <a:lstStyle/>
           <a:p>
             <a:pPr marL="342900" indent="-342900">
-              <a:buSzPct val="45000"/>
+              <a:buSzPct val="100000"/>
               <a:buFont typeface="Wingdings" panose="05000000000000000000" pitchFamily="2" charset="2"/>
               <a:buChar char="§"/>
             </a:pPr>
@@ -12455,7 +12811,7 @@
           <a:lstStyle/>
           <a:p>
             <a:pPr marL="342900" indent="-342900">
-              <a:buSzPct val="45000"/>
+              <a:buSzPct val="100000"/>
               <a:buFont typeface="Wingdings" panose="05000000000000000000" pitchFamily="2" charset="2"/>
               <a:buChar char="§"/>
             </a:pPr>

</xml_diff>

<commit_message>
präsi angepasst details zeigt nur auch number of trips an
Signed-off-by: younGi <k.younghwan18@googlemail.com>
</commit_message>
<xml_diff>
--- a/Big Data - Driving Competition.pptx
+++ b/Big Data - Driving Competition.pptx
@@ -12196,16 +12196,7 @@
                 </a:solidFill>
                 <a:latin typeface="Arial"/>
               </a:rPr>
-              <a:t>Data </a:t>
-            </a:r>
-            <a:r>
-              <a:rPr lang="de-DE" sz="2000" dirty="0">
-                <a:solidFill>
-                  <a:srgbClr val="000000"/>
-                </a:solidFill>
-                <a:latin typeface="Arial"/>
-              </a:rPr>
-              <a:t>Management (Cache</a:t>
+              <a:t>Data Management (Cache</a:t>
             </a:r>
             <a:r>
               <a:rPr lang="de-DE" sz="2000" dirty="0" smtClean="0">

</xml_diff>

<commit_message>
some update Signed-off-by: younGi <k.younghwan18@googlemail.com>
</commit_message>
<xml_diff>
--- a/Big Data - Driving Competition.pptx
+++ b/Big Data - Driving Competition.pptx
@@ -6570,6 +6570,10 @@
               <a:rPr lang="de-DE" dirty="0" err="1" smtClean="0"/>
               <a:t>kmh</a:t>
             </a:r>
+            <a:r>
+              <a:rPr lang="de-DE" dirty="0" smtClean="0"/>
+              <a:t> &gt;130</a:t>
+            </a:r>
             <a:endParaRPr lang="de-DE" dirty="0" smtClean="0"/>
           </a:p>
           <a:p>
@@ -6591,9 +6595,14 @@
               <a:t>minute</a:t>
             </a:r>
             <a:r>
-              <a:rPr lang="de-DE" dirty="0" smtClean="0"/>
-              <a:t>: RPM</a:t>
-            </a:r>
+              <a:rPr lang="de-DE" smtClean="0"/>
+              <a:t>: </a:t>
+            </a:r>
+            <a:r>
+              <a:rPr lang="de-DE" smtClean="0"/>
+              <a:t>RPM &lt;2500</a:t>
+            </a:r>
+            <a:endParaRPr lang="de-DE" dirty="0" smtClean="0"/>
           </a:p>
           <a:p>
             <a:pPr>

</xml_diff>

<commit_message>
präsi fast final Signed-off-by: younGi <k.younghwan18@googlemail.com>
</commit_message>
<xml_diff>
--- a/Big Data - Driving Competition.pptx
+++ b/Big Data - Driving Competition.pptx
@@ -17,7 +17,7 @@
     <p:sldId id="263" r:id="rId11"/>
     <p:sldId id="264" r:id="rId12"/>
     <p:sldId id="265" r:id="rId13"/>
-    <p:sldId id="273" r:id="rId14"/>
+    <p:sldId id="274" r:id="rId14"/>
     <p:sldId id="266" r:id="rId15"/>
     <p:sldId id="267" r:id="rId16"/>
     <p:sldId id="268" r:id="rId17"/>
@@ -142,6 +142,2552 @@
 </p:presentation>
 </file>
 
+<file path=ppt/diagrams/colors1.xml><?xml version="1.0" encoding="utf-8"?>
+<dgm:colorsDef xmlns:dgm="http://schemas.openxmlformats.org/drawingml/2006/diagram" xmlns:a="http://schemas.openxmlformats.org/drawingml/2006/main" uniqueId="urn:microsoft.com/office/officeart/2005/8/colors/accent1_2">
+  <dgm:title val=""/>
+  <dgm:desc val=""/>
+  <dgm:catLst>
+    <dgm:cat type="accent1" pri="11200"/>
+  </dgm:catLst>
+  <dgm:styleLbl name="node0">
+    <dgm:fillClrLst meth="repeat">
+      <a:schemeClr val="accent1"/>
+    </dgm:fillClrLst>
+    <dgm:linClrLst meth="repeat">
+      <a:schemeClr val="lt1"/>
+    </dgm:linClrLst>
+    <dgm:effectClrLst/>
+    <dgm:txLinClrLst/>
+    <dgm:txFillClrLst/>
+    <dgm:txEffectClrLst/>
+  </dgm:styleLbl>
+  <dgm:styleLbl name="alignNode1">
+    <dgm:fillClrLst meth="repeat">
+      <a:schemeClr val="accent1"/>
+    </dgm:fillClrLst>
+    <dgm:linClrLst meth="repeat">
+      <a:schemeClr val="accent1"/>
+    </dgm:linClrLst>
+    <dgm:effectClrLst/>
+    <dgm:txLinClrLst/>
+    <dgm:txFillClrLst/>
+    <dgm:txEffectClrLst/>
+  </dgm:styleLbl>
+  <dgm:styleLbl name="node1">
+    <dgm:fillClrLst meth="repeat">
+      <a:schemeClr val="accent1"/>
+    </dgm:fillClrLst>
+    <dgm:linClrLst meth="repeat">
+      <a:schemeClr val="lt1"/>
+    </dgm:linClrLst>
+    <dgm:effectClrLst/>
+    <dgm:txLinClrLst/>
+    <dgm:txFillClrLst/>
+    <dgm:txEffectClrLst/>
+  </dgm:styleLbl>
+  <dgm:styleLbl name="lnNode1">
+    <dgm:fillClrLst meth="repeat">
+      <a:schemeClr val="accent1"/>
+    </dgm:fillClrLst>
+    <dgm:linClrLst meth="repeat">
+      <a:schemeClr val="lt1"/>
+    </dgm:linClrLst>
+    <dgm:effectClrLst/>
+    <dgm:txLinClrLst/>
+    <dgm:txFillClrLst/>
+    <dgm:txEffectClrLst/>
+  </dgm:styleLbl>
+  <dgm:styleLbl name="vennNode1">
+    <dgm:fillClrLst meth="repeat">
+      <a:schemeClr val="accent1">
+        <a:alpha val="50000"/>
+      </a:schemeClr>
+    </dgm:fillClrLst>
+    <dgm:linClrLst meth="repeat">
+      <a:schemeClr val="lt1"/>
+    </dgm:linClrLst>
+    <dgm:effectClrLst/>
+    <dgm:txLinClrLst/>
+    <dgm:txFillClrLst/>
+    <dgm:txEffectClrLst/>
+  </dgm:styleLbl>
+  <dgm:styleLbl name="node2">
+    <dgm:fillClrLst meth="repeat">
+      <a:schemeClr val="accent1"/>
+    </dgm:fillClrLst>
+    <dgm:linClrLst meth="repeat">
+      <a:schemeClr val="lt1"/>
+    </dgm:linClrLst>
+    <dgm:effectClrLst/>
+    <dgm:txLinClrLst/>
+    <dgm:txFillClrLst/>
+    <dgm:txEffectClrLst/>
+  </dgm:styleLbl>
+  <dgm:styleLbl name="node3">
+    <dgm:fillClrLst meth="repeat">
+      <a:schemeClr val="accent1"/>
+    </dgm:fillClrLst>
+    <dgm:linClrLst meth="repeat">
+      <a:schemeClr val="lt1"/>
+    </dgm:linClrLst>
+    <dgm:effectClrLst/>
+    <dgm:txLinClrLst/>
+    <dgm:txFillClrLst/>
+    <dgm:txEffectClrLst/>
+  </dgm:styleLbl>
+  <dgm:styleLbl name="node4">
+    <dgm:fillClrLst meth="repeat">
+      <a:schemeClr val="accent1"/>
+    </dgm:fillClrLst>
+    <dgm:linClrLst meth="repeat">
+      <a:schemeClr val="lt1"/>
+    </dgm:linClrLst>
+    <dgm:effectClrLst/>
+    <dgm:txLinClrLst/>
+    <dgm:txFillClrLst/>
+    <dgm:txEffectClrLst/>
+  </dgm:styleLbl>
+  <dgm:styleLbl name="fgImgPlace1">
+    <dgm:fillClrLst meth="repeat">
+      <a:schemeClr val="accent1">
+        <a:tint val="50000"/>
+      </a:schemeClr>
+    </dgm:fillClrLst>
+    <dgm:linClrLst meth="repeat">
+      <a:schemeClr val="lt1"/>
+    </dgm:linClrLst>
+    <dgm:effectClrLst/>
+    <dgm:txLinClrLst/>
+    <dgm:txFillClrLst meth="repeat">
+      <a:schemeClr val="lt1"/>
+    </dgm:txFillClrLst>
+    <dgm:txEffectClrLst/>
+  </dgm:styleLbl>
+  <dgm:styleLbl name="alignImgPlace1">
+    <dgm:fillClrLst meth="repeat">
+      <a:schemeClr val="accent1">
+        <a:tint val="50000"/>
+      </a:schemeClr>
+    </dgm:fillClrLst>
+    <dgm:linClrLst meth="repeat">
+      <a:schemeClr val="lt1"/>
+    </dgm:linClrLst>
+    <dgm:effectClrLst/>
+    <dgm:txLinClrLst/>
+    <dgm:txFillClrLst meth="repeat">
+      <a:schemeClr val="lt1"/>
+    </dgm:txFillClrLst>
+    <dgm:txEffectClrLst/>
+  </dgm:styleLbl>
+  <dgm:styleLbl name="bgImgPlace1">
+    <dgm:fillClrLst meth="repeat">
+      <a:schemeClr val="accent1">
+        <a:tint val="50000"/>
+      </a:schemeClr>
+    </dgm:fillClrLst>
+    <dgm:linClrLst meth="repeat">
+      <a:schemeClr val="lt1"/>
+    </dgm:linClrLst>
+    <dgm:effectClrLst/>
+    <dgm:txLinClrLst/>
+    <dgm:txFillClrLst meth="repeat">
+      <a:schemeClr val="lt1"/>
+    </dgm:txFillClrLst>
+    <dgm:txEffectClrLst/>
+  </dgm:styleLbl>
+  <dgm:styleLbl name="sibTrans2D1">
+    <dgm:fillClrLst meth="repeat">
+      <a:schemeClr val="accent1">
+        <a:tint val="60000"/>
+      </a:schemeClr>
+    </dgm:fillClrLst>
+    <dgm:linClrLst meth="repeat">
+      <a:schemeClr val="accent1">
+        <a:tint val="60000"/>
+      </a:schemeClr>
+    </dgm:linClrLst>
+    <dgm:effectClrLst/>
+    <dgm:txLinClrLst/>
+    <dgm:txFillClrLst/>
+    <dgm:txEffectClrLst/>
+  </dgm:styleLbl>
+  <dgm:styleLbl name="fgSibTrans2D1">
+    <dgm:fillClrLst meth="repeat">
+      <a:schemeClr val="accent1">
+        <a:tint val="60000"/>
+      </a:schemeClr>
+    </dgm:fillClrLst>
+    <dgm:linClrLst meth="repeat">
+      <a:schemeClr val="accent1">
+        <a:tint val="60000"/>
+      </a:schemeClr>
+    </dgm:linClrLst>
+    <dgm:effectClrLst/>
+    <dgm:txLinClrLst/>
+    <dgm:txFillClrLst/>
+    <dgm:txEffectClrLst/>
+  </dgm:styleLbl>
+  <dgm:styleLbl name="bgSibTrans2D1">
+    <dgm:fillClrLst meth="repeat">
+      <a:schemeClr val="accent1">
+        <a:tint val="60000"/>
+      </a:schemeClr>
+    </dgm:fillClrLst>
+    <dgm:linClrLst meth="repeat">
+      <a:schemeClr val="accent1">
+        <a:tint val="60000"/>
+      </a:schemeClr>
+    </dgm:linClrLst>
+    <dgm:effectClrLst/>
+    <dgm:txLinClrLst/>
+    <dgm:txFillClrLst/>
+    <dgm:txEffectClrLst/>
+  </dgm:styleLbl>
+  <dgm:styleLbl name="sibTrans1D1">
+    <dgm:fillClrLst meth="repeat">
+      <a:schemeClr val="accent1"/>
+    </dgm:fillClrLst>
+    <dgm:linClrLst meth="repeat">
+      <a:schemeClr val="accent1"/>
+    </dgm:linClrLst>
+    <dgm:effectClrLst/>
+    <dgm:txLinClrLst/>
+    <dgm:txFillClrLst meth="repeat">
+      <a:schemeClr val="tx1"/>
+    </dgm:txFillClrLst>
+    <dgm:txEffectClrLst/>
+  </dgm:styleLbl>
+  <dgm:styleLbl name="callout">
+    <dgm:fillClrLst meth="repeat">
+      <a:schemeClr val="accent1"/>
+    </dgm:fillClrLst>
+    <dgm:linClrLst meth="repeat">
+      <a:schemeClr val="accent1">
+        <a:tint val="50000"/>
+      </a:schemeClr>
+    </dgm:linClrLst>
+    <dgm:effectClrLst/>
+    <dgm:txLinClrLst/>
+    <dgm:txFillClrLst meth="repeat">
+      <a:schemeClr val="tx1"/>
+    </dgm:txFillClrLst>
+    <dgm:txEffectClrLst/>
+  </dgm:styleLbl>
+  <dgm:styleLbl name="asst0">
+    <dgm:fillClrLst meth="repeat">
+      <a:schemeClr val="accent1"/>
+    </dgm:fillClrLst>
+    <dgm:linClrLst meth="repeat">
+      <a:schemeClr val="lt1"/>
+    </dgm:linClrLst>
+    <dgm:effectClrLst/>
+    <dgm:txLinClrLst/>
+    <dgm:txFillClrLst/>
+    <dgm:txEffectClrLst/>
+  </dgm:styleLbl>
+  <dgm:styleLbl name="asst1">
+    <dgm:fillClrLst meth="repeat">
+      <a:schemeClr val="accent1"/>
+    </dgm:fillClrLst>
+    <dgm:linClrLst meth="repeat">
+      <a:schemeClr val="lt1"/>
+    </dgm:linClrLst>
+    <dgm:effectClrLst/>
+    <dgm:txLinClrLst/>
+    <dgm:txFillClrLst/>
+    <dgm:txEffectClrLst/>
+  </dgm:styleLbl>
+  <dgm:styleLbl name="asst2">
+    <dgm:fillClrLst meth="repeat">
+      <a:schemeClr val="accent1"/>
+    </dgm:fillClrLst>
+    <dgm:linClrLst meth="repeat">
+      <a:schemeClr val="lt1"/>
+    </dgm:linClrLst>
+    <dgm:effectClrLst/>
+    <dgm:txLinClrLst/>
+    <dgm:txFillClrLst/>
+    <dgm:txEffectClrLst/>
+  </dgm:styleLbl>
+  <dgm:styleLbl name="asst3">
+    <dgm:fillClrLst meth="repeat">
+      <a:schemeClr val="accent1"/>
+    </dgm:fillClrLst>
+    <dgm:linClrLst meth="repeat">
+      <a:schemeClr val="lt1"/>
+    </dgm:linClrLst>
+    <dgm:effectClrLst/>
+    <dgm:txLinClrLst/>
+    <dgm:txFillClrLst/>
+    <dgm:txEffectClrLst/>
+  </dgm:styleLbl>
+  <dgm:styleLbl name="asst4">
+    <dgm:fillClrLst meth="repeat">
+      <a:schemeClr val="accent1"/>
+    </dgm:fillClrLst>
+    <dgm:linClrLst meth="repeat">
+      <a:schemeClr val="lt1"/>
+    </dgm:linClrLst>
+    <dgm:effectClrLst/>
+    <dgm:txLinClrLst/>
+    <dgm:txFillClrLst/>
+    <dgm:txEffectClrLst/>
+  </dgm:styleLbl>
+  <dgm:styleLbl name="parChTrans2D1">
+    <dgm:fillClrLst meth="repeat">
+      <a:schemeClr val="accent1">
+        <a:tint val="60000"/>
+      </a:schemeClr>
+    </dgm:fillClrLst>
+    <dgm:linClrLst meth="repeat">
+      <a:schemeClr val="accent1">
+        <a:tint val="60000"/>
+      </a:schemeClr>
+    </dgm:linClrLst>
+    <dgm:effectClrLst/>
+    <dgm:txLinClrLst/>
+    <dgm:txFillClrLst meth="repeat">
+      <a:schemeClr val="lt1"/>
+    </dgm:txFillClrLst>
+    <dgm:txEffectClrLst/>
+  </dgm:styleLbl>
+  <dgm:styleLbl name="parChTrans2D2">
+    <dgm:fillClrLst meth="repeat">
+      <a:schemeClr val="accent1"/>
+    </dgm:fillClrLst>
+    <dgm:linClrLst meth="repeat">
+      <a:schemeClr val="accent1"/>
+    </dgm:linClrLst>
+    <dgm:effectClrLst/>
+    <dgm:txLinClrLst/>
+    <dgm:txFillClrLst meth="repeat">
+      <a:schemeClr val="lt1"/>
+    </dgm:txFillClrLst>
+    <dgm:txEffectClrLst/>
+  </dgm:styleLbl>
+  <dgm:styleLbl name="parChTrans2D3">
+    <dgm:fillClrLst meth="repeat">
+      <a:schemeClr val="accent1"/>
+    </dgm:fillClrLst>
+    <dgm:linClrLst meth="repeat">
+      <a:schemeClr val="accent1"/>
+    </dgm:linClrLst>
+    <dgm:effectClrLst/>
+    <dgm:txLinClrLst/>
+    <dgm:txFillClrLst meth="repeat">
+      <a:schemeClr val="lt1"/>
+    </dgm:txFillClrLst>
+    <dgm:txEffectClrLst/>
+  </dgm:styleLbl>
+  <dgm:styleLbl name="parChTrans2D4">
+    <dgm:fillClrLst meth="repeat">
+      <a:schemeClr val="accent1"/>
+    </dgm:fillClrLst>
+    <dgm:linClrLst meth="repeat">
+      <a:schemeClr val="accent1"/>
+    </dgm:linClrLst>
+    <dgm:effectClrLst/>
+    <dgm:txLinClrLst/>
+    <dgm:txFillClrLst meth="repeat">
+      <a:schemeClr val="lt1"/>
+    </dgm:txFillClrLst>
+    <dgm:txEffectClrLst/>
+  </dgm:styleLbl>
+  <dgm:styleLbl name="parChTrans1D1">
+    <dgm:fillClrLst meth="repeat">
+      <a:schemeClr val="accent1"/>
+    </dgm:fillClrLst>
+    <dgm:linClrLst meth="repeat">
+      <a:schemeClr val="accent1">
+        <a:shade val="60000"/>
+      </a:schemeClr>
+    </dgm:linClrLst>
+    <dgm:effectClrLst/>
+    <dgm:txLinClrLst/>
+    <dgm:txFillClrLst meth="repeat">
+      <a:schemeClr val="tx1"/>
+    </dgm:txFillClrLst>
+    <dgm:txEffectClrLst/>
+  </dgm:styleLbl>
+  <dgm:styleLbl name="parChTrans1D2">
+    <dgm:fillClrLst meth="repeat">
+      <a:schemeClr val="accent1"/>
+    </dgm:fillClrLst>
+    <dgm:linClrLst meth="repeat">
+      <a:schemeClr val="accent1">
+        <a:shade val="60000"/>
+      </a:schemeClr>
+    </dgm:linClrLst>
+    <dgm:effectClrLst/>
+    <dgm:txLinClrLst/>
+    <dgm:txFillClrLst meth="repeat">
+      <a:schemeClr val="tx1"/>
+    </dgm:txFillClrLst>
+    <dgm:txEffectClrLst/>
+  </dgm:styleLbl>
+  <dgm:styleLbl name="parChTrans1D3">
+    <dgm:fillClrLst meth="repeat">
+      <a:schemeClr val="accent1"/>
+    </dgm:fillClrLst>
+    <dgm:linClrLst meth="repeat">
+      <a:schemeClr val="accent1">
+        <a:shade val="80000"/>
+      </a:schemeClr>
+    </dgm:linClrLst>
+    <dgm:effectClrLst/>
+    <dgm:txLinClrLst/>
+    <dgm:txFillClrLst meth="repeat">
+      <a:schemeClr val="tx1"/>
+    </dgm:txFillClrLst>
+    <dgm:txEffectClrLst/>
+  </dgm:styleLbl>
+  <dgm:styleLbl name="parChTrans1D4">
+    <dgm:fillClrLst meth="repeat">
+      <a:schemeClr val="accent1"/>
+    </dgm:fillClrLst>
+    <dgm:linClrLst meth="repeat">
+      <a:schemeClr val="accent1">
+        <a:shade val="80000"/>
+      </a:schemeClr>
+    </dgm:linClrLst>
+    <dgm:effectClrLst/>
+    <dgm:txLinClrLst/>
+    <dgm:txFillClrLst meth="repeat">
+      <a:schemeClr val="tx1"/>
+    </dgm:txFillClrLst>
+    <dgm:txEffectClrLst/>
+  </dgm:styleLbl>
+  <dgm:styleLbl name="fgAcc1">
+    <dgm:fillClrLst meth="repeat">
+      <a:schemeClr val="lt1">
+        <a:alpha val="90000"/>
+      </a:schemeClr>
+    </dgm:fillClrLst>
+    <dgm:linClrLst meth="repeat">
+      <a:schemeClr val="accent1"/>
+    </dgm:linClrLst>
+    <dgm:effectClrLst/>
+    <dgm:txLinClrLst/>
+    <dgm:txFillClrLst meth="repeat">
+      <a:schemeClr val="dk1"/>
+    </dgm:txFillClrLst>
+    <dgm:txEffectClrLst/>
+  </dgm:styleLbl>
+  <dgm:styleLbl name="conFgAcc1">
+    <dgm:fillClrLst meth="repeat">
+      <a:schemeClr val="lt1">
+        <a:alpha val="90000"/>
+      </a:schemeClr>
+    </dgm:fillClrLst>
+    <dgm:linClrLst meth="repeat">
+      <a:schemeClr val="accent1"/>
+    </dgm:linClrLst>
+    <dgm:effectClrLst/>
+    <dgm:txLinClrLst/>
+    <dgm:txFillClrLst meth="repeat">
+      <a:schemeClr val="dk1"/>
+    </dgm:txFillClrLst>
+    <dgm:txEffectClrLst/>
+  </dgm:styleLbl>
+  <dgm:styleLbl name="alignAcc1">
+    <dgm:fillClrLst meth="repeat">
+      <a:schemeClr val="lt1">
+        <a:alpha val="90000"/>
+      </a:schemeClr>
+    </dgm:fillClrLst>
+    <dgm:linClrLst meth="repeat">
+      <a:schemeClr val="accent1"/>
+    </dgm:linClrLst>
+    <dgm:effectClrLst/>
+    <dgm:txLinClrLst/>
+    <dgm:txFillClrLst meth="repeat">
+      <a:schemeClr val="dk1"/>
+    </dgm:txFillClrLst>
+    <dgm:txEffectClrLst/>
+  </dgm:styleLbl>
+  <dgm:styleLbl name="trAlignAcc1">
+    <dgm:fillClrLst meth="repeat">
+      <a:schemeClr val="lt1">
+        <a:alpha val="40000"/>
+      </a:schemeClr>
+    </dgm:fillClrLst>
+    <dgm:linClrLst meth="repeat">
+      <a:schemeClr val="accent1"/>
+    </dgm:linClrLst>
+    <dgm:effectClrLst/>
+    <dgm:txLinClrLst/>
+    <dgm:txFillClrLst meth="repeat">
+      <a:schemeClr val="dk1"/>
+    </dgm:txFillClrLst>
+    <dgm:txEffectClrLst/>
+  </dgm:styleLbl>
+  <dgm:styleLbl name="bgAcc1">
+    <dgm:fillClrLst meth="repeat">
+      <a:schemeClr val="lt1">
+        <a:alpha val="90000"/>
+      </a:schemeClr>
+    </dgm:fillClrLst>
+    <dgm:linClrLst meth="repeat">
+      <a:schemeClr val="accent1"/>
+    </dgm:linClrLst>
+    <dgm:effectClrLst/>
+    <dgm:txLinClrLst/>
+    <dgm:txFillClrLst meth="repeat">
+      <a:schemeClr val="dk1"/>
+    </dgm:txFillClrLst>
+    <dgm:txEffectClrLst/>
+  </dgm:styleLbl>
+  <dgm:styleLbl name="solidFgAcc1">
+    <dgm:fillClrLst meth="repeat">
+      <a:schemeClr val="lt1"/>
+    </dgm:fillClrLst>
+    <dgm:linClrLst meth="repeat">
+      <a:schemeClr val="accent1"/>
+    </dgm:linClrLst>
+    <dgm:effectClrLst/>
+    <dgm:txLinClrLst/>
+    <dgm:txFillClrLst meth="repeat">
+      <a:schemeClr val="dk1"/>
+    </dgm:txFillClrLst>
+    <dgm:txEffectClrLst/>
+  </dgm:styleLbl>
+  <dgm:styleLbl name="solidAlignAcc1">
+    <dgm:fillClrLst meth="repeat">
+      <a:schemeClr val="lt1"/>
+    </dgm:fillClrLst>
+    <dgm:linClrLst meth="repeat">
+      <a:schemeClr val="accent1"/>
+    </dgm:linClrLst>
+    <dgm:effectClrLst/>
+    <dgm:txLinClrLst/>
+    <dgm:txFillClrLst meth="repeat">
+      <a:schemeClr val="dk1"/>
+    </dgm:txFillClrLst>
+    <dgm:txEffectClrLst/>
+  </dgm:styleLbl>
+  <dgm:styleLbl name="solidBgAcc1">
+    <dgm:fillClrLst meth="repeat">
+      <a:schemeClr val="lt1"/>
+    </dgm:fillClrLst>
+    <dgm:linClrLst meth="repeat">
+      <a:schemeClr val="accent1"/>
+    </dgm:linClrLst>
+    <dgm:effectClrLst/>
+    <dgm:txLinClrLst/>
+    <dgm:txFillClrLst meth="repeat">
+      <a:schemeClr val="dk1"/>
+    </dgm:txFillClrLst>
+    <dgm:txEffectClrLst/>
+  </dgm:styleLbl>
+  <dgm:styleLbl name="fgAccFollowNode1">
+    <dgm:fillClrLst meth="repeat">
+      <a:schemeClr val="accent1">
+        <a:alpha val="90000"/>
+        <a:tint val="40000"/>
+      </a:schemeClr>
+    </dgm:fillClrLst>
+    <dgm:linClrLst meth="repeat">
+      <a:schemeClr val="accent1">
+        <a:alpha val="90000"/>
+        <a:tint val="40000"/>
+      </a:schemeClr>
+    </dgm:linClrLst>
+    <dgm:effectClrLst/>
+    <dgm:txLinClrLst/>
+    <dgm:txFillClrLst meth="repeat">
+      <a:schemeClr val="dk1"/>
+    </dgm:txFillClrLst>
+    <dgm:txEffectClrLst/>
+  </dgm:styleLbl>
+  <dgm:styleLbl name="alignAccFollowNode1">
+    <dgm:fillClrLst meth="repeat">
+      <a:schemeClr val="accent1">
+        <a:alpha val="90000"/>
+        <a:tint val="40000"/>
+      </a:schemeClr>
+    </dgm:fillClrLst>
+    <dgm:linClrLst meth="repeat">
+      <a:schemeClr val="accent1">
+        <a:alpha val="90000"/>
+        <a:tint val="40000"/>
+      </a:schemeClr>
+    </dgm:linClrLst>
+    <dgm:effectClrLst/>
+    <dgm:txLinClrLst/>
+    <dgm:txFillClrLst meth="repeat">
+      <a:schemeClr val="dk1"/>
+    </dgm:txFillClrLst>
+    <dgm:txEffectClrLst/>
+  </dgm:styleLbl>
+  <dgm:styleLbl name="bgAccFollowNode1">
+    <dgm:fillClrLst meth="repeat">
+      <a:schemeClr val="accent1">
+        <a:alpha val="90000"/>
+        <a:tint val="40000"/>
+      </a:schemeClr>
+    </dgm:fillClrLst>
+    <dgm:linClrLst meth="repeat">
+      <a:schemeClr val="accent1">
+        <a:alpha val="90000"/>
+        <a:tint val="40000"/>
+      </a:schemeClr>
+    </dgm:linClrLst>
+    <dgm:effectClrLst/>
+    <dgm:txLinClrLst/>
+    <dgm:txFillClrLst meth="repeat">
+      <a:schemeClr val="dk1"/>
+    </dgm:txFillClrLst>
+    <dgm:txEffectClrLst/>
+  </dgm:styleLbl>
+  <dgm:styleLbl name="fgAcc0">
+    <dgm:fillClrLst meth="repeat">
+      <a:schemeClr val="lt1">
+        <a:alpha val="90000"/>
+      </a:schemeClr>
+    </dgm:fillClrLst>
+    <dgm:linClrLst meth="repeat">
+      <a:schemeClr val="accent1"/>
+    </dgm:linClrLst>
+    <dgm:effectClrLst/>
+    <dgm:txLinClrLst/>
+    <dgm:txFillClrLst meth="repeat">
+      <a:schemeClr val="dk1"/>
+    </dgm:txFillClrLst>
+    <dgm:txEffectClrLst/>
+  </dgm:styleLbl>
+  <dgm:styleLbl name="fgAcc2">
+    <dgm:fillClrLst meth="repeat">
+      <a:schemeClr val="lt1">
+        <a:alpha val="90000"/>
+      </a:schemeClr>
+    </dgm:fillClrLst>
+    <dgm:linClrLst meth="repeat">
+      <a:schemeClr val="accent1"/>
+    </dgm:linClrLst>
+    <dgm:effectClrLst/>
+    <dgm:txLinClrLst/>
+    <dgm:txFillClrLst meth="repeat">
+      <a:schemeClr val="dk1"/>
+    </dgm:txFillClrLst>
+    <dgm:txEffectClrLst/>
+  </dgm:styleLbl>
+  <dgm:styleLbl name="fgAcc3">
+    <dgm:fillClrLst meth="repeat">
+      <a:schemeClr val="lt1">
+        <a:alpha val="90000"/>
+      </a:schemeClr>
+    </dgm:fillClrLst>
+    <dgm:linClrLst meth="repeat">
+      <a:schemeClr val="accent1"/>
+    </dgm:linClrLst>
+    <dgm:effectClrLst/>
+    <dgm:txLinClrLst/>
+    <dgm:txFillClrLst meth="repeat">
+      <a:schemeClr val="dk1"/>
+    </dgm:txFillClrLst>
+    <dgm:txEffectClrLst/>
+  </dgm:styleLbl>
+  <dgm:styleLbl name="fgAcc4">
+    <dgm:fillClrLst meth="repeat">
+      <a:schemeClr val="lt1">
+        <a:alpha val="90000"/>
+      </a:schemeClr>
+    </dgm:fillClrLst>
+    <dgm:linClrLst meth="repeat">
+      <a:schemeClr val="accent1"/>
+    </dgm:linClrLst>
+    <dgm:effectClrLst/>
+    <dgm:txLinClrLst/>
+    <dgm:txFillClrLst meth="repeat">
+      <a:schemeClr val="dk1"/>
+    </dgm:txFillClrLst>
+    <dgm:txEffectClrLst/>
+  </dgm:styleLbl>
+  <dgm:styleLbl name="bgShp">
+    <dgm:fillClrLst meth="repeat">
+      <a:schemeClr val="accent1">
+        <a:tint val="40000"/>
+      </a:schemeClr>
+    </dgm:fillClrLst>
+    <dgm:linClrLst meth="repeat">
+      <a:schemeClr val="accent1"/>
+    </dgm:linClrLst>
+    <dgm:effectClrLst/>
+    <dgm:txLinClrLst/>
+    <dgm:txFillClrLst meth="repeat">
+      <a:schemeClr val="dk1"/>
+    </dgm:txFillClrLst>
+    <dgm:txEffectClrLst/>
+  </dgm:styleLbl>
+  <dgm:styleLbl name="dkBgShp">
+    <dgm:fillClrLst meth="repeat">
+      <a:schemeClr val="accent1">
+        <a:shade val="80000"/>
+      </a:schemeClr>
+    </dgm:fillClrLst>
+    <dgm:linClrLst meth="repeat">
+      <a:schemeClr val="accent1"/>
+    </dgm:linClrLst>
+    <dgm:effectClrLst/>
+    <dgm:txLinClrLst/>
+    <dgm:txFillClrLst meth="repeat">
+      <a:schemeClr val="lt1"/>
+    </dgm:txFillClrLst>
+    <dgm:txEffectClrLst/>
+  </dgm:styleLbl>
+  <dgm:styleLbl name="trBgShp">
+    <dgm:fillClrLst meth="repeat">
+      <a:schemeClr val="accent1">
+        <a:tint val="50000"/>
+        <a:alpha val="40000"/>
+      </a:schemeClr>
+    </dgm:fillClrLst>
+    <dgm:linClrLst meth="repeat">
+      <a:schemeClr val="accent1"/>
+    </dgm:linClrLst>
+    <dgm:effectClrLst/>
+    <dgm:txLinClrLst/>
+    <dgm:txFillClrLst meth="repeat">
+      <a:schemeClr val="lt1"/>
+    </dgm:txFillClrLst>
+    <dgm:txEffectClrLst/>
+  </dgm:styleLbl>
+  <dgm:styleLbl name="fgShp">
+    <dgm:fillClrLst meth="repeat">
+      <a:schemeClr val="accent1">
+        <a:tint val="60000"/>
+      </a:schemeClr>
+    </dgm:fillClrLst>
+    <dgm:linClrLst meth="repeat">
+      <a:schemeClr val="lt1"/>
+    </dgm:linClrLst>
+    <dgm:effectClrLst/>
+    <dgm:txLinClrLst/>
+    <dgm:txFillClrLst meth="repeat">
+      <a:schemeClr val="dk1"/>
+    </dgm:txFillClrLst>
+    <dgm:txEffectClrLst/>
+  </dgm:styleLbl>
+  <dgm:styleLbl name="revTx">
+    <dgm:fillClrLst meth="repeat">
+      <a:schemeClr val="lt1">
+        <a:alpha val="0"/>
+      </a:schemeClr>
+    </dgm:fillClrLst>
+    <dgm:linClrLst meth="repeat">
+      <a:schemeClr val="dk1">
+        <a:alpha val="0"/>
+      </a:schemeClr>
+    </dgm:linClrLst>
+    <dgm:effectClrLst/>
+    <dgm:txLinClrLst/>
+    <dgm:txFillClrLst meth="repeat">
+      <a:schemeClr val="tx1"/>
+    </dgm:txFillClrLst>
+    <dgm:txEffectClrLst/>
+  </dgm:styleLbl>
+</dgm:colorsDef>
+</file>
+
+<file path=ppt/diagrams/data1.xml><?xml version="1.0" encoding="utf-8"?>
+<dgm:dataModel xmlns:dgm="http://schemas.openxmlformats.org/drawingml/2006/diagram" xmlns:a="http://schemas.openxmlformats.org/drawingml/2006/main">
+  <dgm:ptLst>
+    <dgm:pt modelId="{DFF0F86F-7D1E-478C-801F-62932B89E58A}" type="doc">
+      <dgm:prSet loTypeId="urn:microsoft.com/office/officeart/2005/8/layout/equation1" loCatId="relationship" qsTypeId="urn:microsoft.com/office/officeart/2005/8/quickstyle/simple2" qsCatId="simple" csTypeId="urn:microsoft.com/office/officeart/2005/8/colors/accent1_2" csCatId="accent1" phldr="1"/>
+      <dgm:spPr/>
+    </dgm:pt>
+    <dgm:pt modelId="{054E58BC-12D6-4E2B-91A3-F1C67D2D4E17}">
+      <dgm:prSet phldrT="[Text]"/>
+      <dgm:spPr>
+        <a:solidFill>
+          <a:schemeClr val="bg1">
+            <a:lumMod val="65000"/>
+          </a:schemeClr>
+        </a:solidFill>
+        <a:ln>
+          <a:noFill/>
+        </a:ln>
+        <a:effectLst/>
+      </dgm:spPr>
+      <dgm:t>
+        <a:bodyPr/>
+        <a:lstStyle/>
+        <a:p>
+          <a:r>
+            <a:rPr lang="de-DE" dirty="0" smtClean="0"/>
+            <a:t>Initial 100 punkte</a:t>
+          </a:r>
+          <a:endParaRPr lang="de-DE" dirty="0"/>
+        </a:p>
+      </dgm:t>
+    </dgm:pt>
+    <dgm:pt modelId="{E6E02112-BA56-44F5-9E55-5F1A520935C9}" type="parTrans" cxnId="{C6EC5F97-F95A-4B30-93FB-533762AB3FC0}">
+      <dgm:prSet/>
+      <dgm:spPr/>
+      <dgm:t>
+        <a:bodyPr/>
+        <a:lstStyle/>
+        <a:p>
+          <a:endParaRPr lang="de-DE"/>
+        </a:p>
+      </dgm:t>
+    </dgm:pt>
+    <dgm:pt modelId="{BAC9B728-7990-4C30-A6B1-CE244DECE508}" type="sibTrans" cxnId="{C6EC5F97-F95A-4B30-93FB-533762AB3FC0}">
+      <dgm:prSet/>
+      <dgm:spPr>
+        <a:solidFill>
+          <a:srgbClr val="005AA9"/>
+        </a:solidFill>
+        <a:effectLst/>
+      </dgm:spPr>
+      <dgm:t>
+        <a:bodyPr/>
+        <a:lstStyle/>
+        <a:p>
+          <a:endParaRPr lang="de-DE"/>
+        </a:p>
+      </dgm:t>
+    </dgm:pt>
+    <dgm:pt modelId="{A8F88788-D866-468D-91A1-8B6BCBB043A4}">
+      <dgm:prSet phldrT="[Text]"/>
+      <dgm:spPr>
+        <a:solidFill>
+          <a:srgbClr val="C00000"/>
+        </a:solidFill>
+        <a:ln>
+          <a:noFill/>
+        </a:ln>
+        <a:effectLst/>
+      </dgm:spPr>
+      <dgm:t>
+        <a:bodyPr/>
+        <a:lstStyle/>
+        <a:p>
+          <a:r>
+            <a:rPr lang="de-DE" dirty="0" smtClean="0"/>
+            <a:t>Malus</a:t>
+          </a:r>
+          <a:endParaRPr lang="de-DE" dirty="0"/>
+        </a:p>
+      </dgm:t>
+    </dgm:pt>
+    <dgm:pt modelId="{569EC830-5B83-42A8-A84C-3A27C588E995}" type="parTrans" cxnId="{C1110CB9-E172-482B-B9B1-26BED8849280}">
+      <dgm:prSet/>
+      <dgm:spPr/>
+      <dgm:t>
+        <a:bodyPr/>
+        <a:lstStyle/>
+        <a:p>
+          <a:endParaRPr lang="de-DE"/>
+        </a:p>
+      </dgm:t>
+    </dgm:pt>
+    <dgm:pt modelId="{204E97BE-CA48-4343-A365-DB34CC53036A}" type="sibTrans" cxnId="{C1110CB9-E172-482B-B9B1-26BED8849280}">
+      <dgm:prSet/>
+      <dgm:spPr>
+        <a:solidFill>
+          <a:srgbClr val="005AA9"/>
+        </a:solidFill>
+        <a:effectLst/>
+      </dgm:spPr>
+      <dgm:t>
+        <a:bodyPr/>
+        <a:lstStyle/>
+        <a:p>
+          <a:endParaRPr lang="de-DE"/>
+        </a:p>
+      </dgm:t>
+    </dgm:pt>
+    <dgm:pt modelId="{E0EEC773-D0AA-407E-9EB3-6D042251D7F8}">
+      <dgm:prSet phldrT="[Text]" custT="1"/>
+      <dgm:spPr>
+        <a:solidFill>
+          <a:srgbClr val="00B050"/>
+        </a:solidFill>
+        <a:ln>
+          <a:noFill/>
+        </a:ln>
+        <a:effectLst/>
+      </dgm:spPr>
+      <dgm:t>
+        <a:bodyPr/>
+        <a:lstStyle/>
+        <a:p>
+          <a:r>
+            <a:rPr lang="en-US" sz="1900" b="0" dirty="0" smtClean="0">
+              <a:solidFill>
+                <a:schemeClr val="bg1"/>
+              </a:solidFill>
+              <a:latin typeface="Arial"/>
+            </a:rPr>
+            <a:t>Score</a:t>
+          </a:r>
+          <a:endParaRPr lang="de-DE" sz="1900" b="0" dirty="0">
+            <a:solidFill>
+              <a:schemeClr val="bg1"/>
+            </a:solidFill>
+          </a:endParaRPr>
+        </a:p>
+      </dgm:t>
+    </dgm:pt>
+    <dgm:pt modelId="{90D0DBB2-26B5-434B-8891-931110E9CBC0}" type="parTrans" cxnId="{4A59002D-09D7-44E1-BCB6-23D4384E639E}">
+      <dgm:prSet/>
+      <dgm:spPr/>
+      <dgm:t>
+        <a:bodyPr/>
+        <a:lstStyle/>
+        <a:p>
+          <a:endParaRPr lang="de-DE"/>
+        </a:p>
+      </dgm:t>
+    </dgm:pt>
+    <dgm:pt modelId="{4B6F641C-B490-4350-A458-86C10FCE9E79}" type="sibTrans" cxnId="{4A59002D-09D7-44E1-BCB6-23D4384E639E}">
+      <dgm:prSet/>
+      <dgm:spPr/>
+      <dgm:t>
+        <a:bodyPr/>
+        <a:lstStyle/>
+        <a:p>
+          <a:endParaRPr lang="de-DE"/>
+        </a:p>
+      </dgm:t>
+    </dgm:pt>
+    <dgm:pt modelId="{AE3F2D00-8892-4B16-82FF-2DD4881BAEBB}" type="pres">
+      <dgm:prSet presAssocID="{DFF0F86F-7D1E-478C-801F-62932B89E58A}" presName="linearFlow" presStyleCnt="0">
+        <dgm:presLayoutVars>
+          <dgm:dir/>
+          <dgm:resizeHandles val="exact"/>
+        </dgm:presLayoutVars>
+      </dgm:prSet>
+      <dgm:spPr/>
+    </dgm:pt>
+    <dgm:pt modelId="{3DC838B9-08E7-466D-B9DE-A8F5A5B30299}" type="pres">
+      <dgm:prSet presAssocID="{054E58BC-12D6-4E2B-91A3-F1C67D2D4E17}" presName="node" presStyleLbl="node1" presStyleIdx="0" presStyleCnt="3">
+        <dgm:presLayoutVars>
+          <dgm:bulletEnabled val="1"/>
+        </dgm:presLayoutVars>
+      </dgm:prSet>
+      <dgm:spPr/>
+      <dgm:t>
+        <a:bodyPr/>
+        <a:lstStyle/>
+        <a:p>
+          <a:endParaRPr lang="de-DE"/>
+        </a:p>
+      </dgm:t>
+    </dgm:pt>
+    <dgm:pt modelId="{A8C9C045-60F8-42B7-B638-C1093FF82A0D}" type="pres">
+      <dgm:prSet presAssocID="{BAC9B728-7990-4C30-A6B1-CE244DECE508}" presName="spacerL" presStyleCnt="0"/>
+      <dgm:spPr/>
+    </dgm:pt>
+    <dgm:pt modelId="{A7C60AD3-47AA-4471-83DE-8CA3B148A92F}" type="pres">
+      <dgm:prSet presAssocID="{BAC9B728-7990-4C30-A6B1-CE244DECE508}" presName="sibTrans" presStyleLbl="sibTrans2D1" presStyleIdx="0" presStyleCnt="2"/>
+      <dgm:spPr>
+        <a:prstGeom prst="mathMinus">
+          <a:avLst/>
+        </a:prstGeom>
+      </dgm:spPr>
+    </dgm:pt>
+    <dgm:pt modelId="{B0308A6A-146E-446E-9E5D-1326921A1A64}" type="pres">
+      <dgm:prSet presAssocID="{BAC9B728-7990-4C30-A6B1-CE244DECE508}" presName="spacerR" presStyleCnt="0"/>
+      <dgm:spPr/>
+    </dgm:pt>
+    <dgm:pt modelId="{5948235F-20D2-4786-916C-A49FAE16603E}" type="pres">
+      <dgm:prSet presAssocID="{A8F88788-D866-468D-91A1-8B6BCBB043A4}" presName="node" presStyleLbl="node1" presStyleIdx="1" presStyleCnt="3">
+        <dgm:presLayoutVars>
+          <dgm:bulletEnabled val="1"/>
+        </dgm:presLayoutVars>
+      </dgm:prSet>
+      <dgm:spPr/>
+    </dgm:pt>
+    <dgm:pt modelId="{C42B23F7-D4A0-4D74-96D4-C5BAC62BC6EC}" type="pres">
+      <dgm:prSet presAssocID="{204E97BE-CA48-4343-A365-DB34CC53036A}" presName="spacerL" presStyleCnt="0"/>
+      <dgm:spPr/>
+    </dgm:pt>
+    <dgm:pt modelId="{45533062-623E-4528-B1EF-E7AE923C706F}" type="pres">
+      <dgm:prSet presAssocID="{204E97BE-CA48-4343-A365-DB34CC53036A}" presName="sibTrans" presStyleLbl="sibTrans2D1" presStyleIdx="1" presStyleCnt="2"/>
+      <dgm:spPr/>
+    </dgm:pt>
+    <dgm:pt modelId="{49C5E1DD-1832-4365-9DD6-75CFEC6F91E4}" type="pres">
+      <dgm:prSet presAssocID="{204E97BE-CA48-4343-A365-DB34CC53036A}" presName="spacerR" presStyleCnt="0"/>
+      <dgm:spPr/>
+    </dgm:pt>
+    <dgm:pt modelId="{86084EA6-E570-487D-BBBF-A6983D5F9DFA}" type="pres">
+      <dgm:prSet presAssocID="{E0EEC773-D0AA-407E-9EB3-6D042251D7F8}" presName="node" presStyleLbl="node1" presStyleIdx="2" presStyleCnt="3">
+        <dgm:presLayoutVars>
+          <dgm:bulletEnabled val="1"/>
+        </dgm:presLayoutVars>
+      </dgm:prSet>
+      <dgm:spPr/>
+      <dgm:t>
+        <a:bodyPr/>
+        <a:lstStyle/>
+        <a:p>
+          <a:endParaRPr lang="de-DE"/>
+        </a:p>
+      </dgm:t>
+    </dgm:pt>
+  </dgm:ptLst>
+  <dgm:cxnLst>
+    <dgm:cxn modelId="{8C050D89-A457-468C-A513-3D394D533F39}" type="presOf" srcId="{204E97BE-CA48-4343-A365-DB34CC53036A}" destId="{45533062-623E-4528-B1EF-E7AE923C706F}" srcOrd="0" destOrd="0" presId="urn:microsoft.com/office/officeart/2005/8/layout/equation1"/>
+    <dgm:cxn modelId="{D8B89E41-F8E5-4929-9139-805B8B37D243}" type="presOf" srcId="{054E58BC-12D6-4E2B-91A3-F1C67D2D4E17}" destId="{3DC838B9-08E7-466D-B9DE-A8F5A5B30299}" srcOrd="0" destOrd="0" presId="urn:microsoft.com/office/officeart/2005/8/layout/equation1"/>
+    <dgm:cxn modelId="{5F7AB3A1-AEA6-472B-B53B-CF46F36ABFCF}" type="presOf" srcId="{DFF0F86F-7D1E-478C-801F-62932B89E58A}" destId="{AE3F2D00-8892-4B16-82FF-2DD4881BAEBB}" srcOrd="0" destOrd="0" presId="urn:microsoft.com/office/officeart/2005/8/layout/equation1"/>
+    <dgm:cxn modelId="{6A24D43B-07FA-4522-A581-429C6BD4D925}" type="presOf" srcId="{E0EEC773-D0AA-407E-9EB3-6D042251D7F8}" destId="{86084EA6-E570-487D-BBBF-A6983D5F9DFA}" srcOrd="0" destOrd="0" presId="urn:microsoft.com/office/officeart/2005/8/layout/equation1"/>
+    <dgm:cxn modelId="{C6EC5F97-F95A-4B30-93FB-533762AB3FC0}" srcId="{DFF0F86F-7D1E-478C-801F-62932B89E58A}" destId="{054E58BC-12D6-4E2B-91A3-F1C67D2D4E17}" srcOrd="0" destOrd="0" parTransId="{E6E02112-BA56-44F5-9E55-5F1A520935C9}" sibTransId="{BAC9B728-7990-4C30-A6B1-CE244DECE508}"/>
+    <dgm:cxn modelId="{22826E73-6BEA-4E35-8661-44A7BAED28D7}" type="presOf" srcId="{A8F88788-D866-468D-91A1-8B6BCBB043A4}" destId="{5948235F-20D2-4786-916C-A49FAE16603E}" srcOrd="0" destOrd="0" presId="urn:microsoft.com/office/officeart/2005/8/layout/equation1"/>
+    <dgm:cxn modelId="{C1110CB9-E172-482B-B9B1-26BED8849280}" srcId="{DFF0F86F-7D1E-478C-801F-62932B89E58A}" destId="{A8F88788-D866-468D-91A1-8B6BCBB043A4}" srcOrd="1" destOrd="0" parTransId="{569EC830-5B83-42A8-A84C-3A27C588E995}" sibTransId="{204E97BE-CA48-4343-A365-DB34CC53036A}"/>
+    <dgm:cxn modelId="{5F1C4AA9-CBCA-455F-B234-B186DF195CAF}" type="presOf" srcId="{BAC9B728-7990-4C30-A6B1-CE244DECE508}" destId="{A7C60AD3-47AA-4471-83DE-8CA3B148A92F}" srcOrd="0" destOrd="0" presId="urn:microsoft.com/office/officeart/2005/8/layout/equation1"/>
+    <dgm:cxn modelId="{4A59002D-09D7-44E1-BCB6-23D4384E639E}" srcId="{DFF0F86F-7D1E-478C-801F-62932B89E58A}" destId="{E0EEC773-D0AA-407E-9EB3-6D042251D7F8}" srcOrd="2" destOrd="0" parTransId="{90D0DBB2-26B5-434B-8891-931110E9CBC0}" sibTransId="{4B6F641C-B490-4350-A458-86C10FCE9E79}"/>
+    <dgm:cxn modelId="{62B10226-7A70-48EA-B997-CA8B8C052E3A}" type="presParOf" srcId="{AE3F2D00-8892-4B16-82FF-2DD4881BAEBB}" destId="{3DC838B9-08E7-466D-B9DE-A8F5A5B30299}" srcOrd="0" destOrd="0" presId="urn:microsoft.com/office/officeart/2005/8/layout/equation1"/>
+    <dgm:cxn modelId="{35FD4D99-7162-42A9-B91C-83CC7FD73711}" type="presParOf" srcId="{AE3F2D00-8892-4B16-82FF-2DD4881BAEBB}" destId="{A8C9C045-60F8-42B7-B638-C1093FF82A0D}" srcOrd="1" destOrd="0" presId="urn:microsoft.com/office/officeart/2005/8/layout/equation1"/>
+    <dgm:cxn modelId="{311F0CB2-0F67-4CE9-A978-6F574AD2EB40}" type="presParOf" srcId="{AE3F2D00-8892-4B16-82FF-2DD4881BAEBB}" destId="{A7C60AD3-47AA-4471-83DE-8CA3B148A92F}" srcOrd="2" destOrd="0" presId="urn:microsoft.com/office/officeart/2005/8/layout/equation1"/>
+    <dgm:cxn modelId="{F8033EFB-805F-4807-8F6B-18FDFFD5F56E}" type="presParOf" srcId="{AE3F2D00-8892-4B16-82FF-2DD4881BAEBB}" destId="{B0308A6A-146E-446E-9E5D-1326921A1A64}" srcOrd="3" destOrd="0" presId="urn:microsoft.com/office/officeart/2005/8/layout/equation1"/>
+    <dgm:cxn modelId="{F1F29BAB-8A06-49F2-BDF5-FA9A3DABC768}" type="presParOf" srcId="{AE3F2D00-8892-4B16-82FF-2DD4881BAEBB}" destId="{5948235F-20D2-4786-916C-A49FAE16603E}" srcOrd="4" destOrd="0" presId="urn:microsoft.com/office/officeart/2005/8/layout/equation1"/>
+    <dgm:cxn modelId="{BCA88DF3-0AC1-4225-81BA-03C4C4AC912B}" type="presParOf" srcId="{AE3F2D00-8892-4B16-82FF-2DD4881BAEBB}" destId="{C42B23F7-D4A0-4D74-96D4-C5BAC62BC6EC}" srcOrd="5" destOrd="0" presId="urn:microsoft.com/office/officeart/2005/8/layout/equation1"/>
+    <dgm:cxn modelId="{F3F4F36D-E997-4E1A-A3CF-DB26CF9BE031}" type="presParOf" srcId="{AE3F2D00-8892-4B16-82FF-2DD4881BAEBB}" destId="{45533062-623E-4528-B1EF-E7AE923C706F}" srcOrd="6" destOrd="0" presId="urn:microsoft.com/office/officeart/2005/8/layout/equation1"/>
+    <dgm:cxn modelId="{62EADEF6-D0F2-440A-9564-8A55296D7046}" type="presParOf" srcId="{AE3F2D00-8892-4B16-82FF-2DD4881BAEBB}" destId="{49C5E1DD-1832-4365-9DD6-75CFEC6F91E4}" srcOrd="7" destOrd="0" presId="urn:microsoft.com/office/officeart/2005/8/layout/equation1"/>
+    <dgm:cxn modelId="{1DD1BA07-8424-47EA-A308-0CB954864CB1}" type="presParOf" srcId="{AE3F2D00-8892-4B16-82FF-2DD4881BAEBB}" destId="{86084EA6-E570-487D-BBBF-A6983D5F9DFA}" srcOrd="8" destOrd="0" presId="urn:microsoft.com/office/officeart/2005/8/layout/equation1"/>
+  </dgm:cxnLst>
+  <dgm:bg/>
+  <dgm:whole/>
+  <dgm:extLst>
+    <a:ext uri="http://schemas.microsoft.com/office/drawing/2008/diagram">
+      <dsp:dataModelExt xmlns:dsp="http://schemas.microsoft.com/office/drawing/2008/diagram" relId="rId6" minVer="http://schemas.openxmlformats.org/drawingml/2006/diagram"/>
+    </a:ext>
+    <a:ext uri="{C62137D5-CB1D-491B-B009-E17868A290BF}">
+      <dgm14:recolorImg xmlns:dgm14="http://schemas.microsoft.com/office/drawing/2010/diagram" val="1"/>
+    </a:ext>
+  </dgm:extLst>
+</dgm:dataModel>
+</file>
+
+<file path=ppt/diagrams/drawing1.xml><?xml version="1.0" encoding="utf-8"?>
+<dsp:drawing xmlns:dgm="http://schemas.openxmlformats.org/drawingml/2006/diagram" xmlns:dsp="http://schemas.microsoft.com/office/drawing/2008/diagram" xmlns:a="http://schemas.openxmlformats.org/drawingml/2006/main">
+  <dsp:spTree>
+    <dsp:nvGrpSpPr>
+      <dsp:cNvPr id="0" name=""/>
+      <dsp:cNvGrpSpPr/>
+    </dsp:nvGrpSpPr>
+    <dsp:grpSpPr/>
+    <dsp:sp modelId="{3DC838B9-08E7-466D-B9DE-A8F5A5B30299}">
+      <dsp:nvSpPr>
+        <dsp:cNvPr id="0" name=""/>
+        <dsp:cNvSpPr/>
+      </dsp:nvSpPr>
+      <dsp:spPr>
+        <a:xfrm>
+          <a:off x="73122" y="473"/>
+          <a:ext cx="1099476" cy="1099476"/>
+        </a:xfrm>
+        <a:prstGeom prst="ellipse">
+          <a:avLst/>
+        </a:prstGeom>
+        <a:solidFill>
+          <a:schemeClr val="bg1">
+            <a:lumMod val="65000"/>
+          </a:schemeClr>
+        </a:solidFill>
+        <a:ln w="38100" cap="flat" cmpd="sng" algn="ctr">
+          <a:noFill/>
+          <a:prstDash val="solid"/>
+        </a:ln>
+        <a:effectLst/>
+      </dsp:spPr>
+      <dsp:style>
+        <a:lnRef idx="3">
+          <a:scrgbClr r="0" g="0" b="0"/>
+        </a:lnRef>
+        <a:fillRef idx="1">
+          <a:scrgbClr r="0" g="0" b="0"/>
+        </a:fillRef>
+        <a:effectRef idx="1">
+          <a:scrgbClr r="0" g="0" b="0"/>
+        </a:effectRef>
+        <a:fontRef idx="minor">
+          <a:schemeClr val="lt1"/>
+        </a:fontRef>
+      </dsp:style>
+      <dsp:txBody>
+        <a:bodyPr spcFirstLastPara="0" vert="horz" wrap="square" lIns="22860" tIns="22860" rIns="22860" bIns="22860" numCol="1" spcCol="1270" anchor="ctr" anchorCtr="0">
+          <a:noAutofit/>
+        </a:bodyPr>
+        <a:lstStyle/>
+        <a:p>
+          <a:pPr lvl="0" algn="ctr" defTabSz="800100">
+            <a:lnSpc>
+              <a:spcPct val="90000"/>
+            </a:lnSpc>
+            <a:spcBef>
+              <a:spcPct val="0"/>
+            </a:spcBef>
+            <a:spcAft>
+              <a:spcPct val="35000"/>
+            </a:spcAft>
+          </a:pPr>
+          <a:r>
+            <a:rPr lang="de-DE" sz="1800" kern="1200" dirty="0" smtClean="0"/>
+            <a:t>Initial 100 punkte</a:t>
+          </a:r>
+          <a:endParaRPr lang="de-DE" sz="1800" kern="1200" dirty="0"/>
+        </a:p>
+      </dsp:txBody>
+      <dsp:txXfrm>
+        <a:off x="234137" y="161488"/>
+        <a:ext cx="777446" cy="777446"/>
+      </dsp:txXfrm>
+    </dsp:sp>
+    <dsp:sp modelId="{A7C60AD3-47AA-4471-83DE-8CA3B148A92F}">
+      <dsp:nvSpPr>
+        <dsp:cNvPr id="0" name=""/>
+        <dsp:cNvSpPr/>
+      </dsp:nvSpPr>
+      <dsp:spPr>
+        <a:xfrm>
+          <a:off x="1261876" y="231363"/>
+          <a:ext cx="637696" cy="637696"/>
+        </a:xfrm>
+        <a:prstGeom prst="mathMinus">
+          <a:avLst/>
+        </a:prstGeom>
+        <a:solidFill>
+          <a:srgbClr val="005AA9"/>
+        </a:solidFill>
+        <a:ln>
+          <a:noFill/>
+        </a:ln>
+        <a:effectLst/>
+      </dsp:spPr>
+      <dsp:style>
+        <a:lnRef idx="0">
+          <a:scrgbClr r="0" g="0" b="0"/>
+        </a:lnRef>
+        <a:fillRef idx="1">
+          <a:scrgbClr r="0" g="0" b="0"/>
+        </a:fillRef>
+        <a:effectRef idx="1">
+          <a:scrgbClr r="0" g="0" b="0"/>
+        </a:effectRef>
+        <a:fontRef idx="minor">
+          <a:schemeClr val="lt1"/>
+        </a:fontRef>
+      </dsp:style>
+      <dsp:txBody>
+        <a:bodyPr spcFirstLastPara="0" vert="horz" wrap="square" lIns="0" tIns="0" rIns="0" bIns="0" numCol="1" spcCol="1270" anchor="ctr" anchorCtr="0">
+          <a:noAutofit/>
+        </a:bodyPr>
+        <a:lstStyle/>
+        <a:p>
+          <a:pPr lvl="0" algn="ctr" defTabSz="488950">
+            <a:lnSpc>
+              <a:spcPct val="90000"/>
+            </a:lnSpc>
+            <a:spcBef>
+              <a:spcPct val="0"/>
+            </a:spcBef>
+            <a:spcAft>
+              <a:spcPct val="35000"/>
+            </a:spcAft>
+          </a:pPr>
+          <a:endParaRPr lang="de-DE" sz="1100" kern="1200"/>
+        </a:p>
+      </dsp:txBody>
+      <dsp:txXfrm>
+        <a:off x="1346403" y="475218"/>
+        <a:ext cx="468642" cy="149986"/>
+      </dsp:txXfrm>
+    </dsp:sp>
+    <dsp:sp modelId="{5948235F-20D2-4786-916C-A49FAE16603E}">
+      <dsp:nvSpPr>
+        <dsp:cNvPr id="0" name=""/>
+        <dsp:cNvSpPr/>
+      </dsp:nvSpPr>
+      <dsp:spPr>
+        <a:xfrm>
+          <a:off x="1988849" y="473"/>
+          <a:ext cx="1099476" cy="1099476"/>
+        </a:xfrm>
+        <a:prstGeom prst="ellipse">
+          <a:avLst/>
+        </a:prstGeom>
+        <a:solidFill>
+          <a:srgbClr val="C00000"/>
+        </a:solidFill>
+        <a:ln w="38100" cap="flat" cmpd="sng" algn="ctr">
+          <a:noFill/>
+          <a:prstDash val="solid"/>
+        </a:ln>
+        <a:effectLst/>
+      </dsp:spPr>
+      <dsp:style>
+        <a:lnRef idx="3">
+          <a:scrgbClr r="0" g="0" b="0"/>
+        </a:lnRef>
+        <a:fillRef idx="1">
+          <a:scrgbClr r="0" g="0" b="0"/>
+        </a:fillRef>
+        <a:effectRef idx="1">
+          <a:scrgbClr r="0" g="0" b="0"/>
+        </a:effectRef>
+        <a:fontRef idx="minor">
+          <a:schemeClr val="lt1"/>
+        </a:fontRef>
+      </dsp:style>
+      <dsp:txBody>
+        <a:bodyPr spcFirstLastPara="0" vert="horz" wrap="square" lIns="22860" tIns="22860" rIns="22860" bIns="22860" numCol="1" spcCol="1270" anchor="ctr" anchorCtr="0">
+          <a:noAutofit/>
+        </a:bodyPr>
+        <a:lstStyle/>
+        <a:p>
+          <a:pPr lvl="0" algn="ctr" defTabSz="800100">
+            <a:lnSpc>
+              <a:spcPct val="90000"/>
+            </a:lnSpc>
+            <a:spcBef>
+              <a:spcPct val="0"/>
+            </a:spcBef>
+            <a:spcAft>
+              <a:spcPct val="35000"/>
+            </a:spcAft>
+          </a:pPr>
+          <a:r>
+            <a:rPr lang="de-DE" sz="1800" kern="1200" dirty="0" smtClean="0"/>
+            <a:t>Malus</a:t>
+          </a:r>
+          <a:endParaRPr lang="de-DE" sz="1800" kern="1200" dirty="0"/>
+        </a:p>
+      </dsp:txBody>
+      <dsp:txXfrm>
+        <a:off x="2149864" y="161488"/>
+        <a:ext cx="777446" cy="777446"/>
+      </dsp:txXfrm>
+    </dsp:sp>
+    <dsp:sp modelId="{45533062-623E-4528-B1EF-E7AE923C706F}">
+      <dsp:nvSpPr>
+        <dsp:cNvPr id="0" name=""/>
+        <dsp:cNvSpPr/>
+      </dsp:nvSpPr>
+      <dsp:spPr>
+        <a:xfrm>
+          <a:off x="3177603" y="231363"/>
+          <a:ext cx="637696" cy="637696"/>
+        </a:xfrm>
+        <a:prstGeom prst="mathEqual">
+          <a:avLst/>
+        </a:prstGeom>
+        <a:solidFill>
+          <a:srgbClr val="005AA9"/>
+        </a:solidFill>
+        <a:ln>
+          <a:noFill/>
+        </a:ln>
+        <a:effectLst/>
+      </dsp:spPr>
+      <dsp:style>
+        <a:lnRef idx="0">
+          <a:scrgbClr r="0" g="0" b="0"/>
+        </a:lnRef>
+        <a:fillRef idx="1">
+          <a:scrgbClr r="0" g="0" b="0"/>
+        </a:fillRef>
+        <a:effectRef idx="1">
+          <a:scrgbClr r="0" g="0" b="0"/>
+        </a:effectRef>
+        <a:fontRef idx="minor">
+          <a:schemeClr val="lt1"/>
+        </a:fontRef>
+      </dsp:style>
+      <dsp:txBody>
+        <a:bodyPr spcFirstLastPara="0" vert="horz" wrap="square" lIns="0" tIns="0" rIns="0" bIns="0" numCol="1" spcCol="1270" anchor="ctr" anchorCtr="0">
+          <a:noAutofit/>
+        </a:bodyPr>
+        <a:lstStyle/>
+        <a:p>
+          <a:pPr lvl="0" algn="ctr" defTabSz="666750">
+            <a:lnSpc>
+              <a:spcPct val="90000"/>
+            </a:lnSpc>
+            <a:spcBef>
+              <a:spcPct val="0"/>
+            </a:spcBef>
+            <a:spcAft>
+              <a:spcPct val="35000"/>
+            </a:spcAft>
+          </a:pPr>
+          <a:endParaRPr lang="de-DE" sz="1500" kern="1200"/>
+        </a:p>
+      </dsp:txBody>
+      <dsp:txXfrm>
+        <a:off x="3262130" y="362728"/>
+        <a:ext cx="468642" cy="374966"/>
+      </dsp:txXfrm>
+    </dsp:sp>
+    <dsp:sp modelId="{86084EA6-E570-487D-BBBF-A6983D5F9DFA}">
+      <dsp:nvSpPr>
+        <dsp:cNvPr id="0" name=""/>
+        <dsp:cNvSpPr/>
+      </dsp:nvSpPr>
+      <dsp:spPr>
+        <a:xfrm>
+          <a:off x="3904577" y="473"/>
+          <a:ext cx="1099476" cy="1099476"/>
+        </a:xfrm>
+        <a:prstGeom prst="ellipse">
+          <a:avLst/>
+        </a:prstGeom>
+        <a:solidFill>
+          <a:srgbClr val="00B050"/>
+        </a:solidFill>
+        <a:ln w="38100" cap="flat" cmpd="sng" algn="ctr">
+          <a:noFill/>
+          <a:prstDash val="solid"/>
+        </a:ln>
+        <a:effectLst/>
+      </dsp:spPr>
+      <dsp:style>
+        <a:lnRef idx="3">
+          <a:scrgbClr r="0" g="0" b="0"/>
+        </a:lnRef>
+        <a:fillRef idx="1">
+          <a:scrgbClr r="0" g="0" b="0"/>
+        </a:fillRef>
+        <a:effectRef idx="1">
+          <a:scrgbClr r="0" g="0" b="0"/>
+        </a:effectRef>
+        <a:fontRef idx="minor">
+          <a:schemeClr val="lt1"/>
+        </a:fontRef>
+      </dsp:style>
+      <dsp:txBody>
+        <a:bodyPr spcFirstLastPara="0" vert="horz" wrap="square" lIns="24130" tIns="24130" rIns="24130" bIns="24130" numCol="1" spcCol="1270" anchor="ctr" anchorCtr="0">
+          <a:noAutofit/>
+        </a:bodyPr>
+        <a:lstStyle/>
+        <a:p>
+          <a:pPr lvl="0" algn="ctr" defTabSz="844550">
+            <a:lnSpc>
+              <a:spcPct val="90000"/>
+            </a:lnSpc>
+            <a:spcBef>
+              <a:spcPct val="0"/>
+            </a:spcBef>
+            <a:spcAft>
+              <a:spcPct val="35000"/>
+            </a:spcAft>
+          </a:pPr>
+          <a:r>
+            <a:rPr lang="en-US" sz="1900" b="0" kern="1200" dirty="0" smtClean="0">
+              <a:solidFill>
+                <a:schemeClr val="bg1"/>
+              </a:solidFill>
+              <a:latin typeface="Arial"/>
+            </a:rPr>
+            <a:t>Score</a:t>
+          </a:r>
+          <a:endParaRPr lang="de-DE" sz="1900" b="0" kern="1200" dirty="0">
+            <a:solidFill>
+              <a:schemeClr val="bg1"/>
+            </a:solidFill>
+          </a:endParaRPr>
+        </a:p>
+      </dsp:txBody>
+      <dsp:txXfrm>
+        <a:off x="4065592" y="161488"/>
+        <a:ext cx="777446" cy="777446"/>
+      </dsp:txXfrm>
+    </dsp:sp>
+  </dsp:spTree>
+</dsp:drawing>
+</file>
+
+<file path=ppt/diagrams/layout1.xml><?xml version="1.0" encoding="utf-8"?>
+<dgm:layoutDef xmlns:dgm="http://schemas.openxmlformats.org/drawingml/2006/diagram" xmlns:a="http://schemas.openxmlformats.org/drawingml/2006/main" uniqueId="urn:microsoft.com/office/officeart/2005/8/layout/equation1">
+  <dgm:title val=""/>
+  <dgm:desc val=""/>
+  <dgm:catLst>
+    <dgm:cat type="relationship" pri="17000"/>
+    <dgm:cat type="process" pri="25000"/>
+  </dgm:catLst>
+  <dgm:sampData useDef="1">
+    <dgm:dataModel>
+      <dgm:ptLst/>
+      <dgm:bg/>
+      <dgm:whole/>
+    </dgm:dataModel>
+  </dgm:sampData>
+  <dgm:styleData>
+    <dgm:dataModel>
+      <dgm:ptLst>
+        <dgm:pt modelId="0" type="doc"/>
+        <dgm:pt modelId="1"/>
+        <dgm:pt modelId="2"/>
+      </dgm:ptLst>
+      <dgm:cxnLst>
+        <dgm:cxn modelId="3" srcId="0" destId="1" srcOrd="0" destOrd="0"/>
+        <dgm:cxn modelId="4" srcId="0" destId="2" srcOrd="1" destOrd="0"/>
+      </dgm:cxnLst>
+      <dgm:bg/>
+      <dgm:whole/>
+    </dgm:dataModel>
+  </dgm:styleData>
+  <dgm:clrData>
+    <dgm:dataModel>
+      <dgm:ptLst>
+        <dgm:pt modelId="0" type="doc"/>
+        <dgm:pt modelId="1"/>
+        <dgm:pt modelId="2"/>
+        <dgm:pt modelId="3"/>
+        <dgm:pt modelId="4"/>
+      </dgm:ptLst>
+      <dgm:cxnLst>
+        <dgm:cxn modelId="5" srcId="0" destId="1" srcOrd="0" destOrd="0"/>
+        <dgm:cxn modelId="6" srcId="0" destId="2" srcOrd="1" destOrd="0"/>
+        <dgm:cxn modelId="7" srcId="0" destId="3" srcOrd="2" destOrd="0"/>
+        <dgm:cxn modelId="8" srcId="0" destId="4" srcOrd="3" destOrd="0"/>
+      </dgm:cxnLst>
+      <dgm:bg/>
+      <dgm:whole/>
+    </dgm:dataModel>
+  </dgm:clrData>
+  <dgm:layoutNode name="linearFlow">
+    <dgm:varLst>
+      <dgm:dir/>
+      <dgm:resizeHandles val="exact"/>
+    </dgm:varLst>
+    <dgm:choose name="Name0">
+      <dgm:if name="Name1" func="var" arg="dir" op="equ" val="norm">
+        <dgm:alg type="lin">
+          <dgm:param type="fallback" val="2D"/>
+        </dgm:alg>
+      </dgm:if>
+      <dgm:else name="Name2">
+        <dgm:alg type="lin">
+          <dgm:param type="linDir" val="fromR"/>
+          <dgm:param type="fallback" val="2D"/>
+        </dgm:alg>
+      </dgm:else>
+    </dgm:choose>
+    <dgm:shape xmlns:r="http://schemas.openxmlformats.org/officeDocument/2006/relationships" r:blip="">
+      <dgm:adjLst/>
+    </dgm:shape>
+    <dgm:presOf/>
+    <dgm:constrLst>
+      <dgm:constr type="w" for="ch" ptType="node" refType="w"/>
+      <dgm:constr type="w" for="ch" ptType="sibTrans" refType="w" refFor="ch" refPtType="node" fact="0.58"/>
+      <dgm:constr type="primFontSz" for="ch" ptType="node" op="equ" val="65"/>
+      <dgm:constr type="primFontSz" for="ch" ptType="sibTrans" op="equ" val="55"/>
+      <dgm:constr type="primFontSz" for="ch" ptType="sibTrans" refType="primFontSz" refFor="ch" refPtType="node" op="lte" fact="0.8"/>
+      <dgm:constr type="w" for="ch" forName="spacerL" refType="w" refFor="ch" refPtType="sibTrans" fact="0.14"/>
+      <dgm:constr type="w" for="ch" forName="spacerR" refType="w" refFor="ch" refPtType="sibTrans" fact="0.14"/>
+    </dgm:constrLst>
+    <dgm:ruleLst/>
+    <dgm:forEach name="nodesForEach" axis="ch" ptType="node">
+      <dgm:layoutNode name="node">
+        <dgm:varLst>
+          <dgm:bulletEnabled val="1"/>
+        </dgm:varLst>
+        <dgm:alg type="tx">
+          <dgm:param type="txAnchorVertCh" val="mid"/>
+        </dgm:alg>
+        <dgm:shape xmlns:r="http://schemas.openxmlformats.org/officeDocument/2006/relationships" type="ellipse" r:blip="">
+          <dgm:adjLst/>
+        </dgm:shape>
+        <dgm:presOf axis="desOrSelf" ptType="node"/>
+        <dgm:constrLst>
+          <dgm:constr type="h" refType="w"/>
+          <dgm:constr type="tMarg" refType="primFontSz" fact="0.1"/>
+          <dgm:constr type="bMarg" refType="primFontSz" fact="0.1"/>
+          <dgm:constr type="lMarg" refType="primFontSz" fact="0.1"/>
+          <dgm:constr type="rMarg" refType="primFontSz" fact="0.1"/>
+        </dgm:constrLst>
+        <dgm:ruleLst>
+          <dgm:rule type="primFontSz" val="5" fact="NaN" max="NaN"/>
+        </dgm:ruleLst>
+      </dgm:layoutNode>
+      <dgm:forEach name="sibTransForEach" axis="followSib" ptType="sibTrans" cnt="1">
+        <dgm:layoutNode name="spacerL">
+          <dgm:alg type="sp"/>
+          <dgm:shape xmlns:r="http://schemas.openxmlformats.org/officeDocument/2006/relationships" r:blip="">
+            <dgm:adjLst/>
+          </dgm:shape>
+          <dgm:presOf/>
+          <dgm:constrLst/>
+          <dgm:ruleLst/>
+        </dgm:layoutNode>
+        <dgm:layoutNode name="sibTrans">
+          <dgm:alg type="tx"/>
+          <dgm:choose name="Name3">
+            <dgm:if name="Name4" axis="followSib" ptType="sibTrans" func="cnt" op="equ" val="0">
+              <dgm:shape xmlns:r="http://schemas.openxmlformats.org/officeDocument/2006/relationships" type="mathEqual" r:blip="">
+                <dgm:adjLst/>
+              </dgm:shape>
+            </dgm:if>
+            <dgm:else name="Name5">
+              <dgm:shape xmlns:r="http://schemas.openxmlformats.org/officeDocument/2006/relationships" type="mathPlus" r:blip="">
+                <dgm:adjLst/>
+              </dgm:shape>
+            </dgm:else>
+          </dgm:choose>
+          <dgm:presOf axis="self"/>
+          <dgm:constrLst>
+            <dgm:constr type="h" refType="w"/>
+            <dgm:constr type="lMarg"/>
+            <dgm:constr type="rMarg"/>
+            <dgm:constr type="tMarg"/>
+            <dgm:constr type="bMarg"/>
+          </dgm:constrLst>
+          <dgm:ruleLst>
+            <dgm:rule type="primFontSz" val="5" fact="NaN" max="NaN"/>
+          </dgm:ruleLst>
+        </dgm:layoutNode>
+        <dgm:layoutNode name="spacerR">
+          <dgm:alg type="sp"/>
+          <dgm:shape xmlns:r="http://schemas.openxmlformats.org/officeDocument/2006/relationships" r:blip="">
+            <dgm:adjLst/>
+          </dgm:shape>
+          <dgm:presOf/>
+          <dgm:constrLst/>
+          <dgm:ruleLst/>
+        </dgm:layoutNode>
+      </dgm:forEach>
+    </dgm:forEach>
+  </dgm:layoutNode>
+</dgm:layoutDef>
+</file>
+
+<file path=ppt/diagrams/quickStyle1.xml><?xml version="1.0" encoding="utf-8"?>
+<dgm:styleDef xmlns:dgm="http://schemas.openxmlformats.org/drawingml/2006/diagram" xmlns:a="http://schemas.openxmlformats.org/drawingml/2006/main" uniqueId="urn:microsoft.com/office/officeart/2005/8/quickstyle/simple2">
+  <dgm:title val=""/>
+  <dgm:desc val=""/>
+  <dgm:catLst>
+    <dgm:cat type="simple" pri="10200"/>
+  </dgm:catLst>
+  <dgm:scene3d>
+    <a:camera prst="orthographicFront"/>
+    <a:lightRig rig="threePt" dir="t"/>
+  </dgm:scene3d>
+  <dgm:styleLbl name="node0">
+    <dgm:scene3d>
+      <a:camera prst="orthographicFront"/>
+      <a:lightRig rig="threePt" dir="t"/>
+    </dgm:scene3d>
+    <dgm:sp3d/>
+    <dgm:txPr/>
+    <dgm:style>
+      <a:lnRef idx="3">
+        <a:scrgbClr r="0" g="0" b="0"/>
+      </a:lnRef>
+      <a:fillRef idx="1">
+        <a:scrgbClr r="0" g="0" b="0"/>
+      </a:fillRef>
+      <a:effectRef idx="1">
+        <a:scrgbClr r="0" g="0" b="0"/>
+      </a:effectRef>
+      <a:fontRef idx="minor">
+        <a:schemeClr val="lt1"/>
+      </a:fontRef>
+    </dgm:style>
+  </dgm:styleLbl>
+  <dgm:styleLbl name="lnNode1">
+    <dgm:scene3d>
+      <a:camera prst="orthographicFront"/>
+      <a:lightRig rig="threePt" dir="t"/>
+    </dgm:scene3d>
+    <dgm:sp3d/>
+    <dgm:txPr/>
+    <dgm:style>
+      <a:lnRef idx="3">
+        <a:scrgbClr r="0" g="0" b="0"/>
+      </a:lnRef>
+      <a:fillRef idx="1">
+        <a:scrgbClr r="0" g="0" b="0"/>
+      </a:fillRef>
+      <a:effectRef idx="1">
+        <a:scrgbClr r="0" g="0" b="0"/>
+      </a:effectRef>
+      <a:fontRef idx="minor">
+        <a:schemeClr val="lt1"/>
+      </a:fontRef>
+    </dgm:style>
+  </dgm:styleLbl>
+  <dgm:styleLbl name="vennNode1">
+    <dgm:scene3d>
+      <a:camera prst="orthographicFront"/>
+      <a:lightRig rig="threePt" dir="t"/>
+    </dgm:scene3d>
+    <dgm:sp3d/>
+    <dgm:txPr/>
+    <dgm:style>
+      <a:lnRef idx="3">
+        <a:scrgbClr r="0" g="0" b="0"/>
+      </a:lnRef>
+      <a:fillRef idx="1">
+        <a:scrgbClr r="0" g="0" b="0"/>
+      </a:fillRef>
+      <a:effectRef idx="0">
+        <a:scrgbClr r="0" g="0" b="0"/>
+      </a:effectRef>
+      <a:fontRef idx="minor">
+        <a:schemeClr val="tx1"/>
+      </a:fontRef>
+    </dgm:style>
+  </dgm:styleLbl>
+  <dgm:styleLbl name="alignNode1">
+    <dgm:scene3d>
+      <a:camera prst="orthographicFront"/>
+      <a:lightRig rig="threePt" dir="t"/>
+    </dgm:scene3d>
+    <dgm:sp3d/>
+    <dgm:txPr/>
+    <dgm:style>
+      <a:lnRef idx="2">
+        <a:scrgbClr r="0" g="0" b="0"/>
+      </a:lnRef>
+      <a:fillRef idx="1">
+        <a:scrgbClr r="0" g="0" b="0"/>
+      </a:fillRef>
+      <a:effectRef idx="1">
+        <a:scrgbClr r="0" g="0" b="0"/>
+      </a:effectRef>
+      <a:fontRef idx="minor">
+        <a:schemeClr val="lt1"/>
+      </a:fontRef>
+    </dgm:style>
+  </dgm:styleLbl>
+  <dgm:styleLbl name="node1">
+    <dgm:scene3d>
+      <a:camera prst="orthographicFront"/>
+      <a:lightRig rig="threePt" dir="t"/>
+    </dgm:scene3d>
+    <dgm:sp3d/>
+    <dgm:txPr/>
+    <dgm:style>
+      <a:lnRef idx="3">
+        <a:scrgbClr r="0" g="0" b="0"/>
+      </a:lnRef>
+      <a:fillRef idx="1">
+        <a:scrgbClr r="0" g="0" b="0"/>
+      </a:fillRef>
+      <a:effectRef idx="1">
+        <a:scrgbClr r="0" g="0" b="0"/>
+      </a:effectRef>
+      <a:fontRef idx="minor">
+        <a:schemeClr val="lt1"/>
+      </a:fontRef>
+    </dgm:style>
+  </dgm:styleLbl>
+  <dgm:styleLbl name="node2">
+    <dgm:scene3d>
+      <a:camera prst="orthographicFront"/>
+      <a:lightRig rig="threePt" dir="t"/>
+    </dgm:scene3d>
+    <dgm:sp3d/>
+    <dgm:txPr/>
+    <dgm:style>
+      <a:lnRef idx="3">
+        <a:scrgbClr r="0" g="0" b="0"/>
+      </a:lnRef>
+      <a:fillRef idx="1">
+        <a:scrgbClr r="0" g="0" b="0"/>
+      </a:fillRef>
+      <a:effectRef idx="1">
+        <a:scrgbClr r="0" g="0" b="0"/>
+      </a:effectRef>
+      <a:fontRef idx="minor">
+        <a:schemeClr val="lt1"/>
+      </a:fontRef>
+    </dgm:style>
+  </dgm:styleLbl>
+  <dgm:styleLbl name="node3">
+    <dgm:scene3d>
+      <a:camera prst="orthographicFront"/>
+      <a:lightRig rig="threePt" dir="t"/>
+    </dgm:scene3d>
+    <dgm:sp3d/>
+    <dgm:txPr/>
+    <dgm:style>
+      <a:lnRef idx="3">
+        <a:scrgbClr r="0" g="0" b="0"/>
+      </a:lnRef>
+      <a:fillRef idx="1">
+        <a:scrgbClr r="0" g="0" b="0"/>
+      </a:fillRef>
+      <a:effectRef idx="1">
+        <a:scrgbClr r="0" g="0" b="0"/>
+      </a:effectRef>
+      <a:fontRef idx="minor">
+        <a:schemeClr val="lt1"/>
+      </a:fontRef>
+    </dgm:style>
+  </dgm:styleLbl>
+  <dgm:styleLbl name="node4">
+    <dgm:scene3d>
+      <a:camera prst="orthographicFront"/>
+      <a:lightRig rig="threePt" dir="t"/>
+    </dgm:scene3d>
+    <dgm:sp3d/>
+    <dgm:txPr/>
+    <dgm:style>
+      <a:lnRef idx="3">
+        <a:scrgbClr r="0" g="0" b="0"/>
+      </a:lnRef>
+      <a:fillRef idx="1">
+        <a:scrgbClr r="0" g="0" b="0"/>
+      </a:fillRef>
+      <a:effectRef idx="1">
+        <a:scrgbClr r="0" g="0" b="0"/>
+      </a:effectRef>
+      <a:fontRef idx="minor">
+        <a:schemeClr val="lt1"/>
+      </a:fontRef>
+    </dgm:style>
+  </dgm:styleLbl>
+  <dgm:styleLbl name="fgImgPlace1">
+    <dgm:scene3d>
+      <a:camera prst="orthographicFront"/>
+      <a:lightRig rig="threePt" dir="t"/>
+    </dgm:scene3d>
+    <dgm:sp3d/>
+    <dgm:txPr/>
+    <dgm:style>
+      <a:lnRef idx="3">
+        <a:scrgbClr r="0" g="0" b="0"/>
+      </a:lnRef>
+      <a:fillRef idx="1">
+        <a:scrgbClr r="0" g="0" b="0"/>
+      </a:fillRef>
+      <a:effectRef idx="1">
+        <a:scrgbClr r="0" g="0" b="0"/>
+      </a:effectRef>
+      <a:fontRef idx="minor"/>
+    </dgm:style>
+  </dgm:styleLbl>
+  <dgm:styleLbl name="alignImgPlace1">
+    <dgm:scene3d>
+      <a:camera prst="orthographicFront"/>
+      <a:lightRig rig="threePt" dir="t"/>
+    </dgm:scene3d>
+    <dgm:sp3d/>
+    <dgm:txPr/>
+    <dgm:style>
+      <a:lnRef idx="3">
+        <a:scrgbClr r="0" g="0" b="0"/>
+      </a:lnRef>
+      <a:fillRef idx="1">
+        <a:scrgbClr r="0" g="0" b="0"/>
+      </a:fillRef>
+      <a:effectRef idx="1">
+        <a:scrgbClr r="0" g="0" b="0"/>
+      </a:effectRef>
+      <a:fontRef idx="minor"/>
+    </dgm:style>
+  </dgm:styleLbl>
+  <dgm:styleLbl name="bgImgPlace1">
+    <dgm:scene3d>
+      <a:camera prst="orthographicFront"/>
+      <a:lightRig rig="threePt" dir="t"/>
+    </dgm:scene3d>
+    <dgm:sp3d/>
+    <dgm:txPr/>
+    <dgm:style>
+      <a:lnRef idx="3">
+        <a:scrgbClr r="0" g="0" b="0"/>
+      </a:lnRef>
+      <a:fillRef idx="1">
+        <a:scrgbClr r="0" g="0" b="0"/>
+      </a:fillRef>
+      <a:effectRef idx="1">
+        <a:scrgbClr r="0" g="0" b="0"/>
+      </a:effectRef>
+      <a:fontRef idx="minor"/>
+    </dgm:style>
+  </dgm:styleLbl>
+  <dgm:styleLbl name="sibTrans2D1">
+    <dgm:scene3d>
+      <a:camera prst="orthographicFront"/>
+      <a:lightRig rig="threePt" dir="t"/>
+    </dgm:scene3d>
+    <dgm:sp3d/>
+    <dgm:txPr/>
+    <dgm:style>
+      <a:lnRef idx="0">
+        <a:scrgbClr r="0" g="0" b="0"/>
+      </a:lnRef>
+      <a:fillRef idx="1">
+        <a:scrgbClr r="0" g="0" b="0"/>
+      </a:fillRef>
+      <a:effectRef idx="1">
+        <a:scrgbClr r="0" g="0" b="0"/>
+      </a:effectRef>
+      <a:fontRef idx="minor">
+        <a:schemeClr val="lt1"/>
+      </a:fontRef>
+    </dgm:style>
+  </dgm:styleLbl>
+  <dgm:styleLbl name="fgSibTrans2D1">
+    <dgm:scene3d>
+      <a:camera prst="orthographicFront"/>
+      <a:lightRig rig="threePt" dir="t"/>
+    </dgm:scene3d>
+    <dgm:sp3d/>
+    <dgm:txPr/>
+    <dgm:style>
+      <a:lnRef idx="0">
+        <a:scrgbClr r="0" g="0" b="0"/>
+      </a:lnRef>
+      <a:fillRef idx="1">
+        <a:scrgbClr r="0" g="0" b="0"/>
+      </a:fillRef>
+      <a:effectRef idx="1">
+        <a:scrgbClr r="0" g="0" b="0"/>
+      </a:effectRef>
+      <a:fontRef idx="minor">
+        <a:schemeClr val="lt1"/>
+      </a:fontRef>
+    </dgm:style>
+  </dgm:styleLbl>
+  <dgm:styleLbl name="bgSibTrans2D1">
+    <dgm:scene3d>
+      <a:camera prst="orthographicFront"/>
+      <a:lightRig rig="threePt" dir="t"/>
+    </dgm:scene3d>
+    <dgm:sp3d/>
+    <dgm:txPr/>
+    <dgm:style>
+      <a:lnRef idx="0">
+        <a:scrgbClr r="0" g="0" b="0"/>
+      </a:lnRef>
+      <a:fillRef idx="1">
+        <a:scrgbClr r="0" g="0" b="0"/>
+      </a:fillRef>
+      <a:effectRef idx="1">
+        <a:scrgbClr r="0" g="0" b="0"/>
+      </a:effectRef>
+      <a:fontRef idx="minor">
+        <a:schemeClr val="lt1"/>
+      </a:fontRef>
+    </dgm:style>
+  </dgm:styleLbl>
+  <dgm:styleLbl name="sibTrans1D1">
+    <dgm:scene3d>
+      <a:camera prst="orthographicFront"/>
+      <a:lightRig rig="threePt" dir="t"/>
+    </dgm:scene3d>
+    <dgm:sp3d/>
+    <dgm:txPr/>
+    <dgm:style>
+      <a:lnRef idx="1">
+        <a:scrgbClr r="0" g="0" b="0"/>
+      </a:lnRef>
+      <a:fillRef idx="0">
+        <a:scrgbClr r="0" g="0" b="0"/>
+      </a:fillRef>
+      <a:effectRef idx="0">
+        <a:scrgbClr r="0" g="0" b="0"/>
+      </a:effectRef>
+      <a:fontRef idx="minor"/>
+    </dgm:style>
+  </dgm:styleLbl>
+  <dgm:styleLbl name="callout">
+    <dgm:scene3d>
+      <a:camera prst="orthographicFront"/>
+      <a:lightRig rig="threePt" dir="t"/>
+    </dgm:scene3d>
+    <dgm:sp3d/>
+    <dgm:txPr/>
+    <dgm:style>
+      <a:lnRef idx="2">
+        <a:scrgbClr r="0" g="0" b="0"/>
+      </a:lnRef>
+      <a:fillRef idx="1">
+        <a:scrgbClr r="0" g="0" b="0"/>
+      </a:fillRef>
+      <a:effectRef idx="1">
+        <a:scrgbClr r="0" g="0" b="0"/>
+      </a:effectRef>
+      <a:fontRef idx="minor"/>
+    </dgm:style>
+  </dgm:styleLbl>
+  <dgm:styleLbl name="asst0">
+    <dgm:scene3d>
+      <a:camera prst="orthographicFront"/>
+      <a:lightRig rig="threePt" dir="t"/>
+    </dgm:scene3d>
+    <dgm:sp3d/>
+    <dgm:txPr/>
+    <dgm:style>
+      <a:lnRef idx="3">
+        <a:scrgbClr r="0" g="0" b="0"/>
+      </a:lnRef>
+      <a:fillRef idx="1">
+        <a:scrgbClr r="0" g="0" b="0"/>
+      </a:fillRef>
+      <a:effectRef idx="1">
+        <a:scrgbClr r="0" g="0" b="0"/>
+      </a:effectRef>
+      <a:fontRef idx="minor">
+        <a:schemeClr val="lt1"/>
+      </a:fontRef>
+    </dgm:style>
+  </dgm:styleLbl>
+  <dgm:styleLbl name="asst1">
+    <dgm:scene3d>
+      <a:camera prst="orthographicFront"/>
+      <a:lightRig rig="threePt" dir="t"/>
+    </dgm:scene3d>
+    <dgm:sp3d/>
+    <dgm:txPr/>
+    <dgm:style>
+      <a:lnRef idx="3">
+        <a:scrgbClr r="0" g="0" b="0"/>
+      </a:lnRef>
+      <a:fillRef idx="1">
+        <a:scrgbClr r="0" g="0" b="0"/>
+      </a:fillRef>
+      <a:effectRef idx="1">
+        <a:scrgbClr r="0" g="0" b="0"/>
+      </a:effectRef>
+      <a:fontRef idx="minor">
+        <a:schemeClr val="lt1"/>
+      </a:fontRef>
+    </dgm:style>
+  </dgm:styleLbl>
+  <dgm:styleLbl name="asst2">
+    <dgm:scene3d>
+      <a:camera prst="orthographicFront"/>
+      <a:lightRig rig="threePt" dir="t"/>
+    </dgm:scene3d>
+    <dgm:sp3d/>
+    <dgm:txPr/>
+    <dgm:style>
+      <a:lnRef idx="3">
+        <a:scrgbClr r="0" g="0" b="0"/>
+      </a:lnRef>
+      <a:fillRef idx="1">
+        <a:scrgbClr r="0" g="0" b="0"/>
+      </a:fillRef>
+      <a:effectRef idx="1">
+        <a:scrgbClr r="0" g="0" b="0"/>
+      </a:effectRef>
+      <a:fontRef idx="minor">
+        <a:schemeClr val="lt1"/>
+      </a:fontRef>
+    </dgm:style>
+  </dgm:styleLbl>
+  <dgm:styleLbl name="asst3">
+    <dgm:scene3d>
+      <a:camera prst="orthographicFront"/>
+      <a:lightRig rig="threePt" dir="t"/>
+    </dgm:scene3d>
+    <dgm:sp3d/>
+    <dgm:txPr/>
+    <dgm:style>
+      <a:lnRef idx="3">
+        <a:scrgbClr r="0" g="0" b="0"/>
+      </a:lnRef>
+      <a:fillRef idx="1">
+        <a:scrgbClr r="0" g="0" b="0"/>
+      </a:fillRef>
+      <a:effectRef idx="1">
+        <a:scrgbClr r="0" g="0" b="0"/>
+      </a:effectRef>
+      <a:fontRef idx="minor">
+        <a:schemeClr val="lt1"/>
+      </a:fontRef>
+    </dgm:style>
+  </dgm:styleLbl>
+  <dgm:styleLbl name="asst4">
+    <dgm:scene3d>
+      <a:camera prst="orthographicFront"/>
+      <a:lightRig rig="threePt" dir="t"/>
+    </dgm:scene3d>
+    <dgm:sp3d/>
+    <dgm:txPr/>
+    <dgm:style>
+      <a:lnRef idx="3">
+        <a:scrgbClr r="0" g="0" b="0"/>
+      </a:lnRef>
+      <a:fillRef idx="1">
+        <a:scrgbClr r="0" g="0" b="0"/>
+      </a:fillRef>
+      <a:effectRef idx="1">
+        <a:scrgbClr r="0" g="0" b="0"/>
+      </a:effectRef>
+      <a:fontRef idx="minor">
+        <a:schemeClr val="lt1"/>
+      </a:fontRef>
+    </dgm:style>
+  </dgm:styleLbl>
+  <dgm:styleLbl name="parChTrans2D1">
+    <dgm:scene3d>
+      <a:camera prst="orthographicFront"/>
+      <a:lightRig rig="threePt" dir="t"/>
+    </dgm:scene3d>
+    <dgm:sp3d/>
+    <dgm:txPr/>
+    <dgm:style>
+      <a:lnRef idx="3">
+        <a:scrgbClr r="0" g="0" b="0"/>
+      </a:lnRef>
+      <a:fillRef idx="1">
+        <a:scrgbClr r="0" g="0" b="0"/>
+      </a:fillRef>
+      <a:effectRef idx="1">
+        <a:scrgbClr r="0" g="0" b="0"/>
+      </a:effectRef>
+      <a:fontRef idx="minor">
+        <a:schemeClr val="lt1"/>
+      </a:fontRef>
+    </dgm:style>
+  </dgm:styleLbl>
+  <dgm:styleLbl name="parChTrans2D2">
+    <dgm:scene3d>
+      <a:camera prst="orthographicFront"/>
+      <a:lightRig rig="threePt" dir="t"/>
+    </dgm:scene3d>
+    <dgm:sp3d/>
+    <dgm:txPr/>
+    <dgm:style>
+      <a:lnRef idx="3">
+        <a:scrgbClr r="0" g="0" b="0"/>
+      </a:lnRef>
+      <a:fillRef idx="1">
+        <a:scrgbClr r="0" g="0" b="0"/>
+      </a:fillRef>
+      <a:effectRef idx="1">
+        <a:scrgbClr r="0" g="0" b="0"/>
+      </a:effectRef>
+      <a:fontRef idx="minor">
+        <a:schemeClr val="lt1"/>
+      </a:fontRef>
+    </dgm:style>
+  </dgm:styleLbl>
+  <dgm:styleLbl name="parChTrans2D3">
+    <dgm:scene3d>
+      <a:camera prst="orthographicFront"/>
+      <a:lightRig rig="threePt" dir="t"/>
+    </dgm:scene3d>
+    <dgm:sp3d/>
+    <dgm:txPr/>
+    <dgm:style>
+      <a:lnRef idx="3">
+        <a:scrgbClr r="0" g="0" b="0"/>
+      </a:lnRef>
+      <a:fillRef idx="1">
+        <a:scrgbClr r="0" g="0" b="0"/>
+      </a:fillRef>
+      <a:effectRef idx="1">
+        <a:scrgbClr r="0" g="0" b="0"/>
+      </a:effectRef>
+      <a:fontRef idx="minor">
+        <a:schemeClr val="lt1"/>
+      </a:fontRef>
+    </dgm:style>
+  </dgm:styleLbl>
+  <dgm:styleLbl name="parChTrans2D4">
+    <dgm:scene3d>
+      <a:camera prst="orthographicFront"/>
+      <a:lightRig rig="threePt" dir="t"/>
+    </dgm:scene3d>
+    <dgm:sp3d/>
+    <dgm:txPr/>
+    <dgm:style>
+      <a:lnRef idx="3">
+        <a:scrgbClr r="0" g="0" b="0"/>
+      </a:lnRef>
+      <a:fillRef idx="1">
+        <a:scrgbClr r="0" g="0" b="0"/>
+      </a:fillRef>
+      <a:effectRef idx="1">
+        <a:scrgbClr r="0" g="0" b="0"/>
+      </a:effectRef>
+      <a:fontRef idx="minor">
+        <a:schemeClr val="lt1"/>
+      </a:fontRef>
+    </dgm:style>
+  </dgm:styleLbl>
+  <dgm:styleLbl name="parChTrans1D1">
+    <dgm:scene3d>
+      <a:camera prst="orthographicFront"/>
+      <a:lightRig rig="threePt" dir="t"/>
+    </dgm:scene3d>
+    <dgm:sp3d/>
+    <dgm:txPr/>
+    <dgm:style>
+      <a:lnRef idx="2">
+        <a:scrgbClr r="0" g="0" b="0"/>
+      </a:lnRef>
+      <a:fillRef idx="0">
+        <a:scrgbClr r="0" g="0" b="0"/>
+      </a:fillRef>
+      <a:effectRef idx="0">
+        <a:scrgbClr r="0" g="0" b="0"/>
+      </a:effectRef>
+      <a:fontRef idx="minor"/>
+    </dgm:style>
+  </dgm:styleLbl>
+  <dgm:styleLbl name="parChTrans1D2">
+    <dgm:scene3d>
+      <a:camera prst="orthographicFront"/>
+      <a:lightRig rig="threePt" dir="t"/>
+    </dgm:scene3d>
+    <dgm:sp3d/>
+    <dgm:txPr/>
+    <dgm:style>
+      <a:lnRef idx="2">
+        <a:scrgbClr r="0" g="0" b="0"/>
+      </a:lnRef>
+      <a:fillRef idx="0">
+        <a:scrgbClr r="0" g="0" b="0"/>
+      </a:fillRef>
+      <a:effectRef idx="0">
+        <a:scrgbClr r="0" g="0" b="0"/>
+      </a:effectRef>
+      <a:fontRef idx="minor"/>
+    </dgm:style>
+  </dgm:styleLbl>
+  <dgm:styleLbl name="parChTrans1D3">
+    <dgm:scene3d>
+      <a:camera prst="orthographicFront"/>
+      <a:lightRig rig="threePt" dir="t"/>
+    </dgm:scene3d>
+    <dgm:sp3d/>
+    <dgm:txPr/>
+    <dgm:style>
+      <a:lnRef idx="2">
+        <a:scrgbClr r="0" g="0" b="0"/>
+      </a:lnRef>
+      <a:fillRef idx="0">
+        <a:scrgbClr r="0" g="0" b="0"/>
+      </a:fillRef>
+      <a:effectRef idx="0">
+        <a:scrgbClr r="0" g="0" b="0"/>
+      </a:effectRef>
+      <a:fontRef idx="minor"/>
+    </dgm:style>
+  </dgm:styleLbl>
+  <dgm:styleLbl name="parChTrans1D4">
+    <dgm:scene3d>
+      <a:camera prst="orthographicFront"/>
+      <a:lightRig rig="threePt" dir="t"/>
+    </dgm:scene3d>
+    <dgm:sp3d/>
+    <dgm:txPr/>
+    <dgm:style>
+      <a:lnRef idx="2">
+        <a:scrgbClr r="0" g="0" b="0"/>
+      </a:lnRef>
+      <a:fillRef idx="0">
+        <a:scrgbClr r="0" g="0" b="0"/>
+      </a:fillRef>
+      <a:effectRef idx="0">
+        <a:scrgbClr r="0" g="0" b="0"/>
+      </a:effectRef>
+      <a:fontRef idx="minor"/>
+    </dgm:style>
+  </dgm:styleLbl>
+  <dgm:styleLbl name="fgAcc1">
+    <dgm:scene3d>
+      <a:camera prst="orthographicFront"/>
+      <a:lightRig rig="threePt" dir="t"/>
+    </dgm:scene3d>
+    <dgm:sp3d/>
+    <dgm:txPr/>
+    <dgm:style>
+      <a:lnRef idx="2">
+        <a:scrgbClr r="0" g="0" b="0"/>
+      </a:lnRef>
+      <a:fillRef idx="1">
+        <a:scrgbClr r="0" g="0" b="0"/>
+      </a:fillRef>
+      <a:effectRef idx="0">
+        <a:scrgbClr r="0" g="0" b="0"/>
+      </a:effectRef>
+      <a:fontRef idx="minor"/>
+    </dgm:style>
+  </dgm:styleLbl>
+  <dgm:styleLbl name="conFgAcc1">
+    <dgm:scene3d>
+      <a:camera prst="orthographicFront"/>
+      <a:lightRig rig="threePt" dir="t"/>
+    </dgm:scene3d>
+    <dgm:sp3d/>
+    <dgm:txPr/>
+    <dgm:style>
+      <a:lnRef idx="2">
+        <a:scrgbClr r="0" g="0" b="0"/>
+      </a:lnRef>
+      <a:fillRef idx="1">
+        <a:scrgbClr r="0" g="0" b="0"/>
+      </a:fillRef>
+      <a:effectRef idx="0">
+        <a:scrgbClr r="0" g="0" b="0"/>
+      </a:effectRef>
+      <a:fontRef idx="minor"/>
+    </dgm:style>
+  </dgm:styleLbl>
+  <dgm:styleLbl name="alignAcc1">
+    <dgm:scene3d>
+      <a:camera prst="orthographicFront"/>
+      <a:lightRig rig="threePt" dir="t"/>
+    </dgm:scene3d>
+    <dgm:sp3d/>
+    <dgm:txPr/>
+    <dgm:style>
+      <a:lnRef idx="2">
+        <a:scrgbClr r="0" g="0" b="0"/>
+      </a:lnRef>
+      <a:fillRef idx="1">
+        <a:scrgbClr r="0" g="0" b="0"/>
+      </a:fillRef>
+      <a:effectRef idx="0">
+        <a:scrgbClr r="0" g="0" b="0"/>
+      </a:effectRef>
+      <a:fontRef idx="minor"/>
+    </dgm:style>
+  </dgm:styleLbl>
+  <dgm:styleLbl name="trAlignAcc1">
+    <dgm:scene3d>
+      <a:camera prst="orthographicFront"/>
+      <a:lightRig rig="threePt" dir="t"/>
+    </dgm:scene3d>
+    <dgm:sp3d/>
+    <dgm:txPr/>
+    <dgm:style>
+      <a:lnRef idx="1">
+        <a:scrgbClr r="0" g="0" b="0"/>
+      </a:lnRef>
+      <a:fillRef idx="1">
+        <a:scrgbClr r="0" g="0" b="0"/>
+      </a:fillRef>
+      <a:effectRef idx="0">
+        <a:scrgbClr r="0" g="0" b="0"/>
+      </a:effectRef>
+      <a:fontRef idx="minor"/>
+    </dgm:style>
+  </dgm:styleLbl>
+  <dgm:styleLbl name="bgAcc1">
+    <dgm:scene3d>
+      <a:camera prst="orthographicFront"/>
+      <a:lightRig rig="threePt" dir="t"/>
+    </dgm:scene3d>
+    <dgm:sp3d/>
+    <dgm:txPr/>
+    <dgm:style>
+      <a:lnRef idx="2">
+        <a:scrgbClr r="0" g="0" b="0"/>
+      </a:lnRef>
+      <a:fillRef idx="1">
+        <a:scrgbClr r="0" g="0" b="0"/>
+      </a:fillRef>
+      <a:effectRef idx="0">
+        <a:scrgbClr r="0" g="0" b="0"/>
+      </a:effectRef>
+      <a:fontRef idx="minor"/>
+    </dgm:style>
+  </dgm:styleLbl>
+  <dgm:styleLbl name="solidFgAcc1">
+    <dgm:scene3d>
+      <a:camera prst="orthographicFront"/>
+      <a:lightRig rig="threePt" dir="t"/>
+    </dgm:scene3d>
+    <dgm:sp3d/>
+    <dgm:txPr/>
+    <dgm:style>
+      <a:lnRef idx="2">
+        <a:scrgbClr r="0" g="0" b="0"/>
+      </a:lnRef>
+      <a:fillRef idx="1">
+        <a:scrgbClr r="0" g="0" b="0"/>
+      </a:fillRef>
+      <a:effectRef idx="0">
+        <a:scrgbClr r="0" g="0" b="0"/>
+      </a:effectRef>
+      <a:fontRef idx="minor"/>
+    </dgm:style>
+  </dgm:styleLbl>
+  <dgm:styleLbl name="solidAlignAcc1">
+    <dgm:scene3d>
+      <a:camera prst="orthographicFront"/>
+      <a:lightRig rig="threePt" dir="t"/>
+    </dgm:scene3d>
+    <dgm:sp3d/>
+    <dgm:txPr/>
+    <dgm:style>
+      <a:lnRef idx="2">
+        <a:scrgbClr r="0" g="0" b="0"/>
+      </a:lnRef>
+      <a:fillRef idx="1">
+        <a:scrgbClr r="0" g="0" b="0"/>
+      </a:fillRef>
+      <a:effectRef idx="0">
+        <a:scrgbClr r="0" g="0" b="0"/>
+      </a:effectRef>
+      <a:fontRef idx="minor"/>
+    </dgm:style>
+  </dgm:styleLbl>
+  <dgm:styleLbl name="solidBgAcc1">
+    <dgm:scene3d>
+      <a:camera prst="orthographicFront"/>
+      <a:lightRig rig="threePt" dir="t"/>
+    </dgm:scene3d>
+    <dgm:sp3d/>
+    <dgm:txPr/>
+    <dgm:style>
+      <a:lnRef idx="2">
+        <a:scrgbClr r="0" g="0" b="0"/>
+      </a:lnRef>
+      <a:fillRef idx="1">
+        <a:scrgbClr r="0" g="0" b="0"/>
+      </a:fillRef>
+      <a:effectRef idx="0">
+        <a:scrgbClr r="0" g="0" b="0"/>
+      </a:effectRef>
+      <a:fontRef idx="minor"/>
+    </dgm:style>
+  </dgm:styleLbl>
+  <dgm:styleLbl name="fgAccFollowNode1">
+    <dgm:scene3d>
+      <a:camera prst="orthographicFront"/>
+      <a:lightRig rig="threePt" dir="t"/>
+    </dgm:scene3d>
+    <dgm:sp3d/>
+    <dgm:txPr/>
+    <dgm:style>
+      <a:lnRef idx="2">
+        <a:scrgbClr r="0" g="0" b="0"/>
+      </a:lnRef>
+      <a:fillRef idx="1">
+        <a:scrgbClr r="0" g="0" b="0"/>
+      </a:fillRef>
+      <a:effectRef idx="0">
+        <a:scrgbClr r="0" g="0" b="0"/>
+      </a:effectRef>
+      <a:fontRef idx="minor"/>
+    </dgm:style>
+  </dgm:styleLbl>
+  <dgm:styleLbl name="alignAccFollowNode1">
+    <dgm:scene3d>
+      <a:camera prst="orthographicFront"/>
+      <a:lightRig rig="threePt" dir="t"/>
+    </dgm:scene3d>
+    <dgm:sp3d/>
+    <dgm:txPr/>
+    <dgm:style>
+      <a:lnRef idx="2">
+        <a:scrgbClr r="0" g="0" b="0"/>
+      </a:lnRef>
+      <a:fillRef idx="1">
+        <a:scrgbClr r="0" g="0" b="0"/>
+      </a:fillRef>
+      <a:effectRef idx="0">
+        <a:scrgbClr r="0" g="0" b="0"/>
+      </a:effectRef>
+      <a:fontRef idx="minor"/>
+    </dgm:style>
+  </dgm:styleLbl>
+  <dgm:styleLbl name="bgAccFollowNode1">
+    <dgm:scene3d>
+      <a:camera prst="orthographicFront"/>
+      <a:lightRig rig="threePt" dir="t"/>
+    </dgm:scene3d>
+    <dgm:sp3d/>
+    <dgm:txPr/>
+    <dgm:style>
+      <a:lnRef idx="2">
+        <a:scrgbClr r="0" g="0" b="0"/>
+      </a:lnRef>
+      <a:fillRef idx="1">
+        <a:scrgbClr r="0" g="0" b="0"/>
+      </a:fillRef>
+      <a:effectRef idx="0">
+        <a:scrgbClr r="0" g="0" b="0"/>
+      </a:effectRef>
+      <a:fontRef idx="minor"/>
+    </dgm:style>
+  </dgm:styleLbl>
+  <dgm:styleLbl name="fgAcc0">
+    <dgm:scene3d>
+      <a:camera prst="orthographicFront"/>
+      <a:lightRig rig="threePt" dir="t"/>
+    </dgm:scene3d>
+    <dgm:sp3d/>
+    <dgm:txPr/>
+    <dgm:style>
+      <a:lnRef idx="2">
+        <a:scrgbClr r="0" g="0" b="0"/>
+      </a:lnRef>
+      <a:fillRef idx="1">
+        <a:scrgbClr r="0" g="0" b="0"/>
+      </a:fillRef>
+      <a:effectRef idx="0">
+        <a:scrgbClr r="0" g="0" b="0"/>
+      </a:effectRef>
+      <a:fontRef idx="minor"/>
+    </dgm:style>
+  </dgm:styleLbl>
+  <dgm:styleLbl name="fgAcc2">
+    <dgm:scene3d>
+      <a:camera prst="orthographicFront"/>
+      <a:lightRig rig="threePt" dir="t"/>
+    </dgm:scene3d>
+    <dgm:sp3d/>
+    <dgm:txPr/>
+    <dgm:style>
+      <a:lnRef idx="2">
+        <a:scrgbClr r="0" g="0" b="0"/>
+      </a:lnRef>
+      <a:fillRef idx="1">
+        <a:scrgbClr r="0" g="0" b="0"/>
+      </a:fillRef>
+      <a:effectRef idx="0">
+        <a:scrgbClr r="0" g="0" b="0"/>
+      </a:effectRef>
+      <a:fontRef idx="minor"/>
+    </dgm:style>
+  </dgm:styleLbl>
+  <dgm:styleLbl name="fgAcc3">
+    <dgm:scene3d>
+      <a:camera prst="orthographicFront"/>
+      <a:lightRig rig="threePt" dir="t"/>
+    </dgm:scene3d>
+    <dgm:sp3d/>
+    <dgm:txPr/>
+    <dgm:style>
+      <a:lnRef idx="2">
+        <a:scrgbClr r="0" g="0" b="0"/>
+      </a:lnRef>
+      <a:fillRef idx="1">
+        <a:scrgbClr r="0" g="0" b="0"/>
+      </a:fillRef>
+      <a:effectRef idx="0">
+        <a:scrgbClr r="0" g="0" b="0"/>
+      </a:effectRef>
+      <a:fontRef idx="minor"/>
+    </dgm:style>
+  </dgm:styleLbl>
+  <dgm:styleLbl name="fgAcc4">
+    <dgm:scene3d>
+      <a:camera prst="orthographicFront"/>
+      <a:lightRig rig="threePt" dir="t"/>
+    </dgm:scene3d>
+    <dgm:sp3d/>
+    <dgm:txPr/>
+    <dgm:style>
+      <a:lnRef idx="2">
+        <a:scrgbClr r="0" g="0" b="0"/>
+      </a:lnRef>
+      <a:fillRef idx="1">
+        <a:scrgbClr r="0" g="0" b="0"/>
+      </a:fillRef>
+      <a:effectRef idx="0">
+        <a:scrgbClr r="0" g="0" b="0"/>
+      </a:effectRef>
+      <a:fontRef idx="minor"/>
+    </dgm:style>
+  </dgm:styleLbl>
+  <dgm:styleLbl name="bgShp">
+    <dgm:scene3d>
+      <a:camera prst="orthographicFront"/>
+      <a:lightRig rig="threePt" dir="t"/>
+    </dgm:scene3d>
+    <dgm:sp3d/>
+    <dgm:txPr/>
+    <dgm:style>
+      <a:lnRef idx="0">
+        <a:scrgbClr r="0" g="0" b="0"/>
+      </a:lnRef>
+      <a:fillRef idx="1">
+        <a:scrgbClr r="0" g="0" b="0"/>
+      </a:fillRef>
+      <a:effectRef idx="0">
+        <a:scrgbClr r="0" g="0" b="0"/>
+      </a:effectRef>
+      <a:fontRef idx="minor"/>
+    </dgm:style>
+  </dgm:styleLbl>
+  <dgm:styleLbl name="dkBgShp">
+    <dgm:scene3d>
+      <a:camera prst="orthographicFront"/>
+      <a:lightRig rig="threePt" dir="t"/>
+    </dgm:scene3d>
+    <dgm:sp3d/>
+    <dgm:txPr/>
+    <dgm:style>
+      <a:lnRef idx="0">
+        <a:scrgbClr r="0" g="0" b="0"/>
+      </a:lnRef>
+      <a:fillRef idx="1">
+        <a:scrgbClr r="0" g="0" b="0"/>
+      </a:fillRef>
+      <a:effectRef idx="0">
+        <a:scrgbClr r="0" g="0" b="0"/>
+      </a:effectRef>
+      <a:fontRef idx="minor"/>
+    </dgm:style>
+  </dgm:styleLbl>
+  <dgm:styleLbl name="trBgShp">
+    <dgm:scene3d>
+      <a:camera prst="orthographicFront"/>
+      <a:lightRig rig="threePt" dir="t"/>
+    </dgm:scene3d>
+    <dgm:sp3d/>
+    <dgm:txPr/>
+    <dgm:style>
+      <a:lnRef idx="0">
+        <a:scrgbClr r="0" g="0" b="0"/>
+      </a:lnRef>
+      <a:fillRef idx="1">
+        <a:scrgbClr r="0" g="0" b="0"/>
+      </a:fillRef>
+      <a:effectRef idx="0">
+        <a:scrgbClr r="0" g="0" b="0"/>
+      </a:effectRef>
+      <a:fontRef idx="minor"/>
+    </dgm:style>
+  </dgm:styleLbl>
+  <dgm:styleLbl name="fgShp">
+    <dgm:scene3d>
+      <a:camera prst="orthographicFront"/>
+      <a:lightRig rig="threePt" dir="t"/>
+    </dgm:scene3d>
+    <dgm:sp3d/>
+    <dgm:txPr/>
+    <dgm:style>
+      <a:lnRef idx="3">
+        <a:scrgbClr r="0" g="0" b="0"/>
+      </a:lnRef>
+      <a:fillRef idx="1">
+        <a:scrgbClr r="0" g="0" b="0"/>
+      </a:fillRef>
+      <a:effectRef idx="1">
+        <a:scrgbClr r="0" g="0" b="0"/>
+      </a:effectRef>
+      <a:fontRef idx="minor"/>
+    </dgm:style>
+  </dgm:styleLbl>
+  <dgm:styleLbl name="revTx">
+    <dgm:scene3d>
+      <a:camera prst="orthographicFront"/>
+      <a:lightRig rig="threePt" dir="t"/>
+    </dgm:scene3d>
+    <dgm:sp3d/>
+    <dgm:txPr/>
+    <dgm:style>
+      <a:lnRef idx="0">
+        <a:scrgbClr r="0" g="0" b="0"/>
+      </a:lnRef>
+      <a:fillRef idx="0">
+        <a:scrgbClr r="0" g="0" b="0"/>
+      </a:fillRef>
+      <a:effectRef idx="0">
+        <a:scrgbClr r="0" g="0" b="0"/>
+      </a:effectRef>
+      <a:fontRef idx="minor"/>
+    </dgm:style>
+  </dgm:styleLbl>
+</dgm:styleDef>
+</file>
+
 <file path=ppt/slideLayouts/slideLayout1.xml><?xml version="1.0" encoding="utf-8"?>
 <p:sldLayout xmlns:a="http://schemas.openxmlformats.org/drawingml/2006/main" xmlns:r="http://schemas.openxmlformats.org/officeDocument/2006/relationships" xmlns:p="http://schemas.openxmlformats.org/presentationml/2006/main" type="blank" preserve="1">
   <p:cSld name="Blank Slide">
@@ -6527,23 +9073,196 @@
           </a:p>
         </p:txBody>
       </p:sp>
-      <p:sp>
-        <p:nvSpPr>
-          <p:cNvPr id="6" name="TextShape 1"/>
-          <p:cNvSpPr txBox="1"/>
-          <p:nvPr/>
-        </p:nvSpPr>
-        <p:spPr>
-          <a:xfrm>
-            <a:off x="358920" y="1620000"/>
-            <a:ext cx="7164000" cy="4479480"/>
-          </a:xfrm>
-          <a:prstGeom prst="rect">
-            <a:avLst/>
-          </a:prstGeom>
-        </p:spPr>
-        <p:txBody>
-          <a:bodyPr lIns="0" rIns="0"/>
+      <p:graphicFrame>
+        <p:nvGraphicFramePr>
+          <p:cNvPr id="2" name="Diagramm 1"/>
+          <p:cNvGraphicFramePr/>
+          <p:nvPr>
+            <p:extLst>
+              <p:ext uri="{D42A27DB-BD31-4B8C-83A1-F6EECF244321}">
+                <p14:modId xmlns:p14="http://schemas.microsoft.com/office/powerpoint/2010/main" val="2777973724"/>
+              </p:ext>
+            </p:extLst>
+          </p:nvPr>
+        </p:nvGraphicFramePr>
+        <p:xfrm>
+          <a:off x="323528" y="1901040"/>
+          <a:ext cx="5077176" cy="1100423"/>
+        </p:xfrm>
+        <a:graphic>
+          <a:graphicData uri="http://schemas.openxmlformats.org/drawingml/2006/diagram">
+            <dgm:relIds xmlns:dgm="http://schemas.openxmlformats.org/drawingml/2006/diagram" xmlns:r="http://schemas.openxmlformats.org/officeDocument/2006/relationships" r:dm="rId2" r:lo="rId3" r:qs="rId4" r:cs="rId5"/>
+          </a:graphicData>
+        </a:graphic>
+      </p:graphicFrame>
+      <p:sp>
+        <p:nvSpPr>
+          <p:cNvPr id="7" name="Rechteck 6"/>
+          <p:cNvSpPr/>
+          <p:nvPr/>
+        </p:nvSpPr>
+        <p:spPr>
+          <a:xfrm>
+            <a:off x="497760" y="3555593"/>
+            <a:ext cx="2808312" cy="1169551"/>
+          </a:xfrm>
+          <a:prstGeom prst="rect">
+            <a:avLst/>
+          </a:prstGeom>
+        </p:spPr>
+        <p:txBody>
+          <a:bodyPr wrap="square">
+            <a:spAutoFit/>
+          </a:bodyPr>
+          <a:lstStyle/>
+          <a:p>
+            <a:pPr marL="285750" indent="-285750">
+              <a:lnSpc>
+                <a:spcPct val="100000"/>
+              </a:lnSpc>
+              <a:buFont typeface="Symbol" panose="05050102010706020507" pitchFamily="18" charset="2"/>
+              <a:buChar char="-"/>
+            </a:pPr>
+            <a:r>
+              <a:rPr lang="de-DE" sz="1400" dirty="0"/>
+              <a:t>Geschwindigkeit</a:t>
+            </a:r>
+            <a:endParaRPr lang="de-DE" sz="1400" dirty="0" smtClean="0"/>
+          </a:p>
+          <a:p>
+            <a:pPr marL="285750" indent="-285750">
+              <a:lnSpc>
+                <a:spcPct val="100000"/>
+              </a:lnSpc>
+              <a:buFont typeface="Symbol" panose="05050102010706020507" pitchFamily="18" charset="2"/>
+              <a:buChar char="-"/>
+            </a:pPr>
+            <a:r>
+              <a:rPr lang="de-DE" sz="1400" dirty="0" smtClean="0"/>
+              <a:t>Umdrehungen </a:t>
+            </a:r>
+            <a:r>
+              <a:rPr lang="de-DE" sz="1400" dirty="0"/>
+              <a:t>pro </a:t>
+            </a:r>
+            <a:r>
+              <a:rPr lang="de-DE" sz="1400" dirty="0" smtClean="0"/>
+              <a:t>Minute</a:t>
+            </a:r>
+          </a:p>
+          <a:p>
+            <a:pPr marL="285750" indent="-285750">
+              <a:lnSpc>
+                <a:spcPct val="100000"/>
+              </a:lnSpc>
+              <a:buFont typeface="Symbol" panose="05050102010706020507" pitchFamily="18" charset="2"/>
+              <a:buChar char="-"/>
+            </a:pPr>
+            <a:r>
+              <a:rPr lang="de-DE" sz="1400" dirty="0" smtClean="0"/>
+              <a:t>Pedal D Position</a:t>
+            </a:r>
+            <a:endParaRPr lang="de-DE" sz="1400" dirty="0"/>
+          </a:p>
+          <a:p>
+            <a:pPr marL="285750" indent="-285750">
+              <a:lnSpc>
+                <a:spcPct val="100000"/>
+              </a:lnSpc>
+              <a:buFont typeface="Symbol" panose="05050102010706020507" pitchFamily="18" charset="2"/>
+              <a:buChar char="-"/>
+            </a:pPr>
+            <a:r>
+              <a:rPr lang="de-DE" sz="1400" dirty="0"/>
+              <a:t>Pedal </a:t>
+            </a:r>
+            <a:r>
+              <a:rPr lang="de-DE" sz="1400" dirty="0" smtClean="0"/>
+              <a:t>E</a:t>
+            </a:r>
+            <a:r>
+              <a:rPr lang="de-DE" sz="1400" dirty="0"/>
+              <a:t> Position</a:t>
+            </a:r>
+          </a:p>
+          <a:p>
+            <a:pPr marL="285750" indent="-285750">
+              <a:lnSpc>
+                <a:spcPct val="100000"/>
+              </a:lnSpc>
+              <a:buFont typeface="Symbol" panose="05050102010706020507" pitchFamily="18" charset="2"/>
+              <a:buChar char="-"/>
+            </a:pPr>
+            <a:r>
+              <a:rPr lang="de-DE" sz="1400" dirty="0" smtClean="0"/>
+              <a:t>Drosselöffnung</a:t>
+            </a:r>
+            <a:endParaRPr lang="de-DE" sz="1400" dirty="0"/>
+          </a:p>
+        </p:txBody>
+      </p:sp>
+      <p:sp>
+        <p:nvSpPr>
+          <p:cNvPr id="10" name="Geschweifte Klammer rechts 9"/>
+          <p:cNvSpPr/>
+          <p:nvPr/>
+        </p:nvSpPr>
+        <p:spPr>
+          <a:xfrm>
+            <a:off x="2919368" y="3494016"/>
+            <a:ext cx="339776" cy="1265323"/>
+          </a:xfrm>
+          <a:prstGeom prst="rightBrace">
+            <a:avLst/>
+          </a:prstGeom>
+          <a:ln>
+            <a:solidFill>
+              <a:schemeClr val="tx1"/>
+            </a:solidFill>
+          </a:ln>
+        </p:spPr>
+        <p:style>
+          <a:lnRef idx="1">
+            <a:schemeClr val="accent1"/>
+          </a:lnRef>
+          <a:fillRef idx="0">
+            <a:schemeClr val="accent1"/>
+          </a:fillRef>
+          <a:effectRef idx="0">
+            <a:schemeClr val="accent1"/>
+          </a:effectRef>
+          <a:fontRef idx="minor">
+            <a:schemeClr val="tx1"/>
+          </a:fontRef>
+        </p:style>
+        <p:txBody>
+          <a:bodyPr rtlCol="0" anchor="ctr"/>
+          <a:lstStyle/>
+          <a:p>
+            <a:pPr algn="ctr"/>
+            <a:endParaRPr lang="de-DE"/>
+          </a:p>
+        </p:txBody>
+      </p:sp>
+      <p:sp>
+        <p:nvSpPr>
+          <p:cNvPr id="13" name="Rechteck 12"/>
+          <p:cNvSpPr/>
+          <p:nvPr/>
+        </p:nvSpPr>
+        <p:spPr>
+          <a:xfrm>
+            <a:off x="3351416" y="3733337"/>
+            <a:ext cx="1820464" cy="738664"/>
+          </a:xfrm>
+          <a:prstGeom prst="rect">
+            <a:avLst/>
+          </a:prstGeom>
+        </p:spPr>
+        <p:txBody>
+          <a:bodyPr wrap="square">
+            <a:spAutoFit/>
+          </a:bodyPr>
           <a:lstStyle/>
           <a:p>
             <a:pPr>
@@ -6552,10 +9271,33 @@
               </a:lnSpc>
             </a:pPr>
             <a:r>
-              <a:rPr lang="de-DE" dirty="0" smtClean="0"/>
-              <a:t>Score berücksichtigt: </a:t>
-            </a:r>
-          </a:p>
+              <a:rPr lang="de-DE" sz="1400" dirty="0" smtClean="0"/>
+              <a:t>%-Anteil der Überschreitung der Grenzwerte</a:t>
+            </a:r>
+            <a:endParaRPr lang="de-DE" sz="1400" dirty="0"/>
+          </a:p>
+        </p:txBody>
+      </p:sp>
+      <p:sp>
+        <p:nvSpPr>
+          <p:cNvPr id="14" name="Rechteck 13"/>
+          <p:cNvSpPr/>
+          <p:nvPr/>
+        </p:nvSpPr>
+        <p:spPr>
+          <a:xfrm>
+            <a:off x="5770472" y="2478353"/>
+            <a:ext cx="3305968" cy="2031325"/>
+          </a:xfrm>
+          <a:prstGeom prst="rect">
+            <a:avLst/>
+          </a:prstGeom>
+        </p:spPr>
+        <p:txBody>
+          <a:bodyPr wrap="square">
+            <a:spAutoFit/>
+          </a:bodyPr>
+          <a:lstStyle/>
           <a:p>
             <a:pPr>
               <a:lnSpc>
@@ -6563,240 +9305,119 @@
               </a:lnSpc>
             </a:pPr>
             <a:r>
-              <a:rPr lang="de-DE" dirty="0" smtClean="0"/>
-              <a:t>Geschwindigkeit: </a:t>
-            </a:r>
-            <a:r>
-              <a:rPr lang="de-DE" dirty="0" err="1" smtClean="0"/>
-              <a:t>kmh</a:t>
-            </a:r>
-            <a:r>
-              <a:rPr lang="de-DE" dirty="0" smtClean="0"/>
-              <a:t> &gt;130</a:t>
-            </a:r>
-            <a:endParaRPr lang="de-DE" dirty="0" smtClean="0"/>
-          </a:p>
-          <a:p>
-            <a:pPr>
+              <a:rPr lang="de-DE" b="1" dirty="0" smtClean="0"/>
+              <a:t>Rankingberechnung:</a:t>
+            </a:r>
+          </a:p>
+          <a:p>
+            <a:pPr marL="342900" indent="-342900">
               <a:lnSpc>
                 <a:spcPct val="100000"/>
               </a:lnSpc>
-            </a:pPr>
-            <a:r>
-              <a:rPr lang="de-DE" dirty="0" err="1" smtClean="0"/>
-              <a:t>Umderhungen</a:t>
-            </a:r>
+              <a:buFont typeface="+mj-lt"/>
+              <a:buAutoNum type="arabicPeriod"/>
+            </a:pPr>
             <a:r>
               <a:rPr lang="de-DE" dirty="0" smtClean="0"/>
-              <a:t> pro </a:t>
-            </a:r>
-            <a:r>
-              <a:rPr lang="de-DE" dirty="0" err="1" smtClean="0"/>
-              <a:t>minute</a:t>
-            </a:r>
-            <a:r>
-              <a:rPr lang="de-DE" smtClean="0"/>
-              <a:t>: </a:t>
-            </a:r>
-            <a:r>
-              <a:rPr lang="de-DE" smtClean="0"/>
-              <a:t>RPM &lt;2500</a:t>
-            </a:r>
-            <a:endParaRPr lang="de-DE" dirty="0" smtClean="0"/>
-          </a:p>
-          <a:p>
-            <a:pPr>
+              <a:t>Berechnung pro Trip</a:t>
+            </a:r>
+          </a:p>
+          <a:p>
+            <a:pPr marL="342900" indent="-342900">
+              <a:buFont typeface="+mj-lt"/>
+              <a:buAutoNum type="arabicPeriod"/>
+            </a:pPr>
+            <a:r>
+              <a:rPr lang="de-DE" dirty="0"/>
+              <a:t>Mtl. </a:t>
+            </a:r>
+            <a:r>
+              <a:rPr lang="de-DE" dirty="0" smtClean="0"/>
+              <a:t>Ø – Score für jeden Fahrer </a:t>
+            </a:r>
+          </a:p>
+          <a:p>
+            <a:pPr marL="342900" indent="-342900">
+              <a:buFont typeface="+mj-lt"/>
+              <a:buAutoNum type="arabicPeriod"/>
+            </a:pPr>
+            <a:r>
+              <a:rPr lang="de-DE" dirty="0" smtClean="0"/>
+              <a:t>Jährlicher Ø </a:t>
+            </a:r>
+            <a:r>
+              <a:rPr lang="de-DE" dirty="0"/>
+              <a:t>– Score für jeden Fahrer </a:t>
+            </a:r>
+            <a:endParaRPr lang="de-DE" dirty="0"/>
+          </a:p>
+          <a:p>
+            <a:pPr marL="342900" indent="-342900">
               <a:lnSpc>
                 <a:spcPct val="100000"/>
               </a:lnSpc>
-            </a:pPr>
-            <a:r>
-              <a:rPr lang="de-DE" dirty="0" smtClean="0"/>
-              <a:t>Pedal D: %</a:t>
-            </a:r>
-          </a:p>
-          <a:p>
-            <a:pPr>
-              <a:lnSpc>
-                <a:spcPct val="100000"/>
-              </a:lnSpc>
-            </a:pPr>
-            <a:r>
-              <a:rPr lang="de-DE" dirty="0"/>
-              <a:t>Pedal E</a:t>
-            </a:r>
-            <a:r>
-              <a:rPr lang="de-DE" dirty="0" smtClean="0"/>
-              <a:t>: %</a:t>
-            </a:r>
-          </a:p>
-          <a:p>
-            <a:pPr>
-              <a:lnSpc>
-                <a:spcPct val="100000"/>
-              </a:lnSpc>
-            </a:pPr>
-            <a:r>
-              <a:rPr lang="de-DE" dirty="0" smtClean="0"/>
-              <a:t>Drosselöffnung: %</a:t>
-            </a:r>
-          </a:p>
-          <a:p>
-            <a:pPr>
-              <a:lnSpc>
-                <a:spcPct val="100000"/>
-              </a:lnSpc>
-            </a:pPr>
-            <a:endParaRPr lang="de-DE" dirty="0" smtClean="0"/>
-          </a:p>
-          <a:p>
-            <a:pPr>
-              <a:lnSpc>
-                <a:spcPct val="100000"/>
-              </a:lnSpc>
-            </a:pPr>
-            <a:r>
-              <a:rPr lang="de-DE" dirty="0" err="1" smtClean="0"/>
-              <a:t>Scores</a:t>
-            </a:r>
-            <a:r>
-              <a:rPr lang="de-DE" dirty="0" smtClean="0"/>
-              <a:t> für jeden Trip berechnen</a:t>
-            </a:r>
-          </a:p>
-          <a:p>
-            <a:pPr>
-              <a:lnSpc>
-                <a:spcPct val="100000"/>
-              </a:lnSpc>
-            </a:pPr>
-            <a:r>
-              <a:rPr lang="de-DE" dirty="0" smtClean="0"/>
-              <a:t>-&gt; durchschnitt bilden für den Monat / Jahr</a:t>
-            </a:r>
-          </a:p>
-          <a:p>
-            <a:pPr>
-              <a:lnSpc>
-                <a:spcPct val="100000"/>
-              </a:lnSpc>
-            </a:pPr>
-            <a:endParaRPr dirty="0"/>
-          </a:p>
-          <a:p>
-            <a:pPr>
-              <a:lnSpc>
-                <a:spcPct val="100000"/>
-              </a:lnSpc>
-            </a:pPr>
-            <a:r>
-              <a:rPr lang="de-DE" dirty="0" smtClean="0"/>
-              <a:t>Rankingsystem:</a:t>
-            </a:r>
-          </a:p>
-          <a:p>
-            <a:pPr>
-              <a:lnSpc>
-                <a:spcPct val="100000"/>
-              </a:lnSpc>
-            </a:pPr>
-            <a:r>
-              <a:rPr lang="de-DE" dirty="0"/>
-              <a:t>	</a:t>
-            </a:r>
-            <a:r>
-              <a:rPr lang="de-DE" dirty="0" smtClean="0"/>
-              <a:t>jeder Trip beginnt mit einem 100% score</a:t>
-            </a:r>
-          </a:p>
-          <a:p>
-            <a:pPr>
-              <a:lnSpc>
-                <a:spcPct val="100000"/>
-              </a:lnSpc>
-            </a:pPr>
-            <a:r>
-              <a:rPr lang="de-DE" dirty="0" smtClean="0"/>
-              <a:t>		Für jede Verletzung der Score berücksichtigten Daten werden </a:t>
-            </a:r>
-            <a:r>
-              <a:rPr lang="de-DE" dirty="0" err="1" smtClean="0"/>
-              <a:t>malus</a:t>
-            </a:r>
-            <a:r>
-              <a:rPr lang="de-DE" dirty="0" smtClean="0"/>
-              <a:t> punkte erfasst</a:t>
-            </a:r>
-          </a:p>
-          <a:p>
-            <a:pPr>
-              <a:lnSpc>
-                <a:spcPct val="100000"/>
-              </a:lnSpc>
-            </a:pPr>
-            <a:r>
-              <a:rPr lang="de-DE" dirty="0" smtClean="0"/>
-              <a:t>	Die </a:t>
-            </a:r>
-            <a:r>
-              <a:rPr lang="de-DE" dirty="0" err="1" smtClean="0"/>
-              <a:t>malus</a:t>
-            </a:r>
-            <a:r>
-              <a:rPr lang="de-DE" dirty="0" smtClean="0"/>
-              <a:t> punkte werden % zur Datenerhebung berechnet (summe der </a:t>
-            </a:r>
-            <a:r>
-              <a:rPr lang="de-DE" dirty="0" err="1" smtClean="0"/>
-              <a:t>Maluspunkte</a:t>
-            </a:r>
-            <a:r>
-              <a:rPr lang="de-DE" dirty="0" smtClean="0"/>
-              <a:t> / </a:t>
-            </a:r>
-            <a:r>
-              <a:rPr lang="de-DE" dirty="0" err="1" smtClean="0"/>
-              <a:t>anzahl</a:t>
-            </a:r>
-            <a:r>
-              <a:rPr lang="de-DE" dirty="0" smtClean="0"/>
-              <a:t> der </a:t>
-            </a:r>
-            <a:r>
-              <a:rPr lang="de-DE" dirty="0" err="1" smtClean="0"/>
-              <a:t>Auspräung</a:t>
-            </a:r>
-            <a:r>
-              <a:rPr lang="de-DE" dirty="0" smtClean="0"/>
-              <a:t> in den </a:t>
-            </a:r>
-            <a:r>
-              <a:rPr lang="de-DE" dirty="0" err="1" smtClean="0"/>
-              <a:t>daten</a:t>
-            </a:r>
-            <a:r>
-              <a:rPr lang="de-DE" dirty="0" smtClean="0"/>
-              <a:t>)</a:t>
-            </a:r>
-          </a:p>
-          <a:p>
-            <a:pPr>
-              <a:lnSpc>
-                <a:spcPct val="100000"/>
-              </a:lnSpc>
-            </a:pPr>
-            <a:r>
-              <a:rPr lang="de-DE" dirty="0" smtClean="0"/>
-              <a:t>Anschließend werden der %-Malus vom initial score abgezogen</a:t>
-            </a:r>
-            <a:endParaRPr dirty="0"/>
+              <a:buFont typeface="+mj-lt"/>
+              <a:buAutoNum type="arabicPeriod"/>
+            </a:pPr>
+            <a:endParaRPr lang="de-DE" dirty="0"/>
+          </a:p>
+        </p:txBody>
+      </p:sp>
+      <p:sp>
+        <p:nvSpPr>
+          <p:cNvPr id="15" name="Legende mit Pfeil nach oben 14"/>
+          <p:cNvSpPr/>
+          <p:nvPr/>
+        </p:nvSpPr>
+        <p:spPr>
+          <a:xfrm>
+            <a:off x="408040" y="3157273"/>
+            <a:ext cx="4896544" cy="1711887"/>
+          </a:xfrm>
+          <a:prstGeom prst="upArrowCallout">
+            <a:avLst>
+              <a:gd name="adj1" fmla="val 286032"/>
+              <a:gd name="adj2" fmla="val 143016"/>
+              <a:gd name="adj3" fmla="val 19558"/>
+              <a:gd name="adj4" fmla="val 0"/>
+            </a:avLst>
+          </a:prstGeom>
+          <a:noFill/>
+          <a:ln w="38100">
+            <a:solidFill>
+              <a:srgbClr val="C00000"/>
+            </a:solidFill>
+          </a:ln>
+        </p:spPr>
+        <p:style>
+          <a:lnRef idx="2">
+            <a:schemeClr val="accent1">
+              <a:shade val="50000"/>
+            </a:schemeClr>
+          </a:lnRef>
+          <a:fillRef idx="1">
+            <a:schemeClr val="accent1"/>
+          </a:fillRef>
+          <a:effectRef idx="0">
+            <a:schemeClr val="accent1"/>
+          </a:effectRef>
+          <a:fontRef idx="minor">
+            <a:schemeClr val="lt1"/>
+          </a:fontRef>
+        </p:style>
+        <p:txBody>
+          <a:bodyPr rtlCol="0" anchor="ctr"/>
+          <a:lstStyle/>
+          <a:p>
+            <a:pPr algn="ctr"/>
+            <a:endParaRPr lang="de-DE"/>
           </a:p>
         </p:txBody>
       </p:sp>
     </p:spTree>
     <p:extLst>
       <p:ext uri="{BB962C8B-B14F-4D97-AF65-F5344CB8AC3E}">
-        <p14:creationId xmlns:p14="http://schemas.microsoft.com/office/powerpoint/2010/main" val="2360109864"/>
+        <p14:creationId xmlns:p14="http://schemas.microsoft.com/office/powerpoint/2010/main" val="2816868796"/>
       </p:ext>
     </p:extLst>
   </p:cSld>

</xml_diff>

<commit_message>
neue präsi Signed-off-by: younGi <k.younghwan18@googlemail.com>
</commit_message>
<xml_diff>
--- a/Big Data - Driving Competition.pptx
+++ b/Big Data - Driving Competition.pptx
@@ -1087,6 +1087,13 @@
           <a:avLst/>
         </a:prstGeom>
       </dgm:spPr>
+      <dgm:t>
+        <a:bodyPr/>
+        <a:lstStyle/>
+        <a:p>
+          <a:endParaRPr lang="de-DE"/>
+        </a:p>
+      </dgm:t>
     </dgm:pt>
     <dgm:pt modelId="{B0308A6A-146E-446E-9E5D-1326921A1A64}" type="pres">
       <dgm:prSet presAssocID="{BAC9B728-7990-4C30-A6B1-CE244DECE508}" presName="spacerR" presStyleCnt="0"/>
@@ -1099,6 +1106,13 @@
         </dgm:presLayoutVars>
       </dgm:prSet>
       <dgm:spPr/>
+      <dgm:t>
+        <a:bodyPr/>
+        <a:lstStyle/>
+        <a:p>
+          <a:endParaRPr lang="de-DE"/>
+        </a:p>
+      </dgm:t>
     </dgm:pt>
     <dgm:pt modelId="{C42B23F7-D4A0-4D74-96D4-C5BAC62BC6EC}" type="pres">
       <dgm:prSet presAssocID="{204E97BE-CA48-4343-A365-DB34CC53036A}" presName="spacerL" presStyleCnt="0"/>
@@ -1107,6 +1121,13 @@
     <dgm:pt modelId="{45533062-623E-4528-B1EF-E7AE923C706F}" type="pres">
       <dgm:prSet presAssocID="{204E97BE-CA48-4343-A365-DB34CC53036A}" presName="sibTrans" presStyleLbl="sibTrans2D1" presStyleIdx="1" presStyleCnt="2"/>
       <dgm:spPr/>
+      <dgm:t>
+        <a:bodyPr/>
+        <a:lstStyle/>
+        <a:p>
+          <a:endParaRPr lang="de-DE"/>
+        </a:p>
+      </dgm:t>
     </dgm:pt>
     <dgm:pt modelId="{49C5E1DD-1832-4365-9DD6-75CFEC6F91E4}" type="pres">
       <dgm:prSet presAssocID="{204E97BE-CA48-4343-A365-DB34CC53036A}" presName="spacerR" presStyleCnt="0"/>
@@ -1130,8 +1151,8 @@
   </dgm:ptLst>
   <dgm:cxnLst>
     <dgm:cxn modelId="{8C050D89-A457-468C-A513-3D394D533F39}" type="presOf" srcId="{204E97BE-CA48-4343-A365-DB34CC53036A}" destId="{45533062-623E-4528-B1EF-E7AE923C706F}" srcOrd="0" destOrd="0" presId="urn:microsoft.com/office/officeart/2005/8/layout/equation1"/>
+    <dgm:cxn modelId="{5F7AB3A1-AEA6-472B-B53B-CF46F36ABFCF}" type="presOf" srcId="{DFF0F86F-7D1E-478C-801F-62932B89E58A}" destId="{AE3F2D00-8892-4B16-82FF-2DD4881BAEBB}" srcOrd="0" destOrd="0" presId="urn:microsoft.com/office/officeart/2005/8/layout/equation1"/>
     <dgm:cxn modelId="{D8B89E41-F8E5-4929-9139-805B8B37D243}" type="presOf" srcId="{054E58BC-12D6-4E2B-91A3-F1C67D2D4E17}" destId="{3DC838B9-08E7-466D-B9DE-A8F5A5B30299}" srcOrd="0" destOrd="0" presId="urn:microsoft.com/office/officeart/2005/8/layout/equation1"/>
-    <dgm:cxn modelId="{5F7AB3A1-AEA6-472B-B53B-CF46F36ABFCF}" type="presOf" srcId="{DFF0F86F-7D1E-478C-801F-62932B89E58A}" destId="{AE3F2D00-8892-4B16-82FF-2DD4881BAEBB}" srcOrd="0" destOrd="0" presId="urn:microsoft.com/office/officeart/2005/8/layout/equation1"/>
     <dgm:cxn modelId="{6A24D43B-07FA-4522-A581-429C6BD4D925}" type="presOf" srcId="{E0EEC773-D0AA-407E-9EB3-6D042251D7F8}" destId="{86084EA6-E570-487D-BBBF-A6983D5F9DFA}" srcOrd="0" destOrd="0" presId="urn:microsoft.com/office/officeart/2005/8/layout/equation1"/>
     <dgm:cxn modelId="{C6EC5F97-F95A-4B30-93FB-533762AB3FC0}" srcId="{DFF0F86F-7D1E-478C-801F-62932B89E58A}" destId="{054E58BC-12D6-4E2B-91A3-F1C67D2D4E17}" srcOrd="0" destOrd="0" parTransId="{E6E02112-BA56-44F5-9E55-5F1A520935C9}" sibTransId="{BAC9B728-7990-4C30-A6B1-CE244DECE508}"/>
     <dgm:cxn modelId="{22826E73-6BEA-4E35-8661-44A7BAED28D7}" type="presOf" srcId="{A8F88788-D866-468D-91A1-8B6BCBB043A4}" destId="{5948235F-20D2-4786-916C-A49FAE16603E}" srcOrd="0" destOrd="0" presId="urn:microsoft.com/office/officeart/2005/8/layout/equation1"/>
@@ -9120,8 +9141,8 @@
               <a:lnSpc>
                 <a:spcPct val="100000"/>
               </a:lnSpc>
-              <a:buFont typeface="Symbol" panose="05050102010706020507" pitchFamily="18" charset="2"/>
-              <a:buChar char="-"/>
+              <a:buFont typeface="Wingdings" panose="05000000000000000000" pitchFamily="2" charset="2"/>
+              <a:buChar char="§"/>
             </a:pPr>
             <a:r>
               <a:rPr lang="de-DE" sz="1400" dirty="0"/>
@@ -9134,8 +9155,8 @@
               <a:lnSpc>
                 <a:spcPct val="100000"/>
               </a:lnSpc>
-              <a:buFont typeface="Symbol" panose="05050102010706020507" pitchFamily="18" charset="2"/>
-              <a:buChar char="-"/>
+              <a:buFont typeface="Wingdings" panose="05000000000000000000" pitchFamily="2" charset="2"/>
+              <a:buChar char="§"/>
             </a:pPr>
             <a:r>
               <a:rPr lang="de-DE" sz="1400" dirty="0" smtClean="0"/>
@@ -9155,8 +9176,8 @@
               <a:lnSpc>
                 <a:spcPct val="100000"/>
               </a:lnSpc>
-              <a:buFont typeface="Symbol" panose="05050102010706020507" pitchFamily="18" charset="2"/>
-              <a:buChar char="-"/>
+              <a:buFont typeface="Wingdings" panose="05000000000000000000" pitchFamily="2" charset="2"/>
+              <a:buChar char="§"/>
             </a:pPr>
             <a:r>
               <a:rPr lang="de-DE" sz="1400" dirty="0" smtClean="0"/>
@@ -9169,8 +9190,8 @@
               <a:lnSpc>
                 <a:spcPct val="100000"/>
               </a:lnSpc>
-              <a:buFont typeface="Symbol" panose="05050102010706020507" pitchFamily="18" charset="2"/>
-              <a:buChar char="-"/>
+              <a:buFont typeface="Wingdings" panose="05000000000000000000" pitchFamily="2" charset="2"/>
+              <a:buChar char="§"/>
             </a:pPr>
             <a:r>
               <a:rPr lang="de-DE" sz="1400" dirty="0"/>
@@ -9190,8 +9211,8 @@
               <a:lnSpc>
                 <a:spcPct val="100000"/>
               </a:lnSpc>
-              <a:buFont typeface="Symbol" panose="05050102010706020507" pitchFamily="18" charset="2"/>
-              <a:buChar char="-"/>
+              <a:buFont typeface="Wingdings" panose="05000000000000000000" pitchFamily="2" charset="2"/>
+              <a:buChar char="§"/>
             </a:pPr>
             <a:r>
               <a:rPr lang="de-DE" sz="1400" dirty="0" smtClean="0"/>
@@ -9349,7 +9370,6 @@
               <a:rPr lang="de-DE" dirty="0"/>
               <a:t>– Score für jeden Fahrer </a:t>
             </a:r>
-            <a:endParaRPr lang="de-DE" dirty="0"/>
           </a:p>
           <a:p>
             <a:pPr marL="342900" indent="-342900">
@@ -12293,6 +12313,18 @@
             <a:round/>
           </a:ln>
         </p:spPr>
+        <p:txBody>
+          <a:bodyPr anchor="ctr"/>
+          <a:lstStyle/>
+          <a:p>
+            <a:pPr algn="ctr"/>
+            <a:r>
+              <a:rPr lang="de-DE" dirty="0" smtClean="0"/>
+              <a:t>….</a:t>
+            </a:r>
+            <a:endParaRPr lang="de-DE" dirty="0"/>
+          </a:p>
+        </p:txBody>
       </p:sp>
     </p:spTree>
   </p:cSld>

</xml_diff>